<commit_message>
Added some info about SnapKit
</commit_message>
<xml_diff>
--- a/Presentation/SnapKit-30.09.2022/SnapKit-Abrosov.pptx
+++ b/Presentation/SnapKit-30.09.2022/SnapKit-Abrosov.pptx
@@ -2,18 +2,24 @@
 <file path=ppt/presentation.xml><?xml version="1.0" encoding="utf-8"?>
 <p:presentation xmlns:a="http://schemas.openxmlformats.org/drawingml/2006/main" xmlns:r="http://schemas.openxmlformats.org/officeDocument/2006/relationships" xmlns:p="http://schemas.openxmlformats.org/presentationml/2006/main" saveSubsetFonts="1" autoCompressPictures="0">
   <p:sldMasterIdLst>
-    <p:sldMasterId id="2147483648" r:id="rId1"/>
+    <p:sldMasterId id="2147483684" r:id="rId1"/>
   </p:sldMasterIdLst>
   <p:sldIdLst>
     <p:sldId id="256" r:id="rId2"/>
+    <p:sldId id="260" r:id="rId3"/>
+    <p:sldId id="262" r:id="rId4"/>
+    <p:sldId id="261" r:id="rId5"/>
+    <p:sldId id="257" r:id="rId6"/>
+    <p:sldId id="258" r:id="rId7"/>
+    <p:sldId id="259" r:id="rId8"/>
   </p:sldIdLst>
   <p:sldSz cx="12192000" cy="6858000"/>
   <p:notesSz cx="6858000" cy="9144000"/>
   <p:defaultTextStyle>
     <a:defPPr>
-      <a:defRPr lang="ru-RU"/>
+      <a:defRPr lang="en-US"/>
     </a:defPPr>
-    <a:lvl1pPr marL="0" algn="l" defTabSz="914400" rtl="0" eaLnBrk="1" latinLnBrk="0" hangingPunct="1">
+    <a:lvl1pPr marL="0" algn="l" defTabSz="457200" rtl="0" eaLnBrk="1" latinLnBrk="0" hangingPunct="1">
       <a:defRPr sz="1800" kern="1200">
         <a:solidFill>
           <a:schemeClr val="tx1"/>
@@ -23,7 +29,7 @@
         <a:cs typeface="+mn-cs"/>
       </a:defRPr>
     </a:lvl1pPr>
-    <a:lvl2pPr marL="457200" algn="l" defTabSz="914400" rtl="0" eaLnBrk="1" latinLnBrk="0" hangingPunct="1">
+    <a:lvl2pPr marL="457200" algn="l" defTabSz="457200" rtl="0" eaLnBrk="1" latinLnBrk="0" hangingPunct="1">
       <a:defRPr sz="1800" kern="1200">
         <a:solidFill>
           <a:schemeClr val="tx1"/>
@@ -33,7 +39,7 @@
         <a:cs typeface="+mn-cs"/>
       </a:defRPr>
     </a:lvl2pPr>
-    <a:lvl3pPr marL="914400" algn="l" defTabSz="914400" rtl="0" eaLnBrk="1" latinLnBrk="0" hangingPunct="1">
+    <a:lvl3pPr marL="914400" algn="l" defTabSz="457200" rtl="0" eaLnBrk="1" latinLnBrk="0" hangingPunct="1">
       <a:defRPr sz="1800" kern="1200">
         <a:solidFill>
           <a:schemeClr val="tx1"/>
@@ -43,7 +49,7 @@
         <a:cs typeface="+mn-cs"/>
       </a:defRPr>
     </a:lvl3pPr>
-    <a:lvl4pPr marL="1371600" algn="l" defTabSz="914400" rtl="0" eaLnBrk="1" latinLnBrk="0" hangingPunct="1">
+    <a:lvl4pPr marL="1371600" algn="l" defTabSz="457200" rtl="0" eaLnBrk="1" latinLnBrk="0" hangingPunct="1">
       <a:defRPr sz="1800" kern="1200">
         <a:solidFill>
           <a:schemeClr val="tx1"/>
@@ -53,7 +59,7 @@
         <a:cs typeface="+mn-cs"/>
       </a:defRPr>
     </a:lvl4pPr>
-    <a:lvl5pPr marL="1828800" algn="l" defTabSz="914400" rtl="0" eaLnBrk="1" latinLnBrk="0" hangingPunct="1">
+    <a:lvl5pPr marL="1828800" algn="l" defTabSz="457200" rtl="0" eaLnBrk="1" latinLnBrk="0" hangingPunct="1">
       <a:defRPr sz="1800" kern="1200">
         <a:solidFill>
           <a:schemeClr val="tx1"/>
@@ -63,7 +69,7 @@
         <a:cs typeface="+mn-cs"/>
       </a:defRPr>
     </a:lvl5pPr>
-    <a:lvl6pPr marL="2286000" algn="l" defTabSz="914400" rtl="0" eaLnBrk="1" latinLnBrk="0" hangingPunct="1">
+    <a:lvl6pPr marL="2286000" algn="l" defTabSz="457200" rtl="0" eaLnBrk="1" latinLnBrk="0" hangingPunct="1">
       <a:defRPr sz="1800" kern="1200">
         <a:solidFill>
           <a:schemeClr val="tx1"/>
@@ -73,7 +79,7 @@
         <a:cs typeface="+mn-cs"/>
       </a:defRPr>
     </a:lvl6pPr>
-    <a:lvl7pPr marL="2743200" algn="l" defTabSz="914400" rtl="0" eaLnBrk="1" latinLnBrk="0" hangingPunct="1">
+    <a:lvl7pPr marL="2743200" algn="l" defTabSz="457200" rtl="0" eaLnBrk="1" latinLnBrk="0" hangingPunct="1">
       <a:defRPr sz="1800" kern="1200">
         <a:solidFill>
           <a:schemeClr val="tx1"/>
@@ -83,7 +89,7 @@
         <a:cs typeface="+mn-cs"/>
       </a:defRPr>
     </a:lvl7pPr>
-    <a:lvl8pPr marL="3200400" algn="l" defTabSz="914400" rtl="0" eaLnBrk="1" latinLnBrk="0" hangingPunct="1">
+    <a:lvl8pPr marL="3200400" algn="l" defTabSz="457200" rtl="0" eaLnBrk="1" latinLnBrk="0" hangingPunct="1">
       <a:defRPr sz="1800" kern="1200">
         <a:solidFill>
           <a:schemeClr val="tx1"/>
@@ -93,7 +99,7 @@
         <a:cs typeface="+mn-cs"/>
       </a:defRPr>
     </a:lvl8pPr>
-    <a:lvl9pPr marL="3657600" algn="l" defTabSz="914400" rtl="0" eaLnBrk="1" latinLnBrk="0" hangingPunct="1">
+    <a:lvl9pPr marL="3657600" algn="l" defTabSz="457200" rtl="0" eaLnBrk="1" latinLnBrk="0" hangingPunct="1">
       <a:defRPr sz="1800" kern="1200">
         <a:solidFill>
           <a:schemeClr val="tx1"/>
@@ -104,6 +110,11 @@
       </a:defRPr>
     </a:lvl9pPr>
   </p:defaultTextStyle>
+  <p:extLst>
+    <p:ext uri="{EFAFB233-063F-42B5-8137-9DF3F51BA10A}">
+      <p15:sldGuideLst xmlns:p15="http://schemas.microsoft.com/office/powerpoint/2012/main"/>
+    </p:ext>
+  </p:extLst>
 </p:presentation>
 </file>
 
@@ -126,13 +137,7 @@
       </p:grpSpPr>
       <p:sp>
         <p:nvSpPr>
-          <p:cNvPr id="2" name="Заголовок 1">
-            <a:extLst>
-              <a:ext uri="{FF2B5EF4-FFF2-40B4-BE49-F238E27FC236}">
-                <a16:creationId xmlns:a16="http://schemas.microsoft.com/office/drawing/2014/main" id="{32767926-B047-4348-8604-170C05D3AA53}"/>
-              </a:ext>
-            </a:extLst>
-          </p:cNvPr>
+          <p:cNvPr id="2" name="Title 1"/>
           <p:cNvSpPr>
             <a:spLocks noGrp="1"/>
           </p:cNvSpPr>
@@ -158,18 +163,13 @@
               <a:rPr lang="ru-RU"/>
               <a:t>Образец заголовка</a:t>
             </a:r>
-          </a:p>
-        </p:txBody>
-      </p:sp>
-      <p:sp>
-        <p:nvSpPr>
-          <p:cNvPr id="3" name="Подзаголовок 2">
-            <a:extLst>
-              <a:ext uri="{FF2B5EF4-FFF2-40B4-BE49-F238E27FC236}">
-                <a16:creationId xmlns:a16="http://schemas.microsoft.com/office/drawing/2014/main" id="{DD735BEB-4293-E143-8F11-F913CB5F759F}"/>
-              </a:ext>
-            </a:extLst>
-          </p:cNvPr>
+            <a:endParaRPr lang="en-US" dirty="0"/>
+          </a:p>
+        </p:txBody>
+      </p:sp>
+      <p:sp>
+        <p:nvSpPr>
+          <p:cNvPr id="3" name="Subtitle 2"/>
           <p:cNvSpPr>
             <a:spLocks noGrp="1"/>
           </p:cNvSpPr>
@@ -228,18 +228,13 @@
               <a:rPr lang="ru-RU"/>
               <a:t>Образец подзаголовка</a:t>
             </a:r>
-          </a:p>
-        </p:txBody>
-      </p:sp>
-      <p:sp>
-        <p:nvSpPr>
-          <p:cNvPr id="4" name="Дата 3">
-            <a:extLst>
-              <a:ext uri="{FF2B5EF4-FFF2-40B4-BE49-F238E27FC236}">
-                <a16:creationId xmlns:a16="http://schemas.microsoft.com/office/drawing/2014/main" id="{EA108434-B915-CE4D-8DD4-DA5B6181BD11}"/>
-              </a:ext>
-            </a:extLst>
-          </p:cNvPr>
+            <a:endParaRPr lang="en-US" dirty="0"/>
+          </a:p>
+        </p:txBody>
+      </p:sp>
+      <p:sp>
+        <p:nvSpPr>
+          <p:cNvPr id="4" name="Date Placeholder 3"/>
           <p:cNvSpPr>
             <a:spLocks noGrp="1"/>
           </p:cNvSpPr>
@@ -262,13 +257,7 @@
       </p:sp>
       <p:sp>
         <p:nvSpPr>
-          <p:cNvPr id="5" name="Нижний колонтитул 4">
-            <a:extLst>
-              <a:ext uri="{FF2B5EF4-FFF2-40B4-BE49-F238E27FC236}">
-                <a16:creationId xmlns:a16="http://schemas.microsoft.com/office/drawing/2014/main" id="{A4B9AB18-07D4-A84E-A5AF-4640D557D720}"/>
-              </a:ext>
-            </a:extLst>
-          </p:cNvPr>
+          <p:cNvPr id="5" name="Footer Placeholder 4"/>
           <p:cNvSpPr>
             <a:spLocks noGrp="1"/>
           </p:cNvSpPr>
@@ -287,13 +276,7 @@
       </p:sp>
       <p:sp>
         <p:nvSpPr>
-          <p:cNvPr id="6" name="Номер слайда 5">
-            <a:extLst>
-              <a:ext uri="{FF2B5EF4-FFF2-40B4-BE49-F238E27FC236}">
-                <a16:creationId xmlns:a16="http://schemas.microsoft.com/office/drawing/2014/main" id="{90A13608-2AA5-9B43-99AC-7D5E0C2B5EE9}"/>
-              </a:ext>
-            </a:extLst>
-          </p:cNvPr>
+          <p:cNvPr id="6" name="Slide Number Placeholder 5"/>
           <p:cNvSpPr>
             <a:spLocks noGrp="1"/>
           </p:cNvSpPr>
@@ -317,7 +300,7 @@
     </p:spTree>
     <p:extLst>
       <p:ext uri="{BB962C8B-B14F-4D97-AF65-F5344CB8AC3E}">
-        <p14:creationId xmlns:p14="http://schemas.microsoft.com/office/powerpoint/2010/main" val="2741335039"/>
+        <p14:creationId xmlns:p14="http://schemas.microsoft.com/office/powerpoint/2010/main" val="3746152320"/>
       </p:ext>
     </p:extLst>
   </p:cSld>
@@ -346,13 +329,7 @@
       </p:grpSpPr>
       <p:sp>
         <p:nvSpPr>
-          <p:cNvPr id="2" name="Заголовок 1">
-            <a:extLst>
-              <a:ext uri="{FF2B5EF4-FFF2-40B4-BE49-F238E27FC236}">
-                <a16:creationId xmlns:a16="http://schemas.microsoft.com/office/drawing/2014/main" id="{6E50E9B3-3D5F-E94C-AEA1-5040C3997A8D}"/>
-              </a:ext>
-            </a:extLst>
-          </p:cNvPr>
+          <p:cNvPr id="2" name="Title 1"/>
           <p:cNvSpPr>
             <a:spLocks noGrp="1"/>
           </p:cNvSpPr>
@@ -369,18 +346,13 @@
               <a:rPr lang="ru-RU"/>
               <a:t>Образец заголовка</a:t>
             </a:r>
-          </a:p>
-        </p:txBody>
-      </p:sp>
-      <p:sp>
-        <p:nvSpPr>
-          <p:cNvPr id="3" name="Вертикальный текст 2">
-            <a:extLst>
-              <a:ext uri="{FF2B5EF4-FFF2-40B4-BE49-F238E27FC236}">
-                <a16:creationId xmlns:a16="http://schemas.microsoft.com/office/drawing/2014/main" id="{3FA577EC-73FA-274A-B00E-A2891C245B91}"/>
-              </a:ext>
-            </a:extLst>
-          </p:cNvPr>
+            <a:endParaRPr lang="en-US" dirty="0"/>
+          </a:p>
+        </p:txBody>
+      </p:sp>
+      <p:sp>
+        <p:nvSpPr>
+          <p:cNvPr id="3" name="Vertical Text Placeholder 2"/>
           <p:cNvSpPr>
             <a:spLocks noGrp="1"/>
           </p:cNvSpPr>
@@ -426,18 +398,13 @@
               <a:rPr lang="ru-RU"/>
               <a:t>Пятый уровень</a:t>
             </a:r>
-          </a:p>
-        </p:txBody>
-      </p:sp>
-      <p:sp>
-        <p:nvSpPr>
-          <p:cNvPr id="4" name="Дата 3">
-            <a:extLst>
-              <a:ext uri="{FF2B5EF4-FFF2-40B4-BE49-F238E27FC236}">
-                <a16:creationId xmlns:a16="http://schemas.microsoft.com/office/drawing/2014/main" id="{1BE5C148-1CB5-E641-ADB9-FE305EB82785}"/>
-              </a:ext>
-            </a:extLst>
-          </p:cNvPr>
+            <a:endParaRPr lang="en-US" dirty="0"/>
+          </a:p>
+        </p:txBody>
+      </p:sp>
+      <p:sp>
+        <p:nvSpPr>
+          <p:cNvPr id="4" name="Date Placeholder 3"/>
           <p:cNvSpPr>
             <a:spLocks noGrp="1"/>
           </p:cNvSpPr>
@@ -460,13 +427,7 @@
       </p:sp>
       <p:sp>
         <p:nvSpPr>
-          <p:cNvPr id="5" name="Нижний колонтитул 4">
-            <a:extLst>
-              <a:ext uri="{FF2B5EF4-FFF2-40B4-BE49-F238E27FC236}">
-                <a16:creationId xmlns:a16="http://schemas.microsoft.com/office/drawing/2014/main" id="{DD93C63F-E0C1-0543-AB3E-610045A02F37}"/>
-              </a:ext>
-            </a:extLst>
-          </p:cNvPr>
+          <p:cNvPr id="5" name="Footer Placeholder 4"/>
           <p:cNvSpPr>
             <a:spLocks noGrp="1"/>
           </p:cNvSpPr>
@@ -485,13 +446,7 @@
       </p:sp>
       <p:sp>
         <p:nvSpPr>
-          <p:cNvPr id="6" name="Номер слайда 5">
-            <a:extLst>
-              <a:ext uri="{FF2B5EF4-FFF2-40B4-BE49-F238E27FC236}">
-                <a16:creationId xmlns:a16="http://schemas.microsoft.com/office/drawing/2014/main" id="{AF7FB6FF-184C-FB43-AC3B-B262595EAB9E}"/>
-              </a:ext>
-            </a:extLst>
-          </p:cNvPr>
+          <p:cNvPr id="6" name="Slide Number Placeholder 5"/>
           <p:cNvSpPr>
             <a:spLocks noGrp="1"/>
           </p:cNvSpPr>
@@ -515,7 +470,7 @@
     </p:spTree>
     <p:extLst>
       <p:ext uri="{BB962C8B-B14F-4D97-AF65-F5344CB8AC3E}">
-        <p14:creationId xmlns:p14="http://schemas.microsoft.com/office/powerpoint/2010/main" val="536075357"/>
+        <p14:creationId xmlns:p14="http://schemas.microsoft.com/office/powerpoint/2010/main" val="3728180832"/>
       </p:ext>
     </p:extLst>
   </p:cSld>
@@ -544,13 +499,7 @@
       </p:grpSpPr>
       <p:sp>
         <p:nvSpPr>
-          <p:cNvPr id="2" name="Вертикальный заголовок 1">
-            <a:extLst>
-              <a:ext uri="{FF2B5EF4-FFF2-40B4-BE49-F238E27FC236}">
-                <a16:creationId xmlns:a16="http://schemas.microsoft.com/office/drawing/2014/main" id="{8EDD2D9C-3AD9-A94B-B90D-BD5C7F252382}"/>
-              </a:ext>
-            </a:extLst>
-          </p:cNvPr>
+          <p:cNvPr id="2" name="Vertical Title 1"/>
           <p:cNvSpPr>
             <a:spLocks noGrp="1"/>
           </p:cNvSpPr>
@@ -572,18 +521,13 @@
               <a:rPr lang="ru-RU"/>
               <a:t>Образец заголовка</a:t>
             </a:r>
-          </a:p>
-        </p:txBody>
-      </p:sp>
-      <p:sp>
-        <p:nvSpPr>
-          <p:cNvPr id="3" name="Вертикальный текст 2">
-            <a:extLst>
-              <a:ext uri="{FF2B5EF4-FFF2-40B4-BE49-F238E27FC236}">
-                <a16:creationId xmlns:a16="http://schemas.microsoft.com/office/drawing/2014/main" id="{29BEEE58-4653-D648-B5EA-B4B8AE472EC0}"/>
-              </a:ext>
-            </a:extLst>
-          </p:cNvPr>
+            <a:endParaRPr lang="en-US" dirty="0"/>
+          </a:p>
+        </p:txBody>
+      </p:sp>
+      <p:sp>
+        <p:nvSpPr>
+          <p:cNvPr id="3" name="Vertical Text Placeholder 2"/>
           <p:cNvSpPr>
             <a:spLocks noGrp="1"/>
           </p:cNvSpPr>
@@ -634,18 +578,13 @@
               <a:rPr lang="ru-RU"/>
               <a:t>Пятый уровень</a:t>
             </a:r>
-          </a:p>
-        </p:txBody>
-      </p:sp>
-      <p:sp>
-        <p:nvSpPr>
-          <p:cNvPr id="4" name="Дата 3">
-            <a:extLst>
-              <a:ext uri="{FF2B5EF4-FFF2-40B4-BE49-F238E27FC236}">
-                <a16:creationId xmlns:a16="http://schemas.microsoft.com/office/drawing/2014/main" id="{442F446F-7653-1643-BCAD-3C34ED933193}"/>
-              </a:ext>
-            </a:extLst>
-          </p:cNvPr>
+            <a:endParaRPr lang="en-US" dirty="0"/>
+          </a:p>
+        </p:txBody>
+      </p:sp>
+      <p:sp>
+        <p:nvSpPr>
+          <p:cNvPr id="4" name="Date Placeholder 3"/>
           <p:cNvSpPr>
             <a:spLocks noGrp="1"/>
           </p:cNvSpPr>
@@ -668,13 +607,7 @@
       </p:sp>
       <p:sp>
         <p:nvSpPr>
-          <p:cNvPr id="5" name="Нижний колонтитул 4">
-            <a:extLst>
-              <a:ext uri="{FF2B5EF4-FFF2-40B4-BE49-F238E27FC236}">
-                <a16:creationId xmlns:a16="http://schemas.microsoft.com/office/drawing/2014/main" id="{EB89CDB3-DBAF-6749-B687-9E0C08156D70}"/>
-              </a:ext>
-            </a:extLst>
-          </p:cNvPr>
+          <p:cNvPr id="5" name="Footer Placeholder 4"/>
           <p:cNvSpPr>
             <a:spLocks noGrp="1"/>
           </p:cNvSpPr>
@@ -693,13 +626,7 @@
       </p:sp>
       <p:sp>
         <p:nvSpPr>
-          <p:cNvPr id="6" name="Номер слайда 5">
-            <a:extLst>
-              <a:ext uri="{FF2B5EF4-FFF2-40B4-BE49-F238E27FC236}">
-                <a16:creationId xmlns:a16="http://schemas.microsoft.com/office/drawing/2014/main" id="{1B37D633-8964-BA41-8018-768B34DC02FC}"/>
-              </a:ext>
-            </a:extLst>
-          </p:cNvPr>
+          <p:cNvPr id="6" name="Slide Number Placeholder 5"/>
           <p:cNvSpPr>
             <a:spLocks noGrp="1"/>
           </p:cNvSpPr>
@@ -723,7 +650,7 @@
     </p:spTree>
     <p:extLst>
       <p:ext uri="{BB962C8B-B14F-4D97-AF65-F5344CB8AC3E}">
-        <p14:creationId xmlns:p14="http://schemas.microsoft.com/office/powerpoint/2010/main" val="1723893880"/>
+        <p14:creationId xmlns:p14="http://schemas.microsoft.com/office/powerpoint/2010/main" val="718597529"/>
       </p:ext>
     </p:extLst>
   </p:cSld>
@@ -752,13 +679,7 @@
       </p:grpSpPr>
       <p:sp>
         <p:nvSpPr>
-          <p:cNvPr id="2" name="Заголовок 1">
-            <a:extLst>
-              <a:ext uri="{FF2B5EF4-FFF2-40B4-BE49-F238E27FC236}">
-                <a16:creationId xmlns:a16="http://schemas.microsoft.com/office/drawing/2014/main" id="{7A2B5404-75AD-0640-86BF-652AA966BECD}"/>
-              </a:ext>
-            </a:extLst>
-          </p:cNvPr>
+          <p:cNvPr id="2" name="Title 1"/>
           <p:cNvSpPr>
             <a:spLocks noGrp="1"/>
           </p:cNvSpPr>
@@ -775,18 +696,13 @@
               <a:rPr lang="ru-RU"/>
               <a:t>Образец заголовка</a:t>
             </a:r>
-          </a:p>
-        </p:txBody>
-      </p:sp>
-      <p:sp>
-        <p:nvSpPr>
-          <p:cNvPr id="3" name="Объект 2">
-            <a:extLst>
-              <a:ext uri="{FF2B5EF4-FFF2-40B4-BE49-F238E27FC236}">
-                <a16:creationId xmlns:a16="http://schemas.microsoft.com/office/drawing/2014/main" id="{3CA3939A-EC17-394D-96F8-EE37FF3262E3}"/>
-              </a:ext>
-            </a:extLst>
-          </p:cNvPr>
+            <a:endParaRPr lang="en-US" dirty="0"/>
+          </a:p>
+        </p:txBody>
+      </p:sp>
+      <p:sp>
+        <p:nvSpPr>
+          <p:cNvPr id="3" name="Content Placeholder 2"/>
           <p:cNvSpPr>
             <a:spLocks noGrp="1"/>
           </p:cNvSpPr>
@@ -832,18 +748,13 @@
               <a:rPr lang="ru-RU"/>
               <a:t>Пятый уровень</a:t>
             </a:r>
-          </a:p>
-        </p:txBody>
-      </p:sp>
-      <p:sp>
-        <p:nvSpPr>
-          <p:cNvPr id="4" name="Дата 3">
-            <a:extLst>
-              <a:ext uri="{FF2B5EF4-FFF2-40B4-BE49-F238E27FC236}">
-                <a16:creationId xmlns:a16="http://schemas.microsoft.com/office/drawing/2014/main" id="{1233E65A-F326-C947-B358-9A031C96F1A7}"/>
-              </a:ext>
-            </a:extLst>
-          </p:cNvPr>
+            <a:endParaRPr lang="en-US" dirty="0"/>
+          </a:p>
+        </p:txBody>
+      </p:sp>
+      <p:sp>
+        <p:nvSpPr>
+          <p:cNvPr id="4" name="Date Placeholder 3"/>
           <p:cNvSpPr>
             <a:spLocks noGrp="1"/>
           </p:cNvSpPr>
@@ -866,13 +777,7 @@
       </p:sp>
       <p:sp>
         <p:nvSpPr>
-          <p:cNvPr id="5" name="Нижний колонтитул 4">
-            <a:extLst>
-              <a:ext uri="{FF2B5EF4-FFF2-40B4-BE49-F238E27FC236}">
-                <a16:creationId xmlns:a16="http://schemas.microsoft.com/office/drawing/2014/main" id="{DDB624EE-5B48-384D-B35D-35EC4CFE1CEA}"/>
-              </a:ext>
-            </a:extLst>
-          </p:cNvPr>
+          <p:cNvPr id="5" name="Footer Placeholder 4"/>
           <p:cNvSpPr>
             <a:spLocks noGrp="1"/>
           </p:cNvSpPr>
@@ -891,13 +796,7 @@
       </p:sp>
       <p:sp>
         <p:nvSpPr>
-          <p:cNvPr id="6" name="Номер слайда 5">
-            <a:extLst>
-              <a:ext uri="{FF2B5EF4-FFF2-40B4-BE49-F238E27FC236}">
-                <a16:creationId xmlns:a16="http://schemas.microsoft.com/office/drawing/2014/main" id="{7E8D16FC-D586-0D4F-A40F-B1A97E4B444C}"/>
-              </a:ext>
-            </a:extLst>
-          </p:cNvPr>
+          <p:cNvPr id="6" name="Slide Number Placeholder 5"/>
           <p:cNvSpPr>
             <a:spLocks noGrp="1"/>
           </p:cNvSpPr>
@@ -921,7 +820,7 @@
     </p:spTree>
     <p:extLst>
       <p:ext uri="{BB962C8B-B14F-4D97-AF65-F5344CB8AC3E}">
-        <p14:creationId xmlns:p14="http://schemas.microsoft.com/office/powerpoint/2010/main" val="3620202043"/>
+        <p14:creationId xmlns:p14="http://schemas.microsoft.com/office/powerpoint/2010/main" val="527243873"/>
       </p:ext>
     </p:extLst>
   </p:cSld>
@@ -950,13 +849,7 @@
       </p:grpSpPr>
       <p:sp>
         <p:nvSpPr>
-          <p:cNvPr id="2" name="Заголовок 1">
-            <a:extLst>
-              <a:ext uri="{FF2B5EF4-FFF2-40B4-BE49-F238E27FC236}">
-                <a16:creationId xmlns:a16="http://schemas.microsoft.com/office/drawing/2014/main" id="{8039F239-C7C2-8C4E-9B06-4B5EA81A7F5A}"/>
-              </a:ext>
-            </a:extLst>
-          </p:cNvPr>
+          <p:cNvPr id="2" name="Title 1"/>
           <p:cNvSpPr>
             <a:spLocks noGrp="1"/>
           </p:cNvSpPr>
@@ -982,18 +875,13 @@
               <a:rPr lang="ru-RU"/>
               <a:t>Образец заголовка</a:t>
             </a:r>
-          </a:p>
-        </p:txBody>
-      </p:sp>
-      <p:sp>
-        <p:nvSpPr>
-          <p:cNvPr id="3" name="Текст 2">
-            <a:extLst>
-              <a:ext uri="{FF2B5EF4-FFF2-40B4-BE49-F238E27FC236}">
-                <a16:creationId xmlns:a16="http://schemas.microsoft.com/office/drawing/2014/main" id="{59BC5B0B-D6A1-D047-AFF7-F84B5753D4B7}"/>
-              </a:ext>
-            </a:extLst>
-          </p:cNvPr>
+            <a:endParaRPr lang="en-US" dirty="0"/>
+          </a:p>
+        </p:txBody>
+      </p:sp>
+      <p:sp>
+        <p:nvSpPr>
+          <p:cNvPr id="3" name="Text Placeholder 2"/>
           <p:cNvSpPr>
             <a:spLocks noGrp="1"/>
           </p:cNvSpPr>
@@ -1112,13 +1000,7 @@
       </p:sp>
       <p:sp>
         <p:nvSpPr>
-          <p:cNvPr id="4" name="Дата 3">
-            <a:extLst>
-              <a:ext uri="{FF2B5EF4-FFF2-40B4-BE49-F238E27FC236}">
-                <a16:creationId xmlns:a16="http://schemas.microsoft.com/office/drawing/2014/main" id="{A2DC8473-1CF2-4141-9FD3-66FA24AC6BA2}"/>
-              </a:ext>
-            </a:extLst>
-          </p:cNvPr>
+          <p:cNvPr id="4" name="Date Placeholder 3"/>
           <p:cNvSpPr>
             <a:spLocks noGrp="1"/>
           </p:cNvSpPr>
@@ -1141,13 +1023,7 @@
       </p:sp>
       <p:sp>
         <p:nvSpPr>
-          <p:cNvPr id="5" name="Нижний колонтитул 4">
-            <a:extLst>
-              <a:ext uri="{FF2B5EF4-FFF2-40B4-BE49-F238E27FC236}">
-                <a16:creationId xmlns:a16="http://schemas.microsoft.com/office/drawing/2014/main" id="{0096F5B1-200F-424F-ACA3-D1CF8D24B713}"/>
-              </a:ext>
-            </a:extLst>
-          </p:cNvPr>
+          <p:cNvPr id="5" name="Footer Placeholder 4"/>
           <p:cNvSpPr>
             <a:spLocks noGrp="1"/>
           </p:cNvSpPr>
@@ -1166,13 +1042,7 @@
       </p:sp>
       <p:sp>
         <p:nvSpPr>
-          <p:cNvPr id="6" name="Номер слайда 5">
-            <a:extLst>
-              <a:ext uri="{FF2B5EF4-FFF2-40B4-BE49-F238E27FC236}">
-                <a16:creationId xmlns:a16="http://schemas.microsoft.com/office/drawing/2014/main" id="{DF590C8F-FDF9-8F4A-A544-F95D38586992}"/>
-              </a:ext>
-            </a:extLst>
-          </p:cNvPr>
+          <p:cNvPr id="6" name="Slide Number Placeholder 5"/>
           <p:cNvSpPr>
             <a:spLocks noGrp="1"/>
           </p:cNvSpPr>
@@ -1196,7 +1066,7 @@
     </p:spTree>
     <p:extLst>
       <p:ext uri="{BB962C8B-B14F-4D97-AF65-F5344CB8AC3E}">
-        <p14:creationId xmlns:p14="http://schemas.microsoft.com/office/powerpoint/2010/main" val="3119800631"/>
+        <p14:creationId xmlns:p14="http://schemas.microsoft.com/office/powerpoint/2010/main" val="411612182"/>
       </p:ext>
     </p:extLst>
   </p:cSld>
@@ -1225,13 +1095,7 @@
       </p:grpSpPr>
       <p:sp>
         <p:nvSpPr>
-          <p:cNvPr id="2" name="Заголовок 1">
-            <a:extLst>
-              <a:ext uri="{FF2B5EF4-FFF2-40B4-BE49-F238E27FC236}">
-                <a16:creationId xmlns:a16="http://schemas.microsoft.com/office/drawing/2014/main" id="{6C766073-4B41-814F-B787-3D0275291FA3}"/>
-              </a:ext>
-            </a:extLst>
-          </p:cNvPr>
+          <p:cNvPr id="2" name="Title 1"/>
           <p:cNvSpPr>
             <a:spLocks noGrp="1"/>
           </p:cNvSpPr>
@@ -1248,18 +1112,13 @@
               <a:rPr lang="ru-RU"/>
               <a:t>Образец заголовка</a:t>
             </a:r>
-          </a:p>
-        </p:txBody>
-      </p:sp>
-      <p:sp>
-        <p:nvSpPr>
-          <p:cNvPr id="3" name="Объект 2">
-            <a:extLst>
-              <a:ext uri="{FF2B5EF4-FFF2-40B4-BE49-F238E27FC236}">
-                <a16:creationId xmlns:a16="http://schemas.microsoft.com/office/drawing/2014/main" id="{8F395861-F8FC-7042-B095-97820017E561}"/>
-              </a:ext>
-            </a:extLst>
-          </p:cNvPr>
+            <a:endParaRPr lang="en-US" dirty="0"/>
+          </a:p>
+        </p:txBody>
+      </p:sp>
+      <p:sp>
+        <p:nvSpPr>
+          <p:cNvPr id="3" name="Content Placeholder 2"/>
           <p:cNvSpPr>
             <a:spLocks noGrp="1"/>
           </p:cNvSpPr>
@@ -1310,18 +1169,13 @@
               <a:rPr lang="ru-RU"/>
               <a:t>Пятый уровень</a:t>
             </a:r>
-          </a:p>
-        </p:txBody>
-      </p:sp>
-      <p:sp>
-        <p:nvSpPr>
-          <p:cNvPr id="4" name="Объект 3">
-            <a:extLst>
-              <a:ext uri="{FF2B5EF4-FFF2-40B4-BE49-F238E27FC236}">
-                <a16:creationId xmlns:a16="http://schemas.microsoft.com/office/drawing/2014/main" id="{CAFA78A4-4DD0-E44A-9CAF-67F5313A2373}"/>
-              </a:ext>
-            </a:extLst>
-          </p:cNvPr>
+            <a:endParaRPr lang="en-US" dirty="0"/>
+          </a:p>
+        </p:txBody>
+      </p:sp>
+      <p:sp>
+        <p:nvSpPr>
+          <p:cNvPr id="4" name="Content Placeholder 3"/>
           <p:cNvSpPr>
             <a:spLocks noGrp="1"/>
           </p:cNvSpPr>
@@ -1372,18 +1226,13 @@
               <a:rPr lang="ru-RU"/>
               <a:t>Пятый уровень</a:t>
             </a:r>
-          </a:p>
-        </p:txBody>
-      </p:sp>
-      <p:sp>
-        <p:nvSpPr>
-          <p:cNvPr id="5" name="Дата 4">
-            <a:extLst>
-              <a:ext uri="{FF2B5EF4-FFF2-40B4-BE49-F238E27FC236}">
-                <a16:creationId xmlns:a16="http://schemas.microsoft.com/office/drawing/2014/main" id="{AE33487E-B955-2D4E-8183-7EB81C7622AB}"/>
-              </a:ext>
-            </a:extLst>
-          </p:cNvPr>
+            <a:endParaRPr lang="en-US" dirty="0"/>
+          </a:p>
+        </p:txBody>
+      </p:sp>
+      <p:sp>
+        <p:nvSpPr>
+          <p:cNvPr id="5" name="Date Placeholder 4"/>
           <p:cNvSpPr>
             <a:spLocks noGrp="1"/>
           </p:cNvSpPr>
@@ -1406,13 +1255,7 @@
       </p:sp>
       <p:sp>
         <p:nvSpPr>
-          <p:cNvPr id="6" name="Нижний колонтитул 5">
-            <a:extLst>
-              <a:ext uri="{FF2B5EF4-FFF2-40B4-BE49-F238E27FC236}">
-                <a16:creationId xmlns:a16="http://schemas.microsoft.com/office/drawing/2014/main" id="{E2AB8C3E-B176-B049-9D6C-3641DE5093C1}"/>
-              </a:ext>
-            </a:extLst>
-          </p:cNvPr>
+          <p:cNvPr id="6" name="Footer Placeholder 5"/>
           <p:cNvSpPr>
             <a:spLocks noGrp="1"/>
           </p:cNvSpPr>
@@ -1431,13 +1274,7 @@
       </p:sp>
       <p:sp>
         <p:nvSpPr>
-          <p:cNvPr id="7" name="Номер слайда 6">
-            <a:extLst>
-              <a:ext uri="{FF2B5EF4-FFF2-40B4-BE49-F238E27FC236}">
-                <a16:creationId xmlns:a16="http://schemas.microsoft.com/office/drawing/2014/main" id="{CED25CA6-D8F1-A64D-BD51-81C61EE362CD}"/>
-              </a:ext>
-            </a:extLst>
-          </p:cNvPr>
+          <p:cNvPr id="7" name="Slide Number Placeholder 6"/>
           <p:cNvSpPr>
             <a:spLocks noGrp="1"/>
           </p:cNvSpPr>
@@ -1461,7 +1298,7 @@
     </p:spTree>
     <p:extLst>
       <p:ext uri="{BB962C8B-B14F-4D97-AF65-F5344CB8AC3E}">
-        <p14:creationId xmlns:p14="http://schemas.microsoft.com/office/powerpoint/2010/main" val="3471022144"/>
+        <p14:creationId xmlns:p14="http://schemas.microsoft.com/office/powerpoint/2010/main" val="2756703645"/>
       </p:ext>
     </p:extLst>
   </p:cSld>
@@ -1490,13 +1327,7 @@
       </p:grpSpPr>
       <p:sp>
         <p:nvSpPr>
-          <p:cNvPr id="2" name="Заголовок 1">
-            <a:extLst>
-              <a:ext uri="{FF2B5EF4-FFF2-40B4-BE49-F238E27FC236}">
-                <a16:creationId xmlns:a16="http://schemas.microsoft.com/office/drawing/2014/main" id="{45D4ADA8-40C3-D243-BD51-77CE1BF4AE5F}"/>
-              </a:ext>
-            </a:extLst>
-          </p:cNvPr>
+          <p:cNvPr id="2" name="Title 1"/>
           <p:cNvSpPr>
             <a:spLocks noGrp="1"/>
           </p:cNvSpPr>
@@ -1518,18 +1349,13 @@
               <a:rPr lang="ru-RU"/>
               <a:t>Образец заголовка</a:t>
             </a:r>
-          </a:p>
-        </p:txBody>
-      </p:sp>
-      <p:sp>
-        <p:nvSpPr>
-          <p:cNvPr id="3" name="Текст 2">
-            <a:extLst>
-              <a:ext uri="{FF2B5EF4-FFF2-40B4-BE49-F238E27FC236}">
-                <a16:creationId xmlns:a16="http://schemas.microsoft.com/office/drawing/2014/main" id="{EEEC6A1E-E02E-EB42-A025-85B94FAB2D3A}"/>
-              </a:ext>
-            </a:extLst>
-          </p:cNvPr>
+            <a:endParaRPr lang="en-US" dirty="0"/>
+          </a:p>
+        </p:txBody>
+      </p:sp>
+      <p:sp>
+        <p:nvSpPr>
+          <p:cNvPr id="3" name="Text Placeholder 2"/>
           <p:cNvSpPr>
             <a:spLocks noGrp="1"/>
           </p:cNvSpPr>
@@ -1594,13 +1420,7 @@
       </p:sp>
       <p:sp>
         <p:nvSpPr>
-          <p:cNvPr id="4" name="Объект 3">
-            <a:extLst>
-              <a:ext uri="{FF2B5EF4-FFF2-40B4-BE49-F238E27FC236}">
-                <a16:creationId xmlns:a16="http://schemas.microsoft.com/office/drawing/2014/main" id="{BF211745-A146-4847-8288-3C71D25FAFBF}"/>
-              </a:ext>
-            </a:extLst>
-          </p:cNvPr>
+          <p:cNvPr id="4" name="Content Placeholder 3"/>
           <p:cNvSpPr>
             <a:spLocks noGrp="1"/>
           </p:cNvSpPr>
@@ -1651,18 +1471,13 @@
               <a:rPr lang="ru-RU"/>
               <a:t>Пятый уровень</a:t>
             </a:r>
-          </a:p>
-        </p:txBody>
-      </p:sp>
-      <p:sp>
-        <p:nvSpPr>
-          <p:cNvPr id="5" name="Текст 4">
-            <a:extLst>
-              <a:ext uri="{FF2B5EF4-FFF2-40B4-BE49-F238E27FC236}">
-                <a16:creationId xmlns:a16="http://schemas.microsoft.com/office/drawing/2014/main" id="{FE91DA0E-DA50-E249-862A-A7895430A691}"/>
-              </a:ext>
-            </a:extLst>
-          </p:cNvPr>
+            <a:endParaRPr lang="en-US" dirty="0"/>
+          </a:p>
+        </p:txBody>
+      </p:sp>
+      <p:sp>
+        <p:nvSpPr>
+          <p:cNvPr id="5" name="Text Placeholder 4"/>
           <p:cNvSpPr>
             <a:spLocks noGrp="1"/>
           </p:cNvSpPr>
@@ -1727,13 +1542,7 @@
       </p:sp>
       <p:sp>
         <p:nvSpPr>
-          <p:cNvPr id="6" name="Объект 5">
-            <a:extLst>
-              <a:ext uri="{FF2B5EF4-FFF2-40B4-BE49-F238E27FC236}">
-                <a16:creationId xmlns:a16="http://schemas.microsoft.com/office/drawing/2014/main" id="{BFF3CD10-E160-B640-B22C-FABF8DBED90D}"/>
-              </a:ext>
-            </a:extLst>
-          </p:cNvPr>
+          <p:cNvPr id="6" name="Content Placeholder 5"/>
           <p:cNvSpPr>
             <a:spLocks noGrp="1"/>
           </p:cNvSpPr>
@@ -1784,18 +1593,13 @@
               <a:rPr lang="ru-RU"/>
               <a:t>Пятый уровень</a:t>
             </a:r>
-          </a:p>
-        </p:txBody>
-      </p:sp>
-      <p:sp>
-        <p:nvSpPr>
-          <p:cNvPr id="7" name="Дата 6">
-            <a:extLst>
-              <a:ext uri="{FF2B5EF4-FFF2-40B4-BE49-F238E27FC236}">
-                <a16:creationId xmlns:a16="http://schemas.microsoft.com/office/drawing/2014/main" id="{5F7193D6-D42F-7E4E-A4DC-8AABCE9B5E29}"/>
-              </a:ext>
-            </a:extLst>
-          </p:cNvPr>
+            <a:endParaRPr lang="en-US" dirty="0"/>
+          </a:p>
+        </p:txBody>
+      </p:sp>
+      <p:sp>
+        <p:nvSpPr>
+          <p:cNvPr id="7" name="Date Placeholder 6"/>
           <p:cNvSpPr>
             <a:spLocks noGrp="1"/>
           </p:cNvSpPr>
@@ -1818,13 +1622,7 @@
       </p:sp>
       <p:sp>
         <p:nvSpPr>
-          <p:cNvPr id="8" name="Нижний колонтитул 7">
-            <a:extLst>
-              <a:ext uri="{FF2B5EF4-FFF2-40B4-BE49-F238E27FC236}">
-                <a16:creationId xmlns:a16="http://schemas.microsoft.com/office/drawing/2014/main" id="{0DA0A3AC-618D-0C47-9F19-E0D54A20A8AA}"/>
-              </a:ext>
-            </a:extLst>
-          </p:cNvPr>
+          <p:cNvPr id="8" name="Footer Placeholder 7"/>
           <p:cNvSpPr>
             <a:spLocks noGrp="1"/>
           </p:cNvSpPr>
@@ -1843,13 +1641,7 @@
       </p:sp>
       <p:sp>
         <p:nvSpPr>
-          <p:cNvPr id="9" name="Номер слайда 8">
-            <a:extLst>
-              <a:ext uri="{FF2B5EF4-FFF2-40B4-BE49-F238E27FC236}">
-                <a16:creationId xmlns:a16="http://schemas.microsoft.com/office/drawing/2014/main" id="{3F2471EF-77DC-3442-945B-7904EAFD1463}"/>
-              </a:ext>
-            </a:extLst>
-          </p:cNvPr>
+          <p:cNvPr id="9" name="Slide Number Placeholder 8"/>
           <p:cNvSpPr>
             <a:spLocks noGrp="1"/>
           </p:cNvSpPr>
@@ -1873,7 +1665,7 @@
     </p:spTree>
     <p:extLst>
       <p:ext uri="{BB962C8B-B14F-4D97-AF65-F5344CB8AC3E}">
-        <p14:creationId xmlns:p14="http://schemas.microsoft.com/office/powerpoint/2010/main" val="2927087169"/>
+        <p14:creationId xmlns:p14="http://schemas.microsoft.com/office/powerpoint/2010/main" val="1815668019"/>
       </p:ext>
     </p:extLst>
   </p:cSld>
@@ -1902,13 +1694,7 @@
       </p:grpSpPr>
       <p:sp>
         <p:nvSpPr>
-          <p:cNvPr id="2" name="Заголовок 1">
-            <a:extLst>
-              <a:ext uri="{FF2B5EF4-FFF2-40B4-BE49-F238E27FC236}">
-                <a16:creationId xmlns:a16="http://schemas.microsoft.com/office/drawing/2014/main" id="{22BB392D-27A1-644A-85AE-772F37AA3B07}"/>
-              </a:ext>
-            </a:extLst>
-          </p:cNvPr>
+          <p:cNvPr id="2" name="Title 1"/>
           <p:cNvSpPr>
             <a:spLocks noGrp="1"/>
           </p:cNvSpPr>
@@ -1925,18 +1711,13 @@
               <a:rPr lang="ru-RU"/>
               <a:t>Образец заголовка</a:t>
             </a:r>
-          </a:p>
-        </p:txBody>
-      </p:sp>
-      <p:sp>
-        <p:nvSpPr>
-          <p:cNvPr id="3" name="Дата 2">
-            <a:extLst>
-              <a:ext uri="{FF2B5EF4-FFF2-40B4-BE49-F238E27FC236}">
-                <a16:creationId xmlns:a16="http://schemas.microsoft.com/office/drawing/2014/main" id="{A61BCFDF-56C1-8548-871E-BBBF2DAAB534}"/>
-              </a:ext>
-            </a:extLst>
-          </p:cNvPr>
+            <a:endParaRPr lang="en-US" dirty="0"/>
+          </a:p>
+        </p:txBody>
+      </p:sp>
+      <p:sp>
+        <p:nvSpPr>
+          <p:cNvPr id="3" name="Date Placeholder 2"/>
           <p:cNvSpPr>
             <a:spLocks noGrp="1"/>
           </p:cNvSpPr>
@@ -1959,13 +1740,7 @@
       </p:sp>
       <p:sp>
         <p:nvSpPr>
-          <p:cNvPr id="4" name="Нижний колонтитул 3">
-            <a:extLst>
-              <a:ext uri="{FF2B5EF4-FFF2-40B4-BE49-F238E27FC236}">
-                <a16:creationId xmlns:a16="http://schemas.microsoft.com/office/drawing/2014/main" id="{24382641-2736-E648-82B2-3671224A12C1}"/>
-              </a:ext>
-            </a:extLst>
-          </p:cNvPr>
+          <p:cNvPr id="4" name="Footer Placeholder 3"/>
           <p:cNvSpPr>
             <a:spLocks noGrp="1"/>
           </p:cNvSpPr>
@@ -1984,13 +1759,7 @@
       </p:sp>
       <p:sp>
         <p:nvSpPr>
-          <p:cNvPr id="5" name="Номер слайда 4">
-            <a:extLst>
-              <a:ext uri="{FF2B5EF4-FFF2-40B4-BE49-F238E27FC236}">
-                <a16:creationId xmlns:a16="http://schemas.microsoft.com/office/drawing/2014/main" id="{3B603CBB-0FB5-D846-91CB-4EC3295FD16C}"/>
-              </a:ext>
-            </a:extLst>
-          </p:cNvPr>
+          <p:cNvPr id="5" name="Slide Number Placeholder 4"/>
           <p:cNvSpPr>
             <a:spLocks noGrp="1"/>
           </p:cNvSpPr>
@@ -2014,7 +1783,7 @@
     </p:spTree>
     <p:extLst>
       <p:ext uri="{BB962C8B-B14F-4D97-AF65-F5344CB8AC3E}">
-        <p14:creationId xmlns:p14="http://schemas.microsoft.com/office/powerpoint/2010/main" val="1123187013"/>
+        <p14:creationId xmlns:p14="http://schemas.microsoft.com/office/powerpoint/2010/main" val="1303882600"/>
       </p:ext>
     </p:extLst>
   </p:cSld>
@@ -2043,13 +1812,7 @@
       </p:grpSpPr>
       <p:sp>
         <p:nvSpPr>
-          <p:cNvPr id="2" name="Дата 1">
-            <a:extLst>
-              <a:ext uri="{FF2B5EF4-FFF2-40B4-BE49-F238E27FC236}">
-                <a16:creationId xmlns:a16="http://schemas.microsoft.com/office/drawing/2014/main" id="{9D55D9B7-1A46-6745-ADCF-16BABC2AE4F5}"/>
-              </a:ext>
-            </a:extLst>
-          </p:cNvPr>
+          <p:cNvPr id="2" name="Date Placeholder 1"/>
           <p:cNvSpPr>
             <a:spLocks noGrp="1"/>
           </p:cNvSpPr>
@@ -2072,13 +1835,7 @@
       </p:sp>
       <p:sp>
         <p:nvSpPr>
-          <p:cNvPr id="3" name="Нижний колонтитул 2">
-            <a:extLst>
-              <a:ext uri="{FF2B5EF4-FFF2-40B4-BE49-F238E27FC236}">
-                <a16:creationId xmlns:a16="http://schemas.microsoft.com/office/drawing/2014/main" id="{5F3CCAE9-357C-4743-A7C6-7F93D8483CAC}"/>
-              </a:ext>
-            </a:extLst>
-          </p:cNvPr>
+          <p:cNvPr id="3" name="Footer Placeholder 2"/>
           <p:cNvSpPr>
             <a:spLocks noGrp="1"/>
           </p:cNvSpPr>
@@ -2097,13 +1854,7 @@
       </p:sp>
       <p:sp>
         <p:nvSpPr>
-          <p:cNvPr id="4" name="Номер слайда 3">
-            <a:extLst>
-              <a:ext uri="{FF2B5EF4-FFF2-40B4-BE49-F238E27FC236}">
-                <a16:creationId xmlns:a16="http://schemas.microsoft.com/office/drawing/2014/main" id="{9629652F-5FCB-E44D-961B-E7D32B1D6352}"/>
-              </a:ext>
-            </a:extLst>
-          </p:cNvPr>
+          <p:cNvPr id="4" name="Slide Number Placeholder 3"/>
           <p:cNvSpPr>
             <a:spLocks noGrp="1"/>
           </p:cNvSpPr>
@@ -2127,7 +1878,7 @@
     </p:spTree>
     <p:extLst>
       <p:ext uri="{BB962C8B-B14F-4D97-AF65-F5344CB8AC3E}">
-        <p14:creationId xmlns:p14="http://schemas.microsoft.com/office/powerpoint/2010/main" val="4045688113"/>
+        <p14:creationId xmlns:p14="http://schemas.microsoft.com/office/powerpoint/2010/main" val="3313737395"/>
       </p:ext>
     </p:extLst>
   </p:cSld>
@@ -2156,13 +1907,7 @@
       </p:grpSpPr>
       <p:sp>
         <p:nvSpPr>
-          <p:cNvPr id="2" name="Заголовок 1">
-            <a:extLst>
-              <a:ext uri="{FF2B5EF4-FFF2-40B4-BE49-F238E27FC236}">
-                <a16:creationId xmlns:a16="http://schemas.microsoft.com/office/drawing/2014/main" id="{F34371EE-9C97-3441-9E69-A7F0E6609263}"/>
-              </a:ext>
-            </a:extLst>
-          </p:cNvPr>
+          <p:cNvPr id="2" name="Title 1"/>
           <p:cNvSpPr>
             <a:spLocks noGrp="1"/>
           </p:cNvSpPr>
@@ -2188,18 +1933,13 @@
               <a:rPr lang="ru-RU"/>
               <a:t>Образец заголовка</a:t>
             </a:r>
-          </a:p>
-        </p:txBody>
-      </p:sp>
-      <p:sp>
-        <p:nvSpPr>
-          <p:cNvPr id="3" name="Объект 2">
-            <a:extLst>
-              <a:ext uri="{FF2B5EF4-FFF2-40B4-BE49-F238E27FC236}">
-                <a16:creationId xmlns:a16="http://schemas.microsoft.com/office/drawing/2014/main" id="{092B4AB2-0EDB-E247-8C79-A94DF89D3E1A}"/>
-              </a:ext>
-            </a:extLst>
-          </p:cNvPr>
+            <a:endParaRPr lang="en-US" dirty="0"/>
+          </a:p>
+        </p:txBody>
+      </p:sp>
+      <p:sp>
+        <p:nvSpPr>
+          <p:cNvPr id="3" name="Content Placeholder 2"/>
           <p:cNvSpPr>
             <a:spLocks noGrp="1"/>
           </p:cNvSpPr>
@@ -2278,18 +2018,13 @@
               <a:rPr lang="ru-RU"/>
               <a:t>Пятый уровень</a:t>
             </a:r>
-          </a:p>
-        </p:txBody>
-      </p:sp>
-      <p:sp>
-        <p:nvSpPr>
-          <p:cNvPr id="4" name="Текст 3">
-            <a:extLst>
-              <a:ext uri="{FF2B5EF4-FFF2-40B4-BE49-F238E27FC236}">
-                <a16:creationId xmlns:a16="http://schemas.microsoft.com/office/drawing/2014/main" id="{04E29412-6A2F-D544-87D7-C74091A5F01C}"/>
-              </a:ext>
-            </a:extLst>
-          </p:cNvPr>
+            <a:endParaRPr lang="en-US" dirty="0"/>
+          </a:p>
+        </p:txBody>
+      </p:sp>
+      <p:sp>
+        <p:nvSpPr>
+          <p:cNvPr id="4" name="Text Placeholder 3"/>
           <p:cNvSpPr>
             <a:spLocks noGrp="1"/>
           </p:cNvSpPr>
@@ -2354,13 +2089,7 @@
       </p:sp>
       <p:sp>
         <p:nvSpPr>
-          <p:cNvPr id="5" name="Дата 4">
-            <a:extLst>
-              <a:ext uri="{FF2B5EF4-FFF2-40B4-BE49-F238E27FC236}">
-                <a16:creationId xmlns:a16="http://schemas.microsoft.com/office/drawing/2014/main" id="{2A15A3DF-2C7C-E34E-A47C-CD444D6D5A1F}"/>
-              </a:ext>
-            </a:extLst>
-          </p:cNvPr>
+          <p:cNvPr id="5" name="Date Placeholder 4"/>
           <p:cNvSpPr>
             <a:spLocks noGrp="1"/>
           </p:cNvSpPr>
@@ -2383,13 +2112,7 @@
       </p:sp>
       <p:sp>
         <p:nvSpPr>
-          <p:cNvPr id="6" name="Нижний колонтитул 5">
-            <a:extLst>
-              <a:ext uri="{FF2B5EF4-FFF2-40B4-BE49-F238E27FC236}">
-                <a16:creationId xmlns:a16="http://schemas.microsoft.com/office/drawing/2014/main" id="{253ED3D1-5DD6-914E-96E9-2C4BE41027E8}"/>
-              </a:ext>
-            </a:extLst>
-          </p:cNvPr>
+          <p:cNvPr id="6" name="Footer Placeholder 5"/>
           <p:cNvSpPr>
             <a:spLocks noGrp="1"/>
           </p:cNvSpPr>
@@ -2408,13 +2131,7 @@
       </p:sp>
       <p:sp>
         <p:nvSpPr>
-          <p:cNvPr id="7" name="Номер слайда 6">
-            <a:extLst>
-              <a:ext uri="{FF2B5EF4-FFF2-40B4-BE49-F238E27FC236}">
-                <a16:creationId xmlns:a16="http://schemas.microsoft.com/office/drawing/2014/main" id="{1B7A930E-249A-D847-A960-1A5A28B253DC}"/>
-              </a:ext>
-            </a:extLst>
-          </p:cNvPr>
+          <p:cNvPr id="7" name="Slide Number Placeholder 6"/>
           <p:cNvSpPr>
             <a:spLocks noGrp="1"/>
           </p:cNvSpPr>
@@ -2438,7 +2155,7 @@
     </p:spTree>
     <p:extLst>
       <p:ext uri="{BB962C8B-B14F-4D97-AF65-F5344CB8AC3E}">
-        <p14:creationId xmlns:p14="http://schemas.microsoft.com/office/powerpoint/2010/main" val="306322202"/>
+        <p14:creationId xmlns:p14="http://schemas.microsoft.com/office/powerpoint/2010/main" val="538649295"/>
       </p:ext>
     </p:extLst>
   </p:cSld>
@@ -2467,13 +2184,7 @@
       </p:grpSpPr>
       <p:sp>
         <p:nvSpPr>
-          <p:cNvPr id="2" name="Заголовок 1">
-            <a:extLst>
-              <a:ext uri="{FF2B5EF4-FFF2-40B4-BE49-F238E27FC236}">
-                <a16:creationId xmlns:a16="http://schemas.microsoft.com/office/drawing/2014/main" id="{6B268327-62C7-F142-90F3-9A1FA482CF70}"/>
-              </a:ext>
-            </a:extLst>
-          </p:cNvPr>
+          <p:cNvPr id="2" name="Title 1"/>
           <p:cNvSpPr>
             <a:spLocks noGrp="1"/>
           </p:cNvSpPr>
@@ -2499,20 +2210,15 @@
               <a:rPr lang="ru-RU"/>
               <a:t>Образец заголовка</a:t>
             </a:r>
-          </a:p>
-        </p:txBody>
-      </p:sp>
-      <p:sp>
-        <p:nvSpPr>
-          <p:cNvPr id="3" name="Рисунок 2">
-            <a:extLst>
-              <a:ext uri="{FF2B5EF4-FFF2-40B4-BE49-F238E27FC236}">
-                <a16:creationId xmlns:a16="http://schemas.microsoft.com/office/drawing/2014/main" id="{9202EBDF-6CBD-314D-9B68-7212BE532524}"/>
-              </a:ext>
-            </a:extLst>
-          </p:cNvPr>
-          <p:cNvSpPr>
-            <a:spLocks noGrp="1"/>
+            <a:endParaRPr lang="en-US" dirty="0"/>
+          </a:p>
+        </p:txBody>
+      </p:sp>
+      <p:sp>
+        <p:nvSpPr>
+          <p:cNvPr id="3" name="Picture Placeholder 2"/>
+          <p:cNvSpPr>
+            <a:spLocks noGrp="1" noChangeAspect="1"/>
           </p:cNvSpPr>
           <p:nvPr>
             <p:ph type="pic" idx="1"/>
@@ -2525,7 +2231,7 @@
           </a:xfrm>
         </p:spPr>
         <p:txBody>
-          <a:bodyPr/>
+          <a:bodyPr anchor="t"/>
           <a:lstStyle>
             <a:lvl1pPr marL="0" indent="0">
               <a:buNone/>
@@ -2565,19 +2271,17 @@
             </a:lvl9pPr>
           </a:lstStyle>
           <a:p>
-            <a:endParaRPr lang="ru-RU"/>
-          </a:p>
-        </p:txBody>
-      </p:sp>
-      <p:sp>
-        <p:nvSpPr>
-          <p:cNvPr id="4" name="Текст 3">
-            <a:extLst>
-              <a:ext uri="{FF2B5EF4-FFF2-40B4-BE49-F238E27FC236}">
-                <a16:creationId xmlns:a16="http://schemas.microsoft.com/office/drawing/2014/main" id="{CE0EAC74-B1F6-2747-A31C-E3B88EB46EA7}"/>
-              </a:ext>
-            </a:extLst>
-          </p:cNvPr>
+            <a:r>
+              <a:rPr lang="ru-RU"/>
+              <a:t>Вставка рисунка</a:t>
+            </a:r>
+            <a:endParaRPr lang="en-US" dirty="0"/>
+          </a:p>
+        </p:txBody>
+      </p:sp>
+      <p:sp>
+        <p:nvSpPr>
+          <p:cNvPr id="4" name="Text Placeholder 3"/>
           <p:cNvSpPr>
             <a:spLocks noGrp="1"/>
           </p:cNvSpPr>
@@ -2642,13 +2346,7 @@
       </p:sp>
       <p:sp>
         <p:nvSpPr>
-          <p:cNvPr id="5" name="Дата 4">
-            <a:extLst>
-              <a:ext uri="{FF2B5EF4-FFF2-40B4-BE49-F238E27FC236}">
-                <a16:creationId xmlns:a16="http://schemas.microsoft.com/office/drawing/2014/main" id="{BBAE328E-DA0C-5943-9BD1-C780DF630DDD}"/>
-              </a:ext>
-            </a:extLst>
-          </p:cNvPr>
+          <p:cNvPr id="5" name="Date Placeholder 4"/>
           <p:cNvSpPr>
             <a:spLocks noGrp="1"/>
           </p:cNvSpPr>
@@ -2671,13 +2369,7 @@
       </p:sp>
       <p:sp>
         <p:nvSpPr>
-          <p:cNvPr id="6" name="Нижний колонтитул 5">
-            <a:extLst>
-              <a:ext uri="{FF2B5EF4-FFF2-40B4-BE49-F238E27FC236}">
-                <a16:creationId xmlns:a16="http://schemas.microsoft.com/office/drawing/2014/main" id="{6F8820C3-F34A-3146-85B1-83C04C82E753}"/>
-              </a:ext>
-            </a:extLst>
-          </p:cNvPr>
+          <p:cNvPr id="6" name="Footer Placeholder 5"/>
           <p:cNvSpPr>
             <a:spLocks noGrp="1"/>
           </p:cNvSpPr>
@@ -2696,13 +2388,7 @@
       </p:sp>
       <p:sp>
         <p:nvSpPr>
-          <p:cNvPr id="7" name="Номер слайда 6">
-            <a:extLst>
-              <a:ext uri="{FF2B5EF4-FFF2-40B4-BE49-F238E27FC236}">
-                <a16:creationId xmlns:a16="http://schemas.microsoft.com/office/drawing/2014/main" id="{BF057B7B-9622-E94D-8807-DE526F22B95E}"/>
-              </a:ext>
-            </a:extLst>
-          </p:cNvPr>
+          <p:cNvPr id="7" name="Slide Number Placeholder 6"/>
           <p:cNvSpPr>
             <a:spLocks noGrp="1"/>
           </p:cNvSpPr>
@@ -2726,7 +2412,7 @@
     </p:spTree>
     <p:extLst>
       <p:ext uri="{BB962C8B-B14F-4D97-AF65-F5344CB8AC3E}">
-        <p14:creationId xmlns:p14="http://schemas.microsoft.com/office/powerpoint/2010/main" val="1758904748"/>
+        <p14:creationId xmlns:p14="http://schemas.microsoft.com/office/powerpoint/2010/main" val="3900073104"/>
       </p:ext>
     </p:extLst>
   </p:cSld>
@@ -2760,13 +2446,7 @@
       </p:grpSpPr>
       <p:sp>
         <p:nvSpPr>
-          <p:cNvPr id="2" name="Заголовок 1">
-            <a:extLst>
-              <a:ext uri="{FF2B5EF4-FFF2-40B4-BE49-F238E27FC236}">
-                <a16:creationId xmlns:a16="http://schemas.microsoft.com/office/drawing/2014/main" id="{63A2E737-CEE8-3F47-82C1-B84547EB58B4}"/>
-              </a:ext>
-            </a:extLst>
-          </p:cNvPr>
+          <p:cNvPr id="2" name="Title Placeholder 1"/>
           <p:cNvSpPr>
             <a:spLocks noGrp="1"/>
           </p:cNvSpPr>
@@ -2793,18 +2473,13 @@
               <a:rPr lang="ru-RU"/>
               <a:t>Образец заголовка</a:t>
             </a:r>
-          </a:p>
-        </p:txBody>
-      </p:sp>
-      <p:sp>
-        <p:nvSpPr>
-          <p:cNvPr id="3" name="Текст 2">
-            <a:extLst>
-              <a:ext uri="{FF2B5EF4-FFF2-40B4-BE49-F238E27FC236}">
-                <a16:creationId xmlns:a16="http://schemas.microsoft.com/office/drawing/2014/main" id="{F99B2649-4234-0F45-BE7B-1E0A60D9222B}"/>
-              </a:ext>
-            </a:extLst>
-          </p:cNvPr>
+            <a:endParaRPr lang="en-US" dirty="0"/>
+          </a:p>
+        </p:txBody>
+      </p:sp>
+      <p:sp>
+        <p:nvSpPr>
+          <p:cNvPr id="3" name="Text Placeholder 2"/>
           <p:cNvSpPr>
             <a:spLocks noGrp="1"/>
           </p:cNvSpPr>
@@ -2860,18 +2535,13 @@
               <a:rPr lang="ru-RU"/>
               <a:t>Пятый уровень</a:t>
             </a:r>
-          </a:p>
-        </p:txBody>
-      </p:sp>
-      <p:sp>
-        <p:nvSpPr>
-          <p:cNvPr id="4" name="Дата 3">
-            <a:extLst>
-              <a:ext uri="{FF2B5EF4-FFF2-40B4-BE49-F238E27FC236}">
-                <a16:creationId xmlns:a16="http://schemas.microsoft.com/office/drawing/2014/main" id="{24ABB0A5-3232-9A4E-B3BE-09250C651EB4}"/>
-              </a:ext>
-            </a:extLst>
-          </p:cNvPr>
+            <a:endParaRPr lang="en-US" dirty="0"/>
+          </a:p>
+        </p:txBody>
+      </p:sp>
+      <p:sp>
+        <p:nvSpPr>
+          <p:cNvPr id="4" name="Date Placeholder 3"/>
           <p:cNvSpPr>
             <a:spLocks noGrp="1"/>
           </p:cNvSpPr>
@@ -2912,13 +2582,7 @@
       </p:sp>
       <p:sp>
         <p:nvSpPr>
-          <p:cNvPr id="5" name="Нижний колонтитул 4">
-            <a:extLst>
-              <a:ext uri="{FF2B5EF4-FFF2-40B4-BE49-F238E27FC236}">
-                <a16:creationId xmlns:a16="http://schemas.microsoft.com/office/drawing/2014/main" id="{8939E381-F8A0-E143-8327-65CE1B74CF5D}"/>
-              </a:ext>
-            </a:extLst>
-          </p:cNvPr>
+          <p:cNvPr id="5" name="Footer Placeholder 4"/>
           <p:cNvSpPr>
             <a:spLocks noGrp="1"/>
           </p:cNvSpPr>
@@ -2955,13 +2619,7 @@
       </p:sp>
       <p:sp>
         <p:nvSpPr>
-          <p:cNvPr id="6" name="Номер слайда 5">
-            <a:extLst>
-              <a:ext uri="{FF2B5EF4-FFF2-40B4-BE49-F238E27FC236}">
-                <a16:creationId xmlns:a16="http://schemas.microsoft.com/office/drawing/2014/main" id="{47A31706-94ED-EA45-9BE8-70CB14ED3850}"/>
-              </a:ext>
-            </a:extLst>
-          </p:cNvPr>
+          <p:cNvPr id="6" name="Slide Number Placeholder 5"/>
           <p:cNvSpPr>
             <a:spLocks noGrp="1"/>
           </p:cNvSpPr>
@@ -3003,23 +2661,23 @@
     </p:spTree>
     <p:extLst>
       <p:ext uri="{BB962C8B-B14F-4D97-AF65-F5344CB8AC3E}">
-        <p14:creationId xmlns:p14="http://schemas.microsoft.com/office/powerpoint/2010/main" val="3450700935"/>
+        <p14:creationId xmlns:p14="http://schemas.microsoft.com/office/powerpoint/2010/main" val="2461716210"/>
       </p:ext>
     </p:extLst>
   </p:cSld>
-  <p:clrMap bg1="lt1" tx1="dk1" bg2="lt2" tx2="dk2" accent1="accent1" accent2="accent2" accent3="accent3" accent4="accent4" accent5="accent5" accent6="accent6" hlink="hlink" folHlink="folHlink"/>
+  <p:clrMap bg1="dk1" tx1="lt1" bg2="dk2" tx2="lt2" accent1="accent1" accent2="accent2" accent3="accent3" accent4="accent4" accent5="accent5" accent6="accent6" hlink="hlink" folHlink="folHlink"/>
   <p:sldLayoutIdLst>
-    <p:sldLayoutId id="2147483649" r:id="rId1"/>
-    <p:sldLayoutId id="2147483650" r:id="rId2"/>
-    <p:sldLayoutId id="2147483651" r:id="rId3"/>
-    <p:sldLayoutId id="2147483652" r:id="rId4"/>
-    <p:sldLayoutId id="2147483653" r:id="rId5"/>
-    <p:sldLayoutId id="2147483654" r:id="rId6"/>
-    <p:sldLayoutId id="2147483655" r:id="rId7"/>
-    <p:sldLayoutId id="2147483656" r:id="rId8"/>
-    <p:sldLayoutId id="2147483657" r:id="rId9"/>
-    <p:sldLayoutId id="2147483658" r:id="rId10"/>
-    <p:sldLayoutId id="2147483659" r:id="rId11"/>
+    <p:sldLayoutId id="2147483685" r:id="rId1"/>
+    <p:sldLayoutId id="2147483686" r:id="rId2"/>
+    <p:sldLayoutId id="2147483687" r:id="rId3"/>
+    <p:sldLayoutId id="2147483688" r:id="rId4"/>
+    <p:sldLayoutId id="2147483689" r:id="rId5"/>
+    <p:sldLayoutId id="2147483690" r:id="rId6"/>
+    <p:sldLayoutId id="2147483691" r:id="rId7"/>
+    <p:sldLayoutId id="2147483692" r:id="rId8"/>
+    <p:sldLayoutId id="2147483693" r:id="rId9"/>
+    <p:sldLayoutId id="2147483694" r:id="rId10"/>
+    <p:sldLayoutId id="2147483695" r:id="rId11"/>
   </p:sldLayoutIdLst>
   <p:txStyles>
     <p:titleStyle>
@@ -3207,7 +2865,7 @@
     </p:bodyStyle>
     <p:otherStyle>
       <a:defPPr>
-        <a:defRPr lang="ru-RU"/>
+        <a:defRPr lang="en-US"/>
       </a:defPPr>
       <a:lvl1pPr marL="0" algn="l" defTabSz="914400" rtl="0" eaLnBrk="1" latinLnBrk="0" hangingPunct="1">
         <a:defRPr sz="1800" kern="1200">
@@ -3342,7 +3000,19 @@
           <a:bodyPr/>
           <a:lstStyle/>
           <a:p>
-            <a:endParaRPr lang="ru-RU"/>
+            <a:r>
+              <a:rPr lang="en-US" dirty="0" err="1">
+                <a:solidFill>
+                  <a:srgbClr val="7030A0"/>
+                </a:solidFill>
+              </a:rPr>
+              <a:t>SnapKit</a:t>
+            </a:r>
+            <a:endParaRPr lang="ru-RU" dirty="0">
+              <a:solidFill>
+                <a:srgbClr val="7030A0"/>
+              </a:solidFill>
+            </a:endParaRPr>
           </a:p>
         </p:txBody>
       </p:sp>
@@ -3384,10 +3054,746 @@
 </p:sld>
 </file>
 
+<file path=ppt/slides/slide2.xml><?xml version="1.0" encoding="utf-8"?>
+<p:sld xmlns:a="http://schemas.openxmlformats.org/drawingml/2006/main" xmlns:r="http://schemas.openxmlformats.org/officeDocument/2006/relationships" xmlns:p="http://schemas.openxmlformats.org/presentationml/2006/main">
+  <p:cSld>
+    <p:spTree>
+      <p:nvGrpSpPr>
+        <p:cNvPr id="1" name=""/>
+        <p:cNvGrpSpPr/>
+        <p:nvPr/>
+      </p:nvGrpSpPr>
+      <p:grpSpPr>
+        <a:xfrm>
+          <a:off x="0" y="0"/>
+          <a:ext cx="0" cy="0"/>
+          <a:chOff x="0" y="0"/>
+          <a:chExt cx="0" cy="0"/>
+        </a:xfrm>
+      </p:grpSpPr>
+      <p:sp>
+        <p:nvSpPr>
+          <p:cNvPr id="2" name="Заголовок 1">
+            <a:extLst>
+              <a:ext uri="{FF2B5EF4-FFF2-40B4-BE49-F238E27FC236}">
+                <a16:creationId xmlns:a16="http://schemas.microsoft.com/office/drawing/2014/main" id="{FF67E344-C32A-6C4C-AD31-892F80E93598}"/>
+              </a:ext>
+            </a:extLst>
+          </p:cNvPr>
+          <p:cNvSpPr>
+            <a:spLocks noGrp="1"/>
+          </p:cNvSpPr>
+          <p:nvPr>
+            <p:ph type="title"/>
+          </p:nvPr>
+        </p:nvSpPr>
+        <p:spPr/>
+        <p:txBody>
+          <a:bodyPr/>
+          <a:lstStyle/>
+          <a:p>
+            <a:r>
+              <a:rPr lang="ru-RU" dirty="0">
+                <a:solidFill>
+                  <a:srgbClr val="7030A0"/>
+                </a:solidFill>
+              </a:rPr>
+              <a:t>Описание</a:t>
+            </a:r>
+          </a:p>
+        </p:txBody>
+      </p:sp>
+      <p:sp>
+        <p:nvSpPr>
+          <p:cNvPr id="3" name="Объект 2">
+            <a:extLst>
+              <a:ext uri="{FF2B5EF4-FFF2-40B4-BE49-F238E27FC236}">
+                <a16:creationId xmlns:a16="http://schemas.microsoft.com/office/drawing/2014/main" id="{81CF8EC4-2A91-AD47-B03A-B8A9B7E7E433}"/>
+              </a:ext>
+            </a:extLst>
+          </p:cNvPr>
+          <p:cNvSpPr>
+            <a:spLocks noGrp="1"/>
+          </p:cNvSpPr>
+          <p:nvPr>
+            <p:ph idx="1"/>
+          </p:nvPr>
+        </p:nvSpPr>
+        <p:spPr/>
+        <p:txBody>
+          <a:bodyPr>
+            <a:normAutofit fontScale="92500" lnSpcReduction="10000"/>
+          </a:bodyPr>
+          <a:lstStyle/>
+          <a:p>
+            <a:pPr algn="l"/>
+            <a:r>
+              <a:rPr lang="en" i="0" u="none" strike="noStrike" dirty="0" err="1">
+                <a:solidFill>
+                  <a:srgbClr val="FFFF00"/>
+                </a:solidFill>
+                <a:effectLst/>
+              </a:rPr>
+              <a:t>SnapKit</a:t>
+            </a:r>
+            <a:r>
+              <a:rPr lang="en" i="0" u="none" strike="noStrike" dirty="0">
+                <a:solidFill>
+                  <a:srgbClr val="FFFF00"/>
+                </a:solidFill>
+                <a:effectLst/>
+              </a:rPr>
+              <a:t> — </a:t>
+            </a:r>
+            <a:r>
+              <a:rPr lang="ru-RU" i="0" u="none" strike="noStrike" dirty="0">
+                <a:solidFill>
+                  <a:srgbClr val="FFFF00"/>
+                </a:solidFill>
+                <a:effectLst/>
+              </a:rPr>
+              <a:t>легковесный </a:t>
+            </a:r>
+            <a:r>
+              <a:rPr lang="en" i="0" u="none" strike="noStrike" dirty="0">
+                <a:solidFill>
+                  <a:srgbClr val="FFFF00"/>
+                </a:solidFill>
+                <a:effectLst/>
+              </a:rPr>
+              <a:t>DSL (</a:t>
+            </a:r>
+            <a:r>
+              <a:rPr lang="ru-RU" i="0" u="none" strike="noStrike" dirty="0">
+                <a:solidFill>
+                  <a:srgbClr val="FFFF00"/>
+                </a:solidFill>
+                <a:effectLst/>
+              </a:rPr>
+              <a:t>предметно-ориентированный язык), который упрощает работу с </a:t>
+            </a:r>
+            <a:r>
+              <a:rPr lang="en" i="0" u="none" strike="noStrike" dirty="0">
+                <a:solidFill>
+                  <a:srgbClr val="FFFF00"/>
+                </a:solidFill>
+                <a:effectLst/>
+              </a:rPr>
+              <a:t>Auto Layout </a:t>
+            </a:r>
+            <a:r>
+              <a:rPr lang="ru-RU" i="0" u="none" strike="noStrike" dirty="0">
+                <a:solidFill>
+                  <a:srgbClr val="FFFF00"/>
+                </a:solidFill>
+                <a:effectLst/>
+              </a:rPr>
+              <a:t>и ограничениями.</a:t>
+            </a:r>
+            <a:r>
+              <a:rPr lang="ru-RU" i="0" u="none" strike="noStrike" dirty="0">
+                <a:effectLst/>
+              </a:rPr>
+              <a:t> </a:t>
+            </a:r>
+          </a:p>
+          <a:p>
+            <a:pPr algn="l"/>
+            <a:r>
+              <a:rPr lang="ru-RU" i="0" u="none" strike="noStrike" dirty="0">
+                <a:effectLst/>
+              </a:rPr>
+              <a:t>Это </a:t>
+            </a:r>
+            <a:r>
+              <a:rPr lang="ru-RU" i="0" u="none" strike="noStrike" dirty="0">
+                <a:solidFill>
+                  <a:srgbClr val="FFFF00"/>
+                </a:solidFill>
+                <a:effectLst/>
+              </a:rPr>
+              <a:t>инструмент для </a:t>
+            </a:r>
+            <a:r>
+              <a:rPr lang="en" i="0" u="none" strike="noStrike" dirty="0">
+                <a:solidFill>
+                  <a:srgbClr val="FFFF00"/>
+                </a:solidFill>
+                <a:effectLst/>
+              </a:rPr>
+              <a:t>frontend </a:t>
+            </a:r>
+            <a:r>
+              <a:rPr lang="ru-RU" i="0" u="none" strike="noStrike" dirty="0">
+                <a:solidFill>
+                  <a:srgbClr val="FFFF00"/>
+                </a:solidFill>
+                <a:effectLst/>
+              </a:rPr>
+              <a:t>разработчиков, </a:t>
+            </a:r>
+            <a:r>
+              <a:rPr lang="ru-RU" i="0" u="none" strike="noStrike" dirty="0">
+                <a:effectLst/>
+              </a:rPr>
+              <a:t>значительно </a:t>
+            </a:r>
+            <a:r>
+              <a:rPr lang="ru-RU" i="0" u="none" strike="noStrike" dirty="0">
+                <a:solidFill>
+                  <a:srgbClr val="FFFF00"/>
+                </a:solidFill>
+                <a:effectLst/>
+              </a:rPr>
+              <a:t>облегчающий создание макета</a:t>
+            </a:r>
+            <a:r>
+              <a:rPr lang="ru-RU" i="0" u="none" strike="noStrike" dirty="0">
+                <a:effectLst/>
+              </a:rPr>
+              <a:t> страниц вашего </a:t>
+            </a:r>
+            <a:r>
+              <a:rPr lang="en" i="0" u="none" strike="noStrike" dirty="0">
+                <a:solidFill>
+                  <a:srgbClr val="FFFF00"/>
+                </a:solidFill>
+                <a:effectLst/>
+              </a:rPr>
+              <a:t>Swift-</a:t>
+            </a:r>
+            <a:r>
+              <a:rPr lang="ru-RU" i="0" u="none" strike="noStrike" dirty="0">
+                <a:solidFill>
+                  <a:srgbClr val="FFFF00"/>
+                </a:solidFill>
+                <a:effectLst/>
+              </a:rPr>
+              <a:t>приложения </a:t>
+            </a:r>
+            <a:r>
+              <a:rPr lang="ru-RU" i="0" u="none" strike="noStrike" dirty="0">
+                <a:effectLst/>
+              </a:rPr>
+              <a:t>для </a:t>
+            </a:r>
+            <a:r>
+              <a:rPr lang="en" i="0" u="none" strike="noStrike" dirty="0">
+                <a:effectLst/>
+              </a:rPr>
+              <a:t>iOS </a:t>
+            </a:r>
+            <a:r>
+              <a:rPr lang="ru-RU" i="0" u="none" strike="noStrike" dirty="0">
+                <a:effectLst/>
+              </a:rPr>
+              <a:t>или </a:t>
+            </a:r>
+            <a:r>
+              <a:rPr lang="en" i="0" u="none" strike="noStrike" dirty="0">
+                <a:effectLst/>
+              </a:rPr>
+              <a:t>MacOS. </a:t>
+            </a:r>
+            <a:endParaRPr lang="ru-RU" i="0" u="none" strike="noStrike" dirty="0">
+              <a:effectLst/>
+            </a:endParaRPr>
+          </a:p>
+          <a:p>
+            <a:pPr marL="0" indent="0" algn="l">
+              <a:buNone/>
+            </a:pPr>
+            <a:endParaRPr lang="ru-RU" i="0" u="none" strike="noStrike" dirty="0">
+              <a:effectLst/>
+            </a:endParaRPr>
+          </a:p>
+          <a:p>
+            <a:pPr algn="l"/>
+            <a:r>
+              <a:rPr lang="ru-RU" i="0" u="none" strike="noStrike" dirty="0">
+                <a:effectLst/>
+              </a:rPr>
+              <a:t>Сам по себе </a:t>
+            </a:r>
+            <a:r>
+              <a:rPr lang="en" i="0" u="none" strike="noStrike" dirty="0">
+                <a:solidFill>
+                  <a:srgbClr val="FFFF00"/>
+                </a:solidFill>
+                <a:effectLst/>
+              </a:rPr>
+              <a:t>Auto Layout</a:t>
+            </a:r>
+            <a:r>
+              <a:rPr lang="en" i="0" u="none" strike="noStrike" dirty="0">
+                <a:effectLst/>
+              </a:rPr>
+              <a:t> — </a:t>
+            </a:r>
+            <a:r>
+              <a:rPr lang="ru-RU" i="0" u="none" strike="noStrike" dirty="0">
+                <a:effectLst/>
+              </a:rPr>
+              <a:t>крутой и мощный </a:t>
+            </a:r>
+            <a:r>
+              <a:rPr lang="ru-RU" i="0" u="none" strike="noStrike" dirty="0">
+                <a:solidFill>
+                  <a:srgbClr val="FFFF00"/>
+                </a:solidFill>
+                <a:effectLst/>
+              </a:rPr>
+              <a:t>инструмент для описания взаимосвязей между представлениями и их иерархиями</a:t>
+            </a:r>
+            <a:r>
+              <a:rPr lang="ru-RU" i="0" u="none" strike="noStrike" dirty="0">
+                <a:effectLst/>
+              </a:rPr>
+              <a:t>, но при этом довольно сложный и не интуитивный.</a:t>
+            </a:r>
+          </a:p>
+          <a:p>
+            <a:pPr marL="0" indent="0">
+              <a:buNone/>
+            </a:pPr>
+            <a:br>
+              <a:rPr lang="ru-RU" dirty="0"/>
+            </a:br>
+            <a:endParaRPr lang="ru-RU" dirty="0"/>
+          </a:p>
+        </p:txBody>
+      </p:sp>
+    </p:spTree>
+    <p:extLst>
+      <p:ext uri="{BB962C8B-B14F-4D97-AF65-F5344CB8AC3E}">
+        <p14:creationId xmlns:p14="http://schemas.microsoft.com/office/powerpoint/2010/main" val="890085249"/>
+      </p:ext>
+    </p:extLst>
+  </p:cSld>
+  <p:clrMapOvr>
+    <a:masterClrMapping/>
+  </p:clrMapOvr>
+</p:sld>
+</file>
+
+<file path=ppt/slides/slide3.xml><?xml version="1.0" encoding="utf-8"?>
+<p:sld xmlns:a="http://schemas.openxmlformats.org/drawingml/2006/main" xmlns:r="http://schemas.openxmlformats.org/officeDocument/2006/relationships" xmlns:p="http://schemas.openxmlformats.org/presentationml/2006/main">
+  <p:cSld>
+    <p:spTree>
+      <p:nvGrpSpPr>
+        <p:cNvPr id="1" name=""/>
+        <p:cNvGrpSpPr/>
+        <p:nvPr/>
+      </p:nvGrpSpPr>
+      <p:grpSpPr>
+        <a:xfrm>
+          <a:off x="0" y="0"/>
+          <a:ext cx="0" cy="0"/>
+          <a:chOff x="0" y="0"/>
+          <a:chExt cx="0" cy="0"/>
+        </a:xfrm>
+      </p:grpSpPr>
+      <p:sp>
+        <p:nvSpPr>
+          <p:cNvPr id="2" name="Заголовок 1">
+            <a:extLst>
+              <a:ext uri="{FF2B5EF4-FFF2-40B4-BE49-F238E27FC236}">
+                <a16:creationId xmlns:a16="http://schemas.microsoft.com/office/drawing/2014/main" id="{3E02A369-E4B6-F849-827C-A75347E2A056}"/>
+              </a:ext>
+            </a:extLst>
+          </p:cNvPr>
+          <p:cNvSpPr>
+            <a:spLocks noGrp="1"/>
+          </p:cNvSpPr>
+          <p:nvPr>
+            <p:ph type="title"/>
+          </p:nvPr>
+        </p:nvSpPr>
+        <p:spPr/>
+        <p:txBody>
+          <a:bodyPr/>
+          <a:lstStyle/>
+          <a:p>
+            <a:endParaRPr lang="ru-RU"/>
+          </a:p>
+        </p:txBody>
+      </p:sp>
+      <p:sp>
+        <p:nvSpPr>
+          <p:cNvPr id="3" name="Объект 2">
+            <a:extLst>
+              <a:ext uri="{FF2B5EF4-FFF2-40B4-BE49-F238E27FC236}">
+                <a16:creationId xmlns:a16="http://schemas.microsoft.com/office/drawing/2014/main" id="{4D18E3B6-33F3-504D-9599-4C2A20687BF3}"/>
+              </a:ext>
+            </a:extLst>
+          </p:cNvPr>
+          <p:cNvSpPr>
+            <a:spLocks noGrp="1"/>
+          </p:cNvSpPr>
+          <p:nvPr>
+            <p:ph idx="1"/>
+          </p:nvPr>
+        </p:nvSpPr>
+        <p:spPr/>
+        <p:txBody>
+          <a:bodyPr/>
+          <a:lstStyle/>
+          <a:p>
+            <a:endParaRPr lang="ru-RU"/>
+          </a:p>
+        </p:txBody>
+      </p:sp>
+    </p:spTree>
+    <p:extLst>
+      <p:ext uri="{BB962C8B-B14F-4D97-AF65-F5344CB8AC3E}">
+        <p14:creationId xmlns:p14="http://schemas.microsoft.com/office/powerpoint/2010/main" val="993302789"/>
+      </p:ext>
+    </p:extLst>
+  </p:cSld>
+  <p:clrMapOvr>
+    <a:masterClrMapping/>
+  </p:clrMapOvr>
+</p:sld>
+</file>
+
+<file path=ppt/slides/slide4.xml><?xml version="1.0" encoding="utf-8"?>
+<p:sld xmlns:a="http://schemas.openxmlformats.org/drawingml/2006/main" xmlns:r="http://schemas.openxmlformats.org/officeDocument/2006/relationships" xmlns:p="http://schemas.openxmlformats.org/presentationml/2006/main">
+  <p:cSld>
+    <p:spTree>
+      <p:nvGrpSpPr>
+        <p:cNvPr id="1" name=""/>
+        <p:cNvGrpSpPr/>
+        <p:nvPr/>
+      </p:nvGrpSpPr>
+      <p:grpSpPr>
+        <a:xfrm>
+          <a:off x="0" y="0"/>
+          <a:ext cx="0" cy="0"/>
+          <a:chOff x="0" y="0"/>
+          <a:chExt cx="0" cy="0"/>
+        </a:xfrm>
+      </p:grpSpPr>
+      <p:sp>
+        <p:nvSpPr>
+          <p:cNvPr id="2" name="Заголовок 1">
+            <a:extLst>
+              <a:ext uri="{FF2B5EF4-FFF2-40B4-BE49-F238E27FC236}">
+                <a16:creationId xmlns:a16="http://schemas.microsoft.com/office/drawing/2014/main" id="{8D017F41-CE5E-9344-A3BD-F53B4C3654DC}"/>
+              </a:ext>
+            </a:extLst>
+          </p:cNvPr>
+          <p:cNvSpPr>
+            <a:spLocks noGrp="1"/>
+          </p:cNvSpPr>
+          <p:nvPr>
+            <p:ph type="title"/>
+          </p:nvPr>
+        </p:nvSpPr>
+        <p:spPr/>
+        <p:txBody>
+          <a:bodyPr/>
+          <a:lstStyle/>
+          <a:p>
+            <a:endParaRPr lang="ru-RU"/>
+          </a:p>
+        </p:txBody>
+      </p:sp>
+      <p:sp>
+        <p:nvSpPr>
+          <p:cNvPr id="3" name="Объект 2">
+            <a:extLst>
+              <a:ext uri="{FF2B5EF4-FFF2-40B4-BE49-F238E27FC236}">
+                <a16:creationId xmlns:a16="http://schemas.microsoft.com/office/drawing/2014/main" id="{61226E40-52F3-604F-9FE1-82A745B5C41C}"/>
+              </a:ext>
+            </a:extLst>
+          </p:cNvPr>
+          <p:cNvSpPr>
+            <a:spLocks noGrp="1"/>
+          </p:cNvSpPr>
+          <p:nvPr>
+            <p:ph idx="1"/>
+          </p:nvPr>
+        </p:nvSpPr>
+        <p:spPr/>
+        <p:txBody>
+          <a:bodyPr/>
+          <a:lstStyle/>
+          <a:p>
+            <a:endParaRPr lang="ru-RU"/>
+          </a:p>
+        </p:txBody>
+      </p:sp>
+    </p:spTree>
+    <p:extLst>
+      <p:ext uri="{BB962C8B-B14F-4D97-AF65-F5344CB8AC3E}">
+        <p14:creationId xmlns:p14="http://schemas.microsoft.com/office/powerpoint/2010/main" val="779840239"/>
+      </p:ext>
+    </p:extLst>
+  </p:cSld>
+  <p:clrMapOvr>
+    <a:masterClrMapping/>
+  </p:clrMapOvr>
+</p:sld>
+</file>
+
+<file path=ppt/slides/slide5.xml><?xml version="1.0" encoding="utf-8"?>
+<p:sld xmlns:a="http://schemas.openxmlformats.org/drawingml/2006/main" xmlns:r="http://schemas.openxmlformats.org/officeDocument/2006/relationships" xmlns:p="http://schemas.openxmlformats.org/presentationml/2006/main">
+  <p:cSld>
+    <p:spTree>
+      <p:nvGrpSpPr>
+        <p:cNvPr id="1" name=""/>
+        <p:cNvGrpSpPr/>
+        <p:nvPr/>
+      </p:nvGrpSpPr>
+      <p:grpSpPr>
+        <a:xfrm>
+          <a:off x="0" y="0"/>
+          <a:ext cx="0" cy="0"/>
+          <a:chOff x="0" y="0"/>
+          <a:chExt cx="0" cy="0"/>
+        </a:xfrm>
+      </p:grpSpPr>
+      <p:sp>
+        <p:nvSpPr>
+          <p:cNvPr id="2" name="Заголовок 1">
+            <a:extLst>
+              <a:ext uri="{FF2B5EF4-FFF2-40B4-BE49-F238E27FC236}">
+                <a16:creationId xmlns:a16="http://schemas.microsoft.com/office/drawing/2014/main" id="{9CD56EC7-19AB-644C-8AAF-D62AC45CC699}"/>
+              </a:ext>
+            </a:extLst>
+          </p:cNvPr>
+          <p:cNvSpPr>
+            <a:spLocks noGrp="1"/>
+          </p:cNvSpPr>
+          <p:nvPr>
+            <p:ph type="title"/>
+          </p:nvPr>
+        </p:nvSpPr>
+        <p:spPr/>
+        <p:txBody>
+          <a:bodyPr/>
+          <a:lstStyle/>
+          <a:p>
+            <a:endParaRPr lang="ru-RU"/>
+          </a:p>
+        </p:txBody>
+      </p:sp>
+      <p:sp>
+        <p:nvSpPr>
+          <p:cNvPr id="3" name="Объект 2">
+            <a:extLst>
+              <a:ext uri="{FF2B5EF4-FFF2-40B4-BE49-F238E27FC236}">
+                <a16:creationId xmlns:a16="http://schemas.microsoft.com/office/drawing/2014/main" id="{001042F4-D2A0-804B-9E34-387E446FC020}"/>
+              </a:ext>
+            </a:extLst>
+          </p:cNvPr>
+          <p:cNvSpPr>
+            <a:spLocks noGrp="1"/>
+          </p:cNvSpPr>
+          <p:nvPr>
+            <p:ph idx="1"/>
+          </p:nvPr>
+        </p:nvSpPr>
+        <p:spPr/>
+        <p:txBody>
+          <a:bodyPr/>
+          <a:lstStyle/>
+          <a:p>
+            <a:endParaRPr lang="ru-RU"/>
+          </a:p>
+        </p:txBody>
+      </p:sp>
+    </p:spTree>
+    <p:extLst>
+      <p:ext uri="{BB962C8B-B14F-4D97-AF65-F5344CB8AC3E}">
+        <p14:creationId xmlns:p14="http://schemas.microsoft.com/office/powerpoint/2010/main" val="437361289"/>
+      </p:ext>
+    </p:extLst>
+  </p:cSld>
+  <p:clrMapOvr>
+    <a:masterClrMapping/>
+  </p:clrMapOvr>
+</p:sld>
+</file>
+
+<file path=ppt/slides/slide6.xml><?xml version="1.0" encoding="utf-8"?>
+<p:sld xmlns:a="http://schemas.openxmlformats.org/drawingml/2006/main" xmlns:r="http://schemas.openxmlformats.org/officeDocument/2006/relationships" xmlns:p="http://schemas.openxmlformats.org/presentationml/2006/main">
+  <p:cSld>
+    <p:spTree>
+      <p:nvGrpSpPr>
+        <p:cNvPr id="1" name=""/>
+        <p:cNvGrpSpPr/>
+        <p:nvPr/>
+      </p:nvGrpSpPr>
+      <p:grpSpPr>
+        <a:xfrm>
+          <a:off x="0" y="0"/>
+          <a:ext cx="0" cy="0"/>
+          <a:chOff x="0" y="0"/>
+          <a:chExt cx="0" cy="0"/>
+        </a:xfrm>
+      </p:grpSpPr>
+      <p:sp>
+        <p:nvSpPr>
+          <p:cNvPr id="2" name="Заголовок 1">
+            <a:extLst>
+              <a:ext uri="{FF2B5EF4-FFF2-40B4-BE49-F238E27FC236}">
+                <a16:creationId xmlns:a16="http://schemas.microsoft.com/office/drawing/2014/main" id="{2A86018A-3DDC-7F47-95A4-C98240167CF6}"/>
+              </a:ext>
+            </a:extLst>
+          </p:cNvPr>
+          <p:cNvSpPr>
+            <a:spLocks noGrp="1"/>
+          </p:cNvSpPr>
+          <p:nvPr>
+            <p:ph type="title"/>
+          </p:nvPr>
+        </p:nvSpPr>
+        <p:spPr/>
+        <p:txBody>
+          <a:bodyPr/>
+          <a:lstStyle/>
+          <a:p>
+            <a:r>
+              <a:rPr lang="ru-RU" dirty="0">
+                <a:solidFill>
+                  <a:srgbClr val="7030A0"/>
+                </a:solidFill>
+              </a:rPr>
+              <a:t>Ссылки</a:t>
+            </a:r>
+          </a:p>
+        </p:txBody>
+      </p:sp>
+      <p:sp>
+        <p:nvSpPr>
+          <p:cNvPr id="3" name="Объект 2">
+            <a:extLst>
+              <a:ext uri="{FF2B5EF4-FFF2-40B4-BE49-F238E27FC236}">
+                <a16:creationId xmlns:a16="http://schemas.microsoft.com/office/drawing/2014/main" id="{E77815A6-FEDC-834D-B9AC-A24998715AD3}"/>
+              </a:ext>
+            </a:extLst>
+          </p:cNvPr>
+          <p:cNvSpPr>
+            <a:spLocks noGrp="1"/>
+          </p:cNvSpPr>
+          <p:nvPr>
+            <p:ph idx="1"/>
+          </p:nvPr>
+        </p:nvSpPr>
+        <p:spPr/>
+        <p:txBody>
+          <a:bodyPr/>
+          <a:lstStyle/>
+          <a:p>
+            <a:endParaRPr lang="ru-RU"/>
+          </a:p>
+        </p:txBody>
+      </p:sp>
+    </p:spTree>
+    <p:extLst>
+      <p:ext uri="{BB962C8B-B14F-4D97-AF65-F5344CB8AC3E}">
+        <p14:creationId xmlns:p14="http://schemas.microsoft.com/office/powerpoint/2010/main" val="2235601987"/>
+      </p:ext>
+    </p:extLst>
+  </p:cSld>
+  <p:clrMapOvr>
+    <a:masterClrMapping/>
+  </p:clrMapOvr>
+</p:sld>
+</file>
+
+<file path=ppt/slides/slide7.xml><?xml version="1.0" encoding="utf-8"?>
+<p:sld xmlns:a="http://schemas.openxmlformats.org/drawingml/2006/main" xmlns:r="http://schemas.openxmlformats.org/officeDocument/2006/relationships" xmlns:p="http://schemas.openxmlformats.org/presentationml/2006/main">
+  <p:cSld>
+    <p:spTree>
+      <p:nvGrpSpPr>
+        <p:cNvPr id="1" name=""/>
+        <p:cNvGrpSpPr/>
+        <p:nvPr/>
+      </p:nvGrpSpPr>
+      <p:grpSpPr>
+        <a:xfrm>
+          <a:off x="0" y="0"/>
+          <a:ext cx="0" cy="0"/>
+          <a:chOff x="0" y="0"/>
+          <a:chExt cx="0" cy="0"/>
+        </a:xfrm>
+      </p:grpSpPr>
+      <p:sp>
+        <p:nvSpPr>
+          <p:cNvPr id="2" name="Заголовок 1">
+            <a:extLst>
+              <a:ext uri="{FF2B5EF4-FFF2-40B4-BE49-F238E27FC236}">
+                <a16:creationId xmlns:a16="http://schemas.microsoft.com/office/drawing/2014/main" id="{50D46732-100B-054B-AA64-AC284177ABC2}"/>
+              </a:ext>
+            </a:extLst>
+          </p:cNvPr>
+          <p:cNvSpPr>
+            <a:spLocks noGrp="1"/>
+          </p:cNvSpPr>
+          <p:nvPr>
+            <p:ph type="ctrTitle"/>
+          </p:nvPr>
+        </p:nvSpPr>
+        <p:spPr/>
+        <p:txBody>
+          <a:bodyPr/>
+          <a:lstStyle/>
+          <a:p>
+            <a:r>
+              <a:rPr lang="ru-RU" dirty="0">
+                <a:solidFill>
+                  <a:srgbClr val="7030A0"/>
+                </a:solidFill>
+              </a:rPr>
+              <a:t>Спасибо за внимание</a:t>
+            </a:r>
+          </a:p>
+        </p:txBody>
+      </p:sp>
+      <p:sp>
+        <p:nvSpPr>
+          <p:cNvPr id="3" name="Подзаголовок 2">
+            <a:extLst>
+              <a:ext uri="{FF2B5EF4-FFF2-40B4-BE49-F238E27FC236}">
+                <a16:creationId xmlns:a16="http://schemas.microsoft.com/office/drawing/2014/main" id="{44C99405-C9C5-B140-A36B-B3EBB49D8403}"/>
+              </a:ext>
+            </a:extLst>
+          </p:cNvPr>
+          <p:cNvSpPr>
+            <a:spLocks noGrp="1"/>
+          </p:cNvSpPr>
+          <p:nvPr>
+            <p:ph type="subTitle" idx="1"/>
+          </p:nvPr>
+        </p:nvSpPr>
+        <p:spPr/>
+        <p:txBody>
+          <a:bodyPr/>
+          <a:lstStyle/>
+          <a:p>
+            <a:endParaRPr lang="ru-RU"/>
+          </a:p>
+        </p:txBody>
+      </p:sp>
+    </p:spTree>
+    <p:extLst>
+      <p:ext uri="{BB962C8B-B14F-4D97-AF65-F5344CB8AC3E}">
+        <p14:creationId xmlns:p14="http://schemas.microsoft.com/office/powerpoint/2010/main" val="203696986"/>
+      </p:ext>
+    </p:extLst>
+  </p:cSld>
+  <p:clrMapOvr>
+    <a:masterClrMapping/>
+  </p:clrMapOvr>
+</p:sld>
+</file>
+
 <file path=ppt/theme/theme1.xml><?xml version="1.0" encoding="utf-8"?>
 <a:theme xmlns:a="http://schemas.openxmlformats.org/drawingml/2006/main" name="Тема Office">
   <a:themeElements>
-    <a:clrScheme name="Стандартная">
+    <a:clrScheme name="Тема Office">
       <a:dk1>
         <a:sysClr val="windowText" lastClr="000000"/>
       </a:dk1>
@@ -3425,7 +3831,7 @@
         <a:srgbClr val="954F72"/>
       </a:folHlink>
     </a:clrScheme>
-    <a:fontScheme name="Стандартная">
+    <a:fontScheme name="Тема Office">
       <a:majorFont>
         <a:latin typeface="Calibri Light" panose="020F0302020204030204"/>
         <a:ea typeface=""/>
@@ -3460,23 +3866,6 @@
         <a:font script="Viet" typeface="Times New Roman"/>
         <a:font script="Uigh" typeface="Microsoft Uighur"/>
         <a:font script="Geor" typeface="Sylfaen"/>
-        <a:font script="Armn" typeface="Arial"/>
-        <a:font script="Bugi" typeface="Leelawadee UI"/>
-        <a:font script="Bopo" typeface="Microsoft JhengHei"/>
-        <a:font script="Java" typeface="Javanese Text"/>
-        <a:font script="Lisu" typeface="Segoe UI"/>
-        <a:font script="Mymr" typeface="Myanmar Text"/>
-        <a:font script="Nkoo" typeface="Ebrima"/>
-        <a:font script="Olck" typeface="Nirmala UI"/>
-        <a:font script="Osma" typeface="Ebrima"/>
-        <a:font script="Phag" typeface="Phagspa"/>
-        <a:font script="Syrn" typeface="Estrangelo Edessa"/>
-        <a:font script="Syrj" typeface="Estrangelo Edessa"/>
-        <a:font script="Syre" typeface="Estrangelo Edessa"/>
-        <a:font script="Sora" typeface="Nirmala UI"/>
-        <a:font script="Tale" typeface="Microsoft Tai Le"/>
-        <a:font script="Talu" typeface="Microsoft New Tai Lue"/>
-        <a:font script="Tfng" typeface="Ebrima"/>
       </a:majorFont>
       <a:minorFont>
         <a:latin typeface="Calibri" panose="020F0502020204030204"/>
@@ -3512,26 +3901,9 @@
         <a:font script="Viet" typeface="Arial"/>
         <a:font script="Uigh" typeface="Microsoft Uighur"/>
         <a:font script="Geor" typeface="Sylfaen"/>
-        <a:font script="Armn" typeface="Arial"/>
-        <a:font script="Bugi" typeface="Leelawadee UI"/>
-        <a:font script="Bopo" typeface="Microsoft JhengHei"/>
-        <a:font script="Java" typeface="Javanese Text"/>
-        <a:font script="Lisu" typeface="Segoe UI"/>
-        <a:font script="Mymr" typeface="Myanmar Text"/>
-        <a:font script="Nkoo" typeface="Ebrima"/>
-        <a:font script="Olck" typeface="Nirmala UI"/>
-        <a:font script="Osma" typeface="Ebrima"/>
-        <a:font script="Phag" typeface="Phagspa"/>
-        <a:font script="Syrn" typeface="Estrangelo Edessa"/>
-        <a:font script="Syrj" typeface="Estrangelo Edessa"/>
-        <a:font script="Syre" typeface="Estrangelo Edessa"/>
-        <a:font script="Sora" typeface="Nirmala UI"/>
-        <a:font script="Tale" typeface="Microsoft Tai Le"/>
-        <a:font script="Talu" typeface="Microsoft New Tai Lue"/>
-        <a:font script="Tfng" typeface="Ebrima"/>
       </a:minorFont>
     </a:fontScheme>
-    <a:fmtScheme name="Стандартная">
+    <a:fmtScheme name="Тема Office">
       <a:fillStyleLst>
         <a:solidFill>
           <a:schemeClr val="phClr"/>
@@ -3673,7 +4045,7 @@
   <a:extraClrSchemeLst/>
   <a:extLst>
     <a:ext uri="{05A4C25C-085E-4340-85A3-A5531E510DB2}">
-      <thm15:themeFamily xmlns:thm15="http://schemas.microsoft.com/office/thememl/2012/main" name="Office Theme" id="{62F939B6-93AF-4DB8-9C6B-D6C7DFDC589F}" vid="{4A3C46E8-61CC-4603-A589-7422A47A8E4A}"/>
+      <thm15:themeFamily xmlns:thm15="http://schemas.microsoft.com/office/thememl/2012/main" name="Office Theme" id="{62F939B6-93AF-4DB8-9C6B-D6C7DFDC589F}" vid="{4F46216B-77A9-411A-B9D3-5023FCB70208}"/>
     </a:ext>
   </a:extLst>
 </a:theme>

</xml_diff>

<commit_message>
Added info in SnapKit presentation
</commit_message>
<xml_diff>
--- a/Presentation/SnapKit-30.09.2022/SnapKit-Abrosov.pptx
+++ b/Presentation/SnapKit-30.09.2022/SnapKit-Abrosov.pptx
@@ -7,11 +7,13 @@
   <p:sldIdLst>
     <p:sldId id="256" r:id="rId2"/>
     <p:sldId id="260" r:id="rId3"/>
-    <p:sldId id="262" r:id="rId4"/>
-    <p:sldId id="261" r:id="rId5"/>
-    <p:sldId id="257" r:id="rId6"/>
-    <p:sldId id="258" r:id="rId7"/>
-    <p:sldId id="259" r:id="rId8"/>
+    <p:sldId id="264" r:id="rId4"/>
+    <p:sldId id="265" r:id="rId5"/>
+    <p:sldId id="262" r:id="rId6"/>
+    <p:sldId id="261" r:id="rId7"/>
+    <p:sldId id="257" r:id="rId8"/>
+    <p:sldId id="258" r:id="rId9"/>
+    <p:sldId id="259" r:id="rId10"/>
   </p:sldIdLst>
   <p:sldSz cx="12192000" cy="6858000"/>
   <p:notesSz cx="6858000" cy="9144000"/>
@@ -249,7 +251,7 @@
           <a:p>
             <a:fld id="{7EDD47FB-9CCA-9243-939E-425277DAE96D}" type="datetimeFigureOut">
               <a:rPr lang="ru-RU" smtClean="0"/>
-              <a:t>16.09.2022</a:t>
+              <a:t>19.09.2022</a:t>
             </a:fld>
             <a:endParaRPr lang="ru-RU"/>
           </a:p>
@@ -419,7 +421,7 @@
           <a:p>
             <a:fld id="{7EDD47FB-9CCA-9243-939E-425277DAE96D}" type="datetimeFigureOut">
               <a:rPr lang="ru-RU" smtClean="0"/>
-              <a:t>16.09.2022</a:t>
+              <a:t>19.09.2022</a:t>
             </a:fld>
             <a:endParaRPr lang="ru-RU"/>
           </a:p>
@@ -599,7 +601,7 @@
           <a:p>
             <a:fld id="{7EDD47FB-9CCA-9243-939E-425277DAE96D}" type="datetimeFigureOut">
               <a:rPr lang="ru-RU" smtClean="0"/>
-              <a:t>16.09.2022</a:t>
+              <a:t>19.09.2022</a:t>
             </a:fld>
             <a:endParaRPr lang="ru-RU"/>
           </a:p>
@@ -769,7 +771,7 @@
           <a:p>
             <a:fld id="{7EDD47FB-9CCA-9243-939E-425277DAE96D}" type="datetimeFigureOut">
               <a:rPr lang="ru-RU" smtClean="0"/>
-              <a:t>16.09.2022</a:t>
+              <a:t>19.09.2022</a:t>
             </a:fld>
             <a:endParaRPr lang="ru-RU"/>
           </a:p>
@@ -1015,7 +1017,7 @@
           <a:p>
             <a:fld id="{7EDD47FB-9CCA-9243-939E-425277DAE96D}" type="datetimeFigureOut">
               <a:rPr lang="ru-RU" smtClean="0"/>
-              <a:t>16.09.2022</a:t>
+              <a:t>19.09.2022</a:t>
             </a:fld>
             <a:endParaRPr lang="ru-RU"/>
           </a:p>
@@ -1247,7 +1249,7 @@
           <a:p>
             <a:fld id="{7EDD47FB-9CCA-9243-939E-425277DAE96D}" type="datetimeFigureOut">
               <a:rPr lang="ru-RU" smtClean="0"/>
-              <a:t>16.09.2022</a:t>
+              <a:t>19.09.2022</a:t>
             </a:fld>
             <a:endParaRPr lang="ru-RU"/>
           </a:p>
@@ -1614,7 +1616,7 @@
           <a:p>
             <a:fld id="{7EDD47FB-9CCA-9243-939E-425277DAE96D}" type="datetimeFigureOut">
               <a:rPr lang="ru-RU" smtClean="0"/>
-              <a:t>16.09.2022</a:t>
+              <a:t>19.09.2022</a:t>
             </a:fld>
             <a:endParaRPr lang="ru-RU"/>
           </a:p>
@@ -1732,7 +1734,7 @@
           <a:p>
             <a:fld id="{7EDD47FB-9CCA-9243-939E-425277DAE96D}" type="datetimeFigureOut">
               <a:rPr lang="ru-RU" smtClean="0"/>
-              <a:t>16.09.2022</a:t>
+              <a:t>19.09.2022</a:t>
             </a:fld>
             <a:endParaRPr lang="ru-RU"/>
           </a:p>
@@ -1827,7 +1829,7 @@
           <a:p>
             <a:fld id="{7EDD47FB-9CCA-9243-939E-425277DAE96D}" type="datetimeFigureOut">
               <a:rPr lang="ru-RU" smtClean="0"/>
-              <a:t>16.09.2022</a:t>
+              <a:t>19.09.2022</a:t>
             </a:fld>
             <a:endParaRPr lang="ru-RU"/>
           </a:p>
@@ -2104,7 +2106,7 @@
           <a:p>
             <a:fld id="{7EDD47FB-9CCA-9243-939E-425277DAE96D}" type="datetimeFigureOut">
               <a:rPr lang="ru-RU" smtClean="0"/>
-              <a:t>16.09.2022</a:t>
+              <a:t>19.09.2022</a:t>
             </a:fld>
             <a:endParaRPr lang="ru-RU"/>
           </a:p>
@@ -2361,7 +2363,7 @@
           <a:p>
             <a:fld id="{7EDD47FB-9CCA-9243-939E-425277DAE96D}" type="datetimeFigureOut">
               <a:rPr lang="ru-RU" smtClean="0"/>
-              <a:t>16.09.2022</a:t>
+              <a:t>19.09.2022</a:t>
             </a:fld>
             <a:endParaRPr lang="ru-RU"/>
           </a:p>
@@ -2574,7 +2576,7 @@
           <a:p>
             <a:fld id="{7EDD47FB-9CCA-9243-939E-425277DAE96D}" type="datetimeFigureOut">
               <a:rPr lang="ru-RU" smtClean="0"/>
-              <a:t>16.09.2022</a:t>
+              <a:t>19.09.2022</a:t>
             </a:fld>
             <a:endParaRPr lang="ru-RU"/>
           </a:p>
@@ -3398,7 +3400,7 @@
           <p:cNvPr id="2" name="Заголовок 1">
             <a:extLst>
               <a:ext uri="{FF2B5EF4-FFF2-40B4-BE49-F238E27FC236}">
-                <a16:creationId xmlns:a16="http://schemas.microsoft.com/office/drawing/2014/main" id="{3E02A369-E4B6-F849-827C-A75347E2A056}"/>
+                <a16:creationId xmlns:a16="http://schemas.microsoft.com/office/drawing/2014/main" id="{CD57A8E4-CEAB-0644-9DA5-8896329A7F60}"/>
               </a:ext>
             </a:extLst>
           </p:cNvPr>
@@ -3414,39 +3416,82 @@
           <a:bodyPr/>
           <a:lstStyle/>
           <a:p>
-            <a:endParaRPr lang="ru-RU"/>
-          </a:p>
-        </p:txBody>
-      </p:sp>
-      <p:sp>
-        <p:nvSpPr>
-          <p:cNvPr id="3" name="Объект 2">
+            <a:r>
+              <a:rPr lang="ru-RU" dirty="0">
+                <a:solidFill>
+                  <a:srgbClr val="7030A0"/>
+                </a:solidFill>
+              </a:rPr>
+              <a:t>Менеджер</a:t>
+            </a:r>
+            <a:r>
+              <a:rPr lang="ru-RU" dirty="0"/>
+              <a:t> </a:t>
+            </a:r>
+            <a:r>
+              <a:rPr lang="ru-RU" dirty="0">
+                <a:solidFill>
+                  <a:srgbClr val="7030A0"/>
+                </a:solidFill>
+              </a:rPr>
+              <a:t>зависимостей</a:t>
+            </a:r>
+          </a:p>
+        </p:txBody>
+      </p:sp>
+      <p:pic>
+        <p:nvPicPr>
+          <p:cNvPr id="1026" name="Picture 2">
             <a:extLst>
               <a:ext uri="{FF2B5EF4-FFF2-40B4-BE49-F238E27FC236}">
-                <a16:creationId xmlns:a16="http://schemas.microsoft.com/office/drawing/2014/main" id="{4D18E3B6-33F3-504D-9599-4C2A20687BF3}"/>
+                <a16:creationId xmlns:a16="http://schemas.microsoft.com/office/drawing/2014/main" id="{2EBDA68D-EB5C-7A46-A4BD-9AA525C0A917}"/>
               </a:ext>
             </a:extLst>
           </p:cNvPr>
-          <p:cNvSpPr>
-            <a:spLocks noGrp="1"/>
-          </p:cNvSpPr>
+          <p:cNvPicPr>
+            <a:picLocks noGrp="1" noChangeAspect="1" noChangeArrowheads="1"/>
+          </p:cNvPicPr>
           <p:nvPr>
             <p:ph idx="1"/>
           </p:nvPr>
-        </p:nvSpPr>
-        <p:spPr/>
-        <p:txBody>
-          <a:bodyPr/>
-          <a:lstStyle/>
-          <a:p>
-            <a:endParaRPr lang="ru-RU"/>
-          </a:p>
-        </p:txBody>
-      </p:sp>
+        </p:nvPicPr>
+        <p:blipFill>
+          <a:blip r:embed="rId2">
+            <a:extLst>
+              <a:ext uri="{28A0092B-C50C-407E-A947-70E740481C1C}">
+                <a14:useLocalDpi xmlns:a14="http://schemas.microsoft.com/office/drawing/2010/main" val="0"/>
+              </a:ext>
+            </a:extLst>
+          </a:blip>
+          <a:srcRect/>
+          <a:stretch>
+            <a:fillRect/>
+          </a:stretch>
+        </p:blipFill>
+        <p:spPr bwMode="auto">
+          <a:xfrm>
+            <a:off x="1951869" y="1825625"/>
+            <a:ext cx="8288262" cy="4351338"/>
+          </a:xfrm>
+          <a:prstGeom prst="rect">
+            <a:avLst/>
+          </a:prstGeom>
+          <a:noFill/>
+          <a:extLst>
+            <a:ext uri="{909E8E84-426E-40DD-AFC4-6F175D3DCCD1}">
+              <a14:hiddenFill xmlns:a14="http://schemas.microsoft.com/office/drawing/2010/main">
+                <a:solidFill>
+                  <a:srgbClr val="FFFFFF"/>
+                </a:solidFill>
+              </a14:hiddenFill>
+            </a:ext>
+          </a:extLst>
+        </p:spPr>
+      </p:pic>
     </p:spTree>
     <p:extLst>
       <p:ext uri="{BB962C8B-B14F-4D97-AF65-F5344CB8AC3E}">
-        <p14:creationId xmlns:p14="http://schemas.microsoft.com/office/powerpoint/2010/main" val="993302789"/>
+        <p14:creationId xmlns:p14="http://schemas.microsoft.com/office/powerpoint/2010/main" val="902511910"/>
       </p:ext>
     </p:extLst>
   </p:cSld>
@@ -3478,7 +3523,7 @@
           <p:cNvPr id="2" name="Заголовок 1">
             <a:extLst>
               <a:ext uri="{FF2B5EF4-FFF2-40B4-BE49-F238E27FC236}">
-                <a16:creationId xmlns:a16="http://schemas.microsoft.com/office/drawing/2014/main" id="{8D017F41-CE5E-9344-A3BD-F53B4C3654DC}"/>
+                <a16:creationId xmlns:a16="http://schemas.microsoft.com/office/drawing/2014/main" id="{3AA4FB3D-211F-8742-9E2D-E4559B863ADE}"/>
               </a:ext>
             </a:extLst>
           </p:cNvPr>
@@ -3494,7 +3539,26 @@
           <a:bodyPr/>
           <a:lstStyle/>
           <a:p>
-            <a:endParaRPr lang="ru-RU"/>
+            <a:r>
+              <a:rPr lang="ru-RU" dirty="0">
+                <a:solidFill>
+                  <a:srgbClr val="7030A0"/>
+                </a:solidFill>
+              </a:rPr>
+              <a:t>Менеджер</a:t>
+            </a:r>
+            <a:r>
+              <a:rPr lang="ru-RU" dirty="0"/>
+              <a:t> </a:t>
+            </a:r>
+            <a:r>
+              <a:rPr lang="ru-RU" dirty="0">
+                <a:solidFill>
+                  <a:srgbClr val="7030A0"/>
+                </a:solidFill>
+              </a:rPr>
+              <a:t>зависимостей</a:t>
+            </a:r>
           </a:p>
         </p:txBody>
       </p:sp>
@@ -3503,7 +3567,7 @@
           <p:cNvPr id="3" name="Объект 2">
             <a:extLst>
               <a:ext uri="{FF2B5EF4-FFF2-40B4-BE49-F238E27FC236}">
-                <a16:creationId xmlns:a16="http://schemas.microsoft.com/office/drawing/2014/main" id="{61226E40-52F3-604F-9FE1-82A745B5C41C}"/>
+                <a16:creationId xmlns:a16="http://schemas.microsoft.com/office/drawing/2014/main" id="{AE495F53-3D24-2D4B-ADF3-3D377A6F7F39}"/>
               </a:ext>
             </a:extLst>
           </p:cNvPr>
@@ -3514,19 +3578,282 @@
             <p:ph idx="1"/>
           </p:nvPr>
         </p:nvSpPr>
-        <p:spPr/>
-        <p:txBody>
-          <a:bodyPr/>
-          <a:lstStyle/>
-          <a:p>
-            <a:endParaRPr lang="ru-RU"/>
+        <p:spPr>
+          <a:xfrm>
+            <a:off x="838200" y="1825625"/>
+            <a:ext cx="10515600" cy="4667250"/>
+          </a:xfrm>
+        </p:spPr>
+        <p:txBody>
+          <a:bodyPr>
+            <a:normAutofit fontScale="92500" lnSpcReduction="10000"/>
+          </a:bodyPr>
+          <a:lstStyle/>
+          <a:p>
+            <a:r>
+              <a:rPr lang="ru-RU" sz="3000" b="0" i="0" u="none" strike="noStrike" dirty="0">
+                <a:effectLst/>
+              </a:rPr>
+              <a:t>Разновидности</a:t>
+            </a:r>
+            <a:r>
+              <a:rPr lang="en-US" sz="3000" b="0" i="0" u="none" strike="noStrike" dirty="0">
+                <a:effectLst/>
+              </a:rPr>
+              <a:t>: </a:t>
+            </a:r>
+            <a:endParaRPr lang="ru-RU" sz="3000" b="0" i="0" u="none" strike="noStrike" dirty="0">
+              <a:effectLst/>
+            </a:endParaRPr>
+          </a:p>
+          <a:p>
+            <a:pPr lvl="1"/>
+            <a:r>
+              <a:rPr lang="ru-RU" sz="2200" b="0" i="0" u="none" strike="noStrike" dirty="0">
+                <a:solidFill>
+                  <a:srgbClr val="FFFF00"/>
+                </a:solidFill>
+                <a:effectLst/>
+              </a:rPr>
+              <a:t>Системные менеджеры зависимостей</a:t>
+            </a:r>
+            <a:r>
+              <a:rPr lang="ru-RU" sz="2200" b="0" i="0" u="none" strike="noStrike" dirty="0">
+                <a:effectLst/>
+              </a:rPr>
+              <a:t> – устанавливают недостающие утилиты в операционную систему. </a:t>
+            </a:r>
+            <a:r>
+              <a:rPr lang="ru-RU" sz="2200" b="0" i="0" u="none" strike="noStrike" dirty="0">
+                <a:solidFill>
+                  <a:srgbClr val="FFFF00"/>
+                </a:solidFill>
+                <a:effectLst/>
+              </a:rPr>
+              <a:t>Например</a:t>
+            </a:r>
+            <a:r>
+              <a:rPr lang="en-US" sz="2200" b="0" i="0" u="none" strike="noStrike" dirty="0">
+                <a:solidFill>
+                  <a:srgbClr val="FFFF00"/>
+                </a:solidFill>
+                <a:effectLst/>
+              </a:rPr>
+              <a:t>, homebrew</a:t>
+            </a:r>
+            <a:r>
+              <a:rPr lang="en" sz="2200" b="0" i="0" u="none" strike="noStrike" dirty="0">
+                <a:solidFill>
+                  <a:srgbClr val="FFFF00"/>
+                </a:solidFill>
+                <a:effectLst/>
+              </a:rPr>
+              <a:t>.</a:t>
+            </a:r>
+          </a:p>
+          <a:p>
+            <a:pPr marL="457200" lvl="1" indent="0">
+              <a:buNone/>
+            </a:pPr>
+            <a:endParaRPr lang="en" b="0" i="0" u="none" strike="noStrike" dirty="0">
+              <a:solidFill>
+                <a:srgbClr val="FFFF00"/>
+              </a:solidFill>
+              <a:effectLst/>
+            </a:endParaRPr>
+          </a:p>
+          <a:p>
+            <a:pPr lvl="1"/>
+            <a:r>
+              <a:rPr lang="ru-RU" sz="2200" b="0" i="0" u="none" strike="noStrike" dirty="0">
+                <a:solidFill>
+                  <a:srgbClr val="FFFF00"/>
+                </a:solidFill>
+                <a:effectLst/>
+              </a:rPr>
+              <a:t>Менеджеры зависимостей языка</a:t>
+            </a:r>
+            <a:r>
+              <a:rPr lang="ru-RU" sz="2200" b="0" i="0" u="none" strike="noStrike" dirty="0">
+                <a:effectLst/>
+              </a:rPr>
+              <a:t> – собирают исходники, написанные на одном из языков программирования, в конечные исполняемые программы. </a:t>
+            </a:r>
+            <a:r>
+              <a:rPr lang="ru-RU" sz="2200" b="0" i="0" u="none" strike="noStrike" dirty="0">
+                <a:solidFill>
+                  <a:srgbClr val="FFFF00"/>
+                </a:solidFill>
+                <a:effectLst/>
+              </a:rPr>
+              <a:t>Например,</a:t>
+            </a:r>
+            <a:r>
+              <a:rPr lang="en-US" sz="2200" b="0" i="0" u="none" strike="noStrike" dirty="0">
+                <a:solidFill>
+                  <a:srgbClr val="FFFF00"/>
+                </a:solidFill>
+                <a:effectLst/>
+              </a:rPr>
+              <a:t> go build</a:t>
+            </a:r>
+            <a:r>
+              <a:rPr lang="en" sz="2200" b="0" i="0" u="none" strike="noStrike" dirty="0">
+                <a:solidFill>
+                  <a:srgbClr val="FFFF00"/>
+                </a:solidFill>
+                <a:effectLst/>
+              </a:rPr>
+              <a:t>.</a:t>
+            </a:r>
+          </a:p>
+          <a:p>
+            <a:pPr lvl="1"/>
+            <a:endParaRPr lang="en" b="0" i="0" u="none" strike="noStrike" dirty="0">
+              <a:solidFill>
+                <a:srgbClr val="FFFF00"/>
+              </a:solidFill>
+              <a:effectLst/>
+            </a:endParaRPr>
+          </a:p>
+          <a:p>
+            <a:pPr lvl="1"/>
+            <a:r>
+              <a:rPr lang="ru-RU" sz="2200" b="0" i="0" u="none" strike="noStrike" dirty="0">
+                <a:solidFill>
+                  <a:srgbClr val="FFFF00"/>
+                </a:solidFill>
+                <a:effectLst/>
+              </a:rPr>
+              <a:t>Менеджеры зависимостей проекта</a:t>
+            </a:r>
+            <a:r>
+              <a:rPr lang="ru-RU" sz="2200" b="0" i="0" u="none" strike="noStrike" dirty="0">
+                <a:effectLst/>
+              </a:rPr>
+              <a:t> – управляют зависимостями в разрезе конкретного проекта. То есть, в их задачи входит описание зависимостей, скачивание, обновление их исходного кода. </a:t>
+            </a:r>
+            <a:r>
+              <a:rPr lang="ru-RU" sz="2200" b="0" i="0" u="none" strike="noStrike" dirty="0">
+                <a:solidFill>
+                  <a:srgbClr val="FFFF00"/>
+                </a:solidFill>
+                <a:effectLst/>
+              </a:rPr>
+              <a:t>Например,</a:t>
+            </a:r>
+            <a:r>
+              <a:rPr lang="en-US" sz="2200" b="0" i="0" u="none" strike="noStrike" dirty="0">
+                <a:solidFill>
+                  <a:srgbClr val="FFFF00"/>
+                </a:solidFill>
+                <a:effectLst/>
+              </a:rPr>
+              <a:t> </a:t>
+            </a:r>
+            <a:r>
+              <a:rPr lang="en-US" sz="2200" b="0" i="0" u="none" strike="noStrike" dirty="0" err="1">
+                <a:solidFill>
+                  <a:srgbClr val="FFFF00"/>
+                </a:solidFill>
+                <a:effectLst/>
+              </a:rPr>
+              <a:t>CocoaPods</a:t>
+            </a:r>
+            <a:r>
+              <a:rPr lang="en" sz="2200" b="0" i="0" u="none" strike="noStrike" dirty="0">
+                <a:solidFill>
+                  <a:srgbClr val="FFFF00"/>
+                </a:solidFill>
+                <a:effectLst/>
+              </a:rPr>
+              <a:t>.</a:t>
+            </a:r>
+            <a:endParaRPr lang="ru-RU" sz="2200" b="0" i="0" u="none" strike="noStrike" dirty="0">
+              <a:solidFill>
+                <a:srgbClr val="FFFF00"/>
+              </a:solidFill>
+              <a:effectLst/>
+            </a:endParaRPr>
+          </a:p>
+          <a:p>
+            <a:pPr marL="457200" lvl="1" indent="0">
+              <a:buNone/>
+            </a:pPr>
+            <a:endParaRPr lang="ru-RU" b="0" i="0" u="none" strike="noStrike" dirty="0">
+              <a:effectLst/>
+            </a:endParaRPr>
+          </a:p>
+          <a:p>
+            <a:r>
+              <a:rPr lang="ru-RU" sz="3000" b="0" i="0" u="none" strike="noStrike" dirty="0">
+                <a:solidFill>
+                  <a:srgbClr val="FFFF00"/>
+                </a:solidFill>
+                <a:effectLst/>
+              </a:rPr>
+              <a:t>Основное отличие</a:t>
+            </a:r>
+            <a:r>
+              <a:rPr lang="ru-RU" sz="3000" b="0" i="0" u="none" strike="noStrike" dirty="0">
+                <a:effectLst/>
+              </a:rPr>
+              <a:t> между ними </a:t>
+            </a:r>
+            <a:r>
+              <a:rPr lang="ru-RU" sz="3000" b="0" i="0" u="none" strike="noStrike" dirty="0">
+                <a:solidFill>
+                  <a:srgbClr val="FFFF00"/>
+                </a:solidFill>
+                <a:effectLst/>
+              </a:rPr>
+              <a:t>в том, кому они «служат». </a:t>
+            </a:r>
+            <a:br>
+              <a:rPr lang="ru-RU" sz="3000" b="0" i="0" u="none" strike="noStrike" dirty="0">
+                <a:solidFill>
+                  <a:srgbClr val="FFFF00"/>
+                </a:solidFill>
+                <a:effectLst/>
+              </a:rPr>
+            </a:br>
+            <a:r>
+              <a:rPr lang="ru-RU" sz="3000" b="0" i="0" u="none" strike="noStrike" dirty="0">
+                <a:effectLst/>
+              </a:rPr>
+              <a:t>Системные МЗ – пользователям, МЗ проекта – разработчикам, а МЗ языка – и тем, и тем сразу.</a:t>
+            </a:r>
+            <a:endParaRPr lang="en-US" sz="3000" b="0" i="0" u="none" strike="noStrike" dirty="0">
+              <a:effectLst/>
+            </a:endParaRPr>
+          </a:p>
+          <a:p>
+            <a:pPr marL="457200" lvl="1" indent="0">
+              <a:buNone/>
+            </a:pPr>
+            <a:endParaRPr lang="ru-RU" b="0" i="0" u="none" strike="noStrike" dirty="0">
+              <a:effectLst/>
+            </a:endParaRPr>
+          </a:p>
+          <a:p>
+            <a:pPr lvl="2"/>
+            <a:endParaRPr lang="ru-RU" b="0" i="0" u="none" strike="noStrike" dirty="0">
+              <a:solidFill>
+                <a:srgbClr val="111111"/>
+              </a:solidFill>
+              <a:effectLst/>
+              <a:latin typeface="Fira Sans" panose="020F0502020204030204" pitchFamily="34" charset="0"/>
+            </a:endParaRPr>
+          </a:p>
+          <a:p>
+            <a:endParaRPr lang="ru-RU" dirty="0"/>
           </a:p>
         </p:txBody>
       </p:sp>
     </p:spTree>
     <p:extLst>
       <p:ext uri="{BB962C8B-B14F-4D97-AF65-F5344CB8AC3E}">
-        <p14:creationId xmlns:p14="http://schemas.microsoft.com/office/powerpoint/2010/main" val="779840239"/>
+        <p14:creationId xmlns:p14="http://schemas.microsoft.com/office/powerpoint/2010/main" val="1710772945"/>
       </p:ext>
     </p:extLst>
   </p:cSld>
@@ -3558,7 +3885,7 @@
           <p:cNvPr id="2" name="Заголовок 1">
             <a:extLst>
               <a:ext uri="{FF2B5EF4-FFF2-40B4-BE49-F238E27FC236}">
-                <a16:creationId xmlns:a16="http://schemas.microsoft.com/office/drawing/2014/main" id="{9CD56EC7-19AB-644C-8AAF-D62AC45CC699}"/>
+                <a16:creationId xmlns:a16="http://schemas.microsoft.com/office/drawing/2014/main" id="{3E02A369-E4B6-F849-827C-A75347E2A056}"/>
               </a:ext>
             </a:extLst>
           </p:cNvPr>
@@ -3574,7 +3901,14 @@
           <a:bodyPr/>
           <a:lstStyle/>
           <a:p>
-            <a:endParaRPr lang="ru-RU"/>
+            <a:r>
+              <a:rPr lang="ru-RU" dirty="0">
+                <a:solidFill>
+                  <a:srgbClr val="7030A0"/>
+                </a:solidFill>
+              </a:rPr>
+              <a:t>Установка</a:t>
+            </a:r>
           </a:p>
         </p:txBody>
       </p:sp>
@@ -3583,7 +3917,7 @@
           <p:cNvPr id="3" name="Объект 2">
             <a:extLst>
               <a:ext uri="{FF2B5EF4-FFF2-40B4-BE49-F238E27FC236}">
-                <a16:creationId xmlns:a16="http://schemas.microsoft.com/office/drawing/2014/main" id="{001042F4-D2A0-804B-9E34-387E446FC020}"/>
+                <a16:creationId xmlns:a16="http://schemas.microsoft.com/office/drawing/2014/main" id="{4D18E3B6-33F3-504D-9599-4C2A20687BF3}"/>
               </a:ext>
             </a:extLst>
           </p:cNvPr>
@@ -3594,19 +3928,296 @@
             <p:ph idx="1"/>
           </p:nvPr>
         </p:nvSpPr>
-        <p:spPr/>
-        <p:txBody>
-          <a:bodyPr/>
-          <a:lstStyle/>
-          <a:p>
-            <a:endParaRPr lang="ru-RU"/>
+        <p:spPr>
+          <a:xfrm>
+            <a:off x="838200" y="1825625"/>
+            <a:ext cx="11027980" cy="4351338"/>
+          </a:xfrm>
+        </p:spPr>
+        <p:txBody>
+          <a:bodyPr/>
+          <a:lstStyle/>
+          <a:p>
+            <a:r>
+              <a:rPr lang="ru-RU" dirty="0">
+                <a:solidFill>
+                  <a:srgbClr val="FFFF00"/>
+                </a:solidFill>
+              </a:rPr>
+              <a:t>Через </a:t>
+            </a:r>
+            <a:r>
+              <a:rPr lang="en-US" dirty="0">
+                <a:solidFill>
+                  <a:srgbClr val="FFFF00"/>
+                </a:solidFill>
+              </a:rPr>
+              <a:t>SPM </a:t>
+            </a:r>
+            <a:r>
+              <a:rPr lang="en-US" dirty="0"/>
+              <a:t>(Swift Package Manager):</a:t>
+            </a:r>
+            <a:endParaRPr lang="ru-RU" dirty="0"/>
+          </a:p>
+          <a:p>
+            <a:pPr marL="0" indent="0">
+              <a:buNone/>
+            </a:pPr>
+            <a:r>
+              <a:rPr lang="ru-RU" sz="1800" dirty="0">
+                <a:solidFill>
+                  <a:srgbClr val="00B0F0"/>
+                </a:solidFill>
+              </a:rPr>
+              <a:t>	</a:t>
+            </a:r>
+            <a:r>
+              <a:rPr lang="en-US" sz="1800" dirty="0">
+                <a:solidFill>
+                  <a:srgbClr val="00B0F0"/>
+                </a:solidFill>
+              </a:rPr>
+              <a:t>File </a:t>
+            </a:r>
+            <a:r>
+              <a:rPr lang="en-US" sz="1800" dirty="0"/>
+              <a:t>-&gt;</a:t>
+            </a:r>
+            <a:r>
+              <a:rPr lang="en-US" sz="1800" dirty="0">
+                <a:solidFill>
+                  <a:srgbClr val="00B0F0"/>
+                </a:solidFill>
+              </a:rPr>
+              <a:t> </a:t>
+            </a:r>
+            <a:br>
+              <a:rPr lang="ru-RU" sz="1800" dirty="0">
+                <a:solidFill>
+                  <a:srgbClr val="00B0F0"/>
+                </a:solidFill>
+              </a:rPr>
+            </a:br>
+            <a:r>
+              <a:rPr lang="ru-RU" sz="1800" dirty="0">
+                <a:solidFill>
+                  <a:srgbClr val="00B0F0"/>
+                </a:solidFill>
+              </a:rPr>
+              <a:t>	</a:t>
+            </a:r>
+            <a:r>
+              <a:rPr lang="en-US" sz="1800" dirty="0">
+                <a:solidFill>
+                  <a:srgbClr val="00B0F0"/>
+                </a:solidFill>
+              </a:rPr>
+              <a:t>Add Packages… </a:t>
+            </a:r>
+            <a:r>
+              <a:rPr lang="en-US" sz="1800" dirty="0"/>
+              <a:t>-&gt;</a:t>
+            </a:r>
+            <a:r>
+              <a:rPr lang="en-US" sz="1800" dirty="0">
+                <a:solidFill>
+                  <a:srgbClr val="00B0F0"/>
+                </a:solidFill>
+              </a:rPr>
+              <a:t> </a:t>
+            </a:r>
+            <a:br>
+              <a:rPr lang="ru-RU" sz="1800" dirty="0">
+                <a:solidFill>
+                  <a:srgbClr val="00B0F0"/>
+                </a:solidFill>
+              </a:rPr>
+            </a:br>
+            <a:r>
+              <a:rPr lang="ru-RU" sz="1800" dirty="0">
+                <a:solidFill>
+                  <a:srgbClr val="00B0F0"/>
+                </a:solidFill>
+              </a:rPr>
+              <a:t>	указываем ссылку на гит с необходимым пакетом</a:t>
+            </a:r>
+            <a:r>
+              <a:rPr lang="en-US" sz="1800" dirty="0">
+                <a:solidFill>
+                  <a:srgbClr val="00B0F0"/>
+                </a:solidFill>
+              </a:rPr>
+              <a:t> (</a:t>
+            </a:r>
+            <a:r>
+              <a:rPr lang="ru-RU" sz="1800" dirty="0">
+                <a:solidFill>
+                  <a:srgbClr val="00B0F0"/>
+                </a:solidFill>
+              </a:rPr>
+              <a:t>находим тут</a:t>
+            </a:r>
+            <a:r>
+              <a:rPr lang="en-US" sz="1800" dirty="0">
+                <a:solidFill>
+                  <a:srgbClr val="00B0F0"/>
+                </a:solidFill>
+              </a:rPr>
+              <a:t>: https://</a:t>
+            </a:r>
+            <a:r>
+              <a:rPr lang="en-US" sz="1800" dirty="0" err="1">
+                <a:solidFill>
+                  <a:srgbClr val="00B0F0"/>
+                </a:solidFill>
+              </a:rPr>
+              <a:t>swiftpackageindex.com</a:t>
+            </a:r>
+            <a:r>
+              <a:rPr lang="ru-RU" sz="1800" dirty="0">
+                <a:solidFill>
+                  <a:srgbClr val="00B0F0"/>
+                </a:solidFill>
+              </a:rPr>
+              <a:t>)</a:t>
+            </a:r>
+            <a:r>
+              <a:rPr lang="en-US" sz="1800" dirty="0">
+                <a:solidFill>
+                  <a:srgbClr val="00B0F0"/>
+                </a:solidFill>
+              </a:rPr>
+              <a:t> </a:t>
+            </a:r>
+            <a:r>
+              <a:rPr lang="ru-RU" sz="1800" dirty="0">
+                <a:solidFill>
+                  <a:srgbClr val="00B0F0"/>
+                </a:solidFill>
+              </a:rPr>
+              <a:t> </a:t>
+            </a:r>
+            <a:r>
+              <a:rPr lang="en-US" sz="1800" dirty="0"/>
+              <a:t>-&gt;</a:t>
+            </a:r>
+            <a:r>
+              <a:rPr lang="en-US" sz="1800" dirty="0">
+                <a:solidFill>
+                  <a:srgbClr val="00B0F0"/>
+                </a:solidFill>
+              </a:rPr>
+              <a:t>  </a:t>
+            </a:r>
+            <a:br>
+              <a:rPr lang="en-US" sz="1800" dirty="0">
+                <a:solidFill>
+                  <a:srgbClr val="00B0F0"/>
+                </a:solidFill>
+              </a:rPr>
+            </a:br>
+            <a:r>
+              <a:rPr lang="en-US" sz="1800" dirty="0">
+                <a:solidFill>
+                  <a:srgbClr val="00B0F0"/>
+                </a:solidFill>
+              </a:rPr>
+              <a:t>	Add Package </a:t>
+            </a:r>
+            <a:r>
+              <a:rPr lang="ru-RU" sz="1800" dirty="0"/>
+              <a:t>-</a:t>
+            </a:r>
+            <a:r>
+              <a:rPr lang="en-US" sz="1800" dirty="0"/>
+              <a:t>&gt;</a:t>
+            </a:r>
+            <a:br>
+              <a:rPr lang="ru-RU" sz="1800" dirty="0">
+                <a:solidFill>
+                  <a:srgbClr val="00B0F0"/>
+                </a:solidFill>
+              </a:rPr>
+            </a:br>
+            <a:r>
+              <a:rPr lang="ru-RU" sz="1800" dirty="0">
+                <a:solidFill>
+                  <a:srgbClr val="00B0F0"/>
+                </a:solidFill>
+              </a:rPr>
+              <a:t>	для того чтобы использовать его в определенном файле </a:t>
+            </a:r>
+            <a:r>
+              <a:rPr lang="ru-RU" sz="1800" dirty="0" err="1">
+                <a:solidFill>
+                  <a:srgbClr val="00B0F0"/>
+                </a:solidFill>
+              </a:rPr>
+              <a:t>нео</a:t>
+            </a:r>
+            <a:r>
+              <a:rPr lang="en-US" sz="1800" dirty="0" err="1">
+                <a:solidFill>
+                  <a:srgbClr val="00B0F0"/>
+                </a:solidFill>
+              </a:rPr>
+              <a:t>б</a:t>
+            </a:r>
+            <a:r>
+              <a:rPr lang="ru-RU" sz="1800" dirty="0" err="1">
+                <a:solidFill>
+                  <a:srgbClr val="00B0F0"/>
+                </a:solidFill>
+              </a:rPr>
+              <a:t>ходимо</a:t>
+            </a:r>
+            <a:r>
+              <a:rPr lang="ru-RU" sz="1800" dirty="0">
+                <a:solidFill>
+                  <a:srgbClr val="00B0F0"/>
+                </a:solidFill>
+              </a:rPr>
+              <a:t> прописать </a:t>
+            </a:r>
+            <a:r>
+              <a:rPr lang="en-US" sz="1800" dirty="0">
+                <a:solidFill>
+                  <a:srgbClr val="00B0F0"/>
+                </a:solidFill>
+              </a:rPr>
+              <a:t>Import </a:t>
+            </a:r>
+            <a:r>
+              <a:rPr lang="en-US" sz="1800" dirty="0" err="1">
+                <a:solidFill>
+                  <a:srgbClr val="00B0F0"/>
+                </a:solidFill>
+              </a:rPr>
+              <a:t>PackageName</a:t>
+            </a:r>
+            <a:endParaRPr lang="en-US" sz="1800" dirty="0">
+              <a:solidFill>
+                <a:srgbClr val="00B0F0"/>
+              </a:solidFill>
+            </a:endParaRPr>
+          </a:p>
+          <a:p>
+            <a:pPr marL="0" indent="0">
+              <a:buNone/>
+            </a:pPr>
+            <a:endParaRPr lang="en-US" sz="1800" dirty="0">
+              <a:solidFill>
+                <a:srgbClr val="00B0F0"/>
+              </a:solidFill>
+            </a:endParaRPr>
           </a:p>
         </p:txBody>
       </p:sp>
     </p:spTree>
     <p:extLst>
       <p:ext uri="{BB962C8B-B14F-4D97-AF65-F5344CB8AC3E}">
-        <p14:creationId xmlns:p14="http://schemas.microsoft.com/office/powerpoint/2010/main" val="437361289"/>
+        <p14:creationId xmlns:p14="http://schemas.microsoft.com/office/powerpoint/2010/main" val="993302789"/>
       </p:ext>
     </p:extLst>
   </p:cSld>
@@ -3638,6 +4249,166 @@
           <p:cNvPr id="2" name="Заголовок 1">
             <a:extLst>
               <a:ext uri="{FF2B5EF4-FFF2-40B4-BE49-F238E27FC236}">
+                <a16:creationId xmlns:a16="http://schemas.microsoft.com/office/drawing/2014/main" id="{8D017F41-CE5E-9344-A3BD-F53B4C3654DC}"/>
+              </a:ext>
+            </a:extLst>
+          </p:cNvPr>
+          <p:cNvSpPr>
+            <a:spLocks noGrp="1"/>
+          </p:cNvSpPr>
+          <p:nvPr>
+            <p:ph type="title"/>
+          </p:nvPr>
+        </p:nvSpPr>
+        <p:spPr/>
+        <p:txBody>
+          <a:bodyPr/>
+          <a:lstStyle/>
+          <a:p>
+            <a:endParaRPr lang="ru-RU"/>
+          </a:p>
+        </p:txBody>
+      </p:sp>
+      <p:sp>
+        <p:nvSpPr>
+          <p:cNvPr id="3" name="Объект 2">
+            <a:extLst>
+              <a:ext uri="{FF2B5EF4-FFF2-40B4-BE49-F238E27FC236}">
+                <a16:creationId xmlns:a16="http://schemas.microsoft.com/office/drawing/2014/main" id="{61226E40-52F3-604F-9FE1-82A745B5C41C}"/>
+              </a:ext>
+            </a:extLst>
+          </p:cNvPr>
+          <p:cNvSpPr>
+            <a:spLocks noGrp="1"/>
+          </p:cNvSpPr>
+          <p:nvPr>
+            <p:ph idx="1"/>
+          </p:nvPr>
+        </p:nvSpPr>
+        <p:spPr/>
+        <p:txBody>
+          <a:bodyPr/>
+          <a:lstStyle/>
+          <a:p>
+            <a:endParaRPr lang="ru-RU"/>
+          </a:p>
+        </p:txBody>
+      </p:sp>
+    </p:spTree>
+    <p:extLst>
+      <p:ext uri="{BB962C8B-B14F-4D97-AF65-F5344CB8AC3E}">
+        <p14:creationId xmlns:p14="http://schemas.microsoft.com/office/powerpoint/2010/main" val="779840239"/>
+      </p:ext>
+    </p:extLst>
+  </p:cSld>
+  <p:clrMapOvr>
+    <a:masterClrMapping/>
+  </p:clrMapOvr>
+</p:sld>
+</file>
+
+<file path=ppt/slides/slide7.xml><?xml version="1.0" encoding="utf-8"?>
+<p:sld xmlns:a="http://schemas.openxmlformats.org/drawingml/2006/main" xmlns:r="http://schemas.openxmlformats.org/officeDocument/2006/relationships" xmlns:p="http://schemas.openxmlformats.org/presentationml/2006/main">
+  <p:cSld>
+    <p:spTree>
+      <p:nvGrpSpPr>
+        <p:cNvPr id="1" name=""/>
+        <p:cNvGrpSpPr/>
+        <p:nvPr/>
+      </p:nvGrpSpPr>
+      <p:grpSpPr>
+        <a:xfrm>
+          <a:off x="0" y="0"/>
+          <a:ext cx="0" cy="0"/>
+          <a:chOff x="0" y="0"/>
+          <a:chExt cx="0" cy="0"/>
+        </a:xfrm>
+      </p:grpSpPr>
+      <p:sp>
+        <p:nvSpPr>
+          <p:cNvPr id="2" name="Заголовок 1">
+            <a:extLst>
+              <a:ext uri="{FF2B5EF4-FFF2-40B4-BE49-F238E27FC236}">
+                <a16:creationId xmlns:a16="http://schemas.microsoft.com/office/drawing/2014/main" id="{9CD56EC7-19AB-644C-8AAF-D62AC45CC699}"/>
+              </a:ext>
+            </a:extLst>
+          </p:cNvPr>
+          <p:cNvSpPr>
+            <a:spLocks noGrp="1"/>
+          </p:cNvSpPr>
+          <p:nvPr>
+            <p:ph type="title"/>
+          </p:nvPr>
+        </p:nvSpPr>
+        <p:spPr/>
+        <p:txBody>
+          <a:bodyPr/>
+          <a:lstStyle/>
+          <a:p>
+            <a:endParaRPr lang="ru-RU"/>
+          </a:p>
+        </p:txBody>
+      </p:sp>
+      <p:sp>
+        <p:nvSpPr>
+          <p:cNvPr id="3" name="Объект 2">
+            <a:extLst>
+              <a:ext uri="{FF2B5EF4-FFF2-40B4-BE49-F238E27FC236}">
+                <a16:creationId xmlns:a16="http://schemas.microsoft.com/office/drawing/2014/main" id="{001042F4-D2A0-804B-9E34-387E446FC020}"/>
+              </a:ext>
+            </a:extLst>
+          </p:cNvPr>
+          <p:cNvSpPr>
+            <a:spLocks noGrp="1"/>
+          </p:cNvSpPr>
+          <p:nvPr>
+            <p:ph idx="1"/>
+          </p:nvPr>
+        </p:nvSpPr>
+        <p:spPr/>
+        <p:txBody>
+          <a:bodyPr/>
+          <a:lstStyle/>
+          <a:p>
+            <a:endParaRPr lang="ru-RU"/>
+          </a:p>
+        </p:txBody>
+      </p:sp>
+    </p:spTree>
+    <p:extLst>
+      <p:ext uri="{BB962C8B-B14F-4D97-AF65-F5344CB8AC3E}">
+        <p14:creationId xmlns:p14="http://schemas.microsoft.com/office/powerpoint/2010/main" val="437361289"/>
+      </p:ext>
+    </p:extLst>
+  </p:cSld>
+  <p:clrMapOvr>
+    <a:masterClrMapping/>
+  </p:clrMapOvr>
+</p:sld>
+</file>
+
+<file path=ppt/slides/slide8.xml><?xml version="1.0" encoding="utf-8"?>
+<p:sld xmlns:a="http://schemas.openxmlformats.org/drawingml/2006/main" xmlns:r="http://schemas.openxmlformats.org/officeDocument/2006/relationships" xmlns:p="http://schemas.openxmlformats.org/presentationml/2006/main">
+  <p:cSld>
+    <p:spTree>
+      <p:nvGrpSpPr>
+        <p:cNvPr id="1" name=""/>
+        <p:cNvGrpSpPr/>
+        <p:nvPr/>
+      </p:nvGrpSpPr>
+      <p:grpSpPr>
+        <a:xfrm>
+          <a:off x="0" y="0"/>
+          <a:ext cx="0" cy="0"/>
+          <a:chOff x="0" y="0"/>
+          <a:chExt cx="0" cy="0"/>
+        </a:xfrm>
+      </p:grpSpPr>
+      <p:sp>
+        <p:nvSpPr>
+          <p:cNvPr id="2" name="Заголовок 1">
+            <a:extLst>
+              <a:ext uri="{FF2B5EF4-FFF2-40B4-BE49-F238E27FC236}">
                 <a16:creationId xmlns:a16="http://schemas.microsoft.com/office/drawing/2014/main" id="{2A86018A-3DDC-7F47-95A4-C98240167CF6}"/>
               </a:ext>
             </a:extLst>
@@ -3703,7 +4474,7 @@
 </p:sld>
 </file>
 
-<file path=ppt/slides/slide7.xml><?xml version="1.0" encoding="utf-8"?>
+<file path=ppt/slides/slide9.xml><?xml version="1.0" encoding="utf-8"?>
 <p:sld xmlns:a="http://schemas.openxmlformats.org/drawingml/2006/main" xmlns:r="http://schemas.openxmlformats.org/officeDocument/2006/relationships" xmlns:p="http://schemas.openxmlformats.org/presentationml/2006/main">
   <p:cSld>
     <p:spTree>

</xml_diff>

<commit_message>
The finish line by SnapKit
</commit_message>
<xml_diff>
--- a/Presentation/SnapKit-30.09.2022/SnapKit-Abrosov.pptx
+++ b/Presentation/SnapKit-30.09.2022/SnapKit-Abrosov.pptx
@@ -12,8 +12,11 @@
     <p:sldId id="262" r:id="rId6"/>
     <p:sldId id="261" r:id="rId7"/>
     <p:sldId id="257" r:id="rId8"/>
-    <p:sldId id="258" r:id="rId9"/>
-    <p:sldId id="259" r:id="rId10"/>
+    <p:sldId id="267" r:id="rId9"/>
+    <p:sldId id="268" r:id="rId10"/>
+    <p:sldId id="266" r:id="rId11"/>
+    <p:sldId id="258" r:id="rId12"/>
+    <p:sldId id="259" r:id="rId13"/>
   </p:sldIdLst>
   <p:sldSz cx="12192000" cy="6858000"/>
   <p:notesSz cx="6858000" cy="9144000"/>
@@ -3056,6 +3059,694 @@
 </p:sld>
 </file>
 
+<file path=ppt/slides/slide10.xml><?xml version="1.0" encoding="utf-8"?>
+<p:sld xmlns:a="http://schemas.openxmlformats.org/drawingml/2006/main" xmlns:r="http://schemas.openxmlformats.org/officeDocument/2006/relationships" xmlns:p="http://schemas.openxmlformats.org/presentationml/2006/main">
+  <p:cSld>
+    <p:spTree>
+      <p:nvGrpSpPr>
+        <p:cNvPr id="1" name=""/>
+        <p:cNvGrpSpPr/>
+        <p:nvPr/>
+      </p:nvGrpSpPr>
+      <p:grpSpPr>
+        <a:xfrm>
+          <a:off x="0" y="0"/>
+          <a:ext cx="0" cy="0"/>
+          <a:chOff x="0" y="0"/>
+          <a:chExt cx="0" cy="0"/>
+        </a:xfrm>
+      </p:grpSpPr>
+      <p:sp>
+        <p:nvSpPr>
+          <p:cNvPr id="2" name="Заголовок 1">
+            <a:extLst>
+              <a:ext uri="{FF2B5EF4-FFF2-40B4-BE49-F238E27FC236}">
+                <a16:creationId xmlns:a16="http://schemas.microsoft.com/office/drawing/2014/main" id="{348C6830-F424-BA44-B359-976EAF51B45B}"/>
+              </a:ext>
+            </a:extLst>
+          </p:cNvPr>
+          <p:cNvSpPr>
+            <a:spLocks noGrp="1"/>
+          </p:cNvSpPr>
+          <p:nvPr>
+            <p:ph type="title"/>
+          </p:nvPr>
+        </p:nvSpPr>
+        <p:spPr/>
+        <p:txBody>
+          <a:bodyPr/>
+          <a:lstStyle/>
+          <a:p>
+            <a:r>
+              <a:rPr lang="ru-RU" dirty="0">
+                <a:solidFill>
+                  <a:srgbClr val="7030A0"/>
+                </a:solidFill>
+              </a:rPr>
+              <a:t>Важно помнить</a:t>
+            </a:r>
+          </a:p>
+        </p:txBody>
+      </p:sp>
+      <p:sp>
+        <p:nvSpPr>
+          <p:cNvPr id="3" name="Объект 2">
+            <a:extLst>
+              <a:ext uri="{FF2B5EF4-FFF2-40B4-BE49-F238E27FC236}">
+                <a16:creationId xmlns:a16="http://schemas.microsoft.com/office/drawing/2014/main" id="{EC75D68A-F143-5646-8B68-5E14941738E4}"/>
+              </a:ext>
+            </a:extLst>
+          </p:cNvPr>
+          <p:cNvSpPr>
+            <a:spLocks noGrp="1"/>
+          </p:cNvSpPr>
+          <p:nvPr>
+            <p:ph idx="1"/>
+          </p:nvPr>
+        </p:nvSpPr>
+        <p:spPr/>
+        <p:txBody>
+          <a:bodyPr/>
+          <a:lstStyle/>
+          <a:p>
+            <a:pPr algn="l" rtl="0">
+              <a:buFont typeface="Arial" panose="020B0604020202020204" pitchFamily="34" charset="0"/>
+              <a:buChar char="•"/>
+            </a:pPr>
+            <a:r>
+              <a:rPr lang="ru-RU" b="0" i="0" u="none" strike="noStrike" dirty="0">
+                <a:solidFill>
+                  <a:srgbClr val="FFFF00"/>
+                </a:solidFill>
+                <a:effectLst/>
+              </a:rPr>
+              <a:t>Минимальная версия библиотеки </a:t>
+            </a:r>
+            <a:r>
+              <a:rPr lang="en" b="0" i="0" u="none" strike="noStrike" dirty="0">
+                <a:solidFill>
+                  <a:srgbClr val="FFFF00"/>
+                </a:solidFill>
+                <a:effectLst/>
+              </a:rPr>
+              <a:t>- iOS8</a:t>
+            </a:r>
+            <a:endParaRPr lang="ru-RU" b="0" i="0" u="none" strike="noStrike" dirty="0">
+              <a:solidFill>
+                <a:srgbClr val="FFFF00"/>
+              </a:solidFill>
+              <a:effectLst/>
+            </a:endParaRPr>
+          </a:p>
+          <a:p>
+            <a:pPr algn="l" rtl="0">
+              <a:buFont typeface="Arial" panose="020B0604020202020204" pitchFamily="34" charset="0"/>
+              <a:buChar char="•"/>
+            </a:pPr>
+            <a:r>
+              <a:rPr lang="ru-RU" b="0" i="0" u="none" strike="noStrike" dirty="0">
+                <a:effectLst/>
+              </a:rPr>
+              <a:t>Перед использованием </a:t>
+            </a:r>
+            <a:r>
+              <a:rPr lang="en" b="0" i="0" u="none" strike="noStrike" dirty="0" err="1">
+                <a:effectLst/>
+              </a:rPr>
+              <a:t>SnapKit</a:t>
+            </a:r>
+            <a:r>
+              <a:rPr lang="en" b="0" i="0" u="none" strike="noStrike" dirty="0">
+                <a:effectLst/>
+              </a:rPr>
+              <a:t> </a:t>
+            </a:r>
+            <a:r>
+              <a:rPr lang="ru-RU" b="0" i="0" u="none" strike="noStrike" dirty="0">
+                <a:solidFill>
+                  <a:srgbClr val="FFFF00"/>
+                </a:solidFill>
+                <a:effectLst/>
+              </a:rPr>
+              <a:t>обязательно добавьте</a:t>
+            </a:r>
+            <a:r>
+              <a:rPr lang="ru-RU" b="0" i="0" u="none" strike="noStrike" dirty="0">
+                <a:effectLst/>
+              </a:rPr>
+              <a:t> связанные дочерние элементы управления </a:t>
+            </a:r>
+            <a:r>
+              <a:rPr lang="ru-RU" b="0" i="0" u="none" strike="noStrike" dirty="0">
+                <a:solidFill>
+                  <a:srgbClr val="FFFF00"/>
+                </a:solidFill>
+                <a:effectLst/>
+              </a:rPr>
+              <a:t>в родительский </a:t>
+            </a:r>
+            <a:r>
+              <a:rPr lang="en" b="0" i="0" u="none" strike="noStrike" dirty="0">
+                <a:solidFill>
+                  <a:srgbClr val="FFFF00"/>
+                </a:solidFill>
+                <a:effectLst/>
+              </a:rPr>
+              <a:t>View</a:t>
+            </a:r>
+          </a:p>
+          <a:p>
+            <a:pPr algn="l" rtl="0">
+              <a:buFont typeface="Arial" panose="020B0604020202020204" pitchFamily="34" charset="0"/>
+              <a:buChar char="•"/>
+            </a:pPr>
+            <a:r>
+              <a:rPr lang="en" b="0" i="0" u="none" strike="noStrike" dirty="0" err="1">
+                <a:effectLst/>
+              </a:rPr>
+              <a:t>SnapKit</a:t>
+            </a:r>
+            <a:r>
+              <a:rPr lang="en" b="0" i="0" u="none" strike="noStrike" dirty="0">
+                <a:effectLst/>
+              </a:rPr>
+              <a:t> </a:t>
+            </a:r>
+            <a:r>
+              <a:rPr lang="ru-RU" b="0" i="0" u="none" strike="noStrike" dirty="0">
+                <a:solidFill>
+                  <a:srgbClr val="FFFF00"/>
+                </a:solidFill>
+                <a:effectLst/>
+              </a:rPr>
+              <a:t>не поддерживает </a:t>
+            </a:r>
+            <a:r>
+              <a:rPr lang="en" b="0" i="0" u="none" strike="noStrike" dirty="0">
+                <a:solidFill>
+                  <a:srgbClr val="FFFF00"/>
+                </a:solidFill>
+                <a:effectLst/>
+              </a:rPr>
+              <a:t>IB (</a:t>
+            </a:r>
+            <a:r>
+              <a:rPr lang="en-US" b="0" i="0" u="none" strike="noStrike" dirty="0">
+                <a:solidFill>
+                  <a:srgbClr val="FFFF00"/>
+                </a:solidFill>
+                <a:effectLst/>
+              </a:rPr>
+              <a:t>Interface builder</a:t>
+            </a:r>
+            <a:r>
+              <a:rPr lang="en-US" dirty="0">
+                <a:solidFill>
+                  <a:srgbClr val="FFFF00"/>
+                </a:solidFill>
+              </a:rPr>
+              <a:t>)</a:t>
+            </a:r>
+            <a:endParaRPr lang="en" b="0" i="0" u="none" strike="noStrike" dirty="0">
+              <a:solidFill>
+                <a:srgbClr val="FFFF00"/>
+              </a:solidFill>
+              <a:effectLst/>
+            </a:endParaRPr>
+          </a:p>
+          <a:p>
+            <a:pPr algn="l" rtl="0">
+              <a:buFont typeface="Arial" panose="020B0604020202020204" pitchFamily="34" charset="0"/>
+              <a:buChar char="•"/>
+            </a:pPr>
+            <a:r>
+              <a:rPr lang="ru-RU" b="0" i="0" u="none" strike="noStrike" dirty="0">
+                <a:effectLst/>
+              </a:rPr>
+              <a:t>Поддержка</a:t>
+            </a:r>
+            <a:r>
+              <a:rPr lang="en-US" b="0" i="0" u="none" strike="noStrike" dirty="0">
+                <a:effectLst/>
+              </a:rPr>
+              <a:t>:</a:t>
+            </a:r>
+            <a:r>
+              <a:rPr lang="en-US" dirty="0"/>
+              <a:t> </a:t>
+            </a:r>
+            <a:r>
+              <a:rPr lang="en" b="0" i="0" u="none" strike="noStrike" dirty="0">
+                <a:solidFill>
+                  <a:srgbClr val="FFFF00"/>
+                </a:solidFill>
+                <a:effectLst/>
+              </a:rPr>
+              <a:t>make.</a:t>
+            </a:r>
+            <a:r>
+              <a:rPr lang="en" dirty="0">
+                <a:solidFill>
+                  <a:srgbClr val="FFFF00"/>
+                </a:solidFill>
+              </a:rPr>
+              <a:t>***</a:t>
+            </a:r>
+            <a:r>
+              <a:rPr lang="en" b="0" i="0" u="none" strike="noStrike" dirty="0">
+                <a:solidFill>
+                  <a:srgbClr val="FFFF00"/>
+                </a:solidFill>
+                <a:effectLst/>
+              </a:rPr>
+              <a:t>.</a:t>
+            </a:r>
+            <a:r>
+              <a:rPr lang="en" dirty="0">
+                <a:solidFill>
+                  <a:srgbClr val="FFFF00"/>
+                </a:solidFill>
+              </a:rPr>
+              <a:t>***</a:t>
+            </a:r>
+            <a:r>
+              <a:rPr lang="en" b="0" i="0" u="none" strike="noStrike" dirty="0">
+                <a:solidFill>
+                  <a:srgbClr val="FFFF00"/>
+                </a:solidFill>
+                <a:effectLst/>
+              </a:rPr>
+              <a:t>.</a:t>
+            </a:r>
+            <a:r>
+              <a:rPr lang="en" b="0" i="0" u="none" strike="noStrike" dirty="0" err="1">
+                <a:solidFill>
+                  <a:srgbClr val="FFFF00"/>
+                </a:solidFill>
+                <a:effectLst/>
+              </a:rPr>
+              <a:t>equalTo</a:t>
+            </a:r>
+            <a:r>
+              <a:rPr lang="en" b="0" i="0" u="none" strike="noStrike" dirty="0">
+                <a:solidFill>
+                  <a:srgbClr val="FFFF00"/>
+                </a:solidFill>
+                <a:effectLst/>
+              </a:rPr>
+              <a:t>(</a:t>
+            </a:r>
+            <a:r>
+              <a:rPr lang="en" b="0" i="0" u="none" strike="noStrike" dirty="0" err="1">
+                <a:solidFill>
+                  <a:srgbClr val="FFFF00"/>
+                </a:solidFill>
+                <a:effectLst/>
+              </a:rPr>
+              <a:t>bgView</a:t>
+            </a:r>
+            <a:r>
+              <a:rPr lang="en" b="0" i="0" u="none" strike="noStrike" dirty="0">
+                <a:solidFill>
+                  <a:srgbClr val="FFFF00"/>
+                </a:solidFill>
+                <a:effectLst/>
+              </a:rPr>
+              <a:t>).offset(20)</a:t>
+            </a:r>
+            <a:br>
+              <a:rPr lang="ru-RU" b="0" i="0" u="none" strike="noStrike" dirty="0">
+                <a:solidFill>
+                  <a:srgbClr val="FFFF00"/>
+                </a:solidFill>
+                <a:effectLst/>
+              </a:rPr>
+            </a:br>
+            <a:r>
+              <a:rPr lang="ru-RU" b="0" i="0" u="none" strike="noStrike" dirty="0">
+                <a:effectLst/>
+              </a:rPr>
+              <a:t>Например: </a:t>
+            </a:r>
+            <a:r>
+              <a:rPr lang="en-US" b="0" i="0" u="none" strike="noStrike" dirty="0">
+                <a:effectLst/>
+              </a:rPr>
+              <a:t>  </a:t>
+            </a:r>
+            <a:r>
+              <a:rPr lang="en" b="0" i="0" u="none" strike="noStrike" dirty="0" err="1">
+                <a:solidFill>
+                  <a:srgbClr val="FFFF00"/>
+                </a:solidFill>
+                <a:effectLst/>
+              </a:rPr>
+              <a:t>make.left.top.equalTo</a:t>
+            </a:r>
+            <a:r>
+              <a:rPr lang="en" b="0" i="0" u="none" strike="noStrike" dirty="0">
+                <a:solidFill>
+                  <a:srgbClr val="FFFF00"/>
+                </a:solidFill>
+                <a:effectLst/>
+              </a:rPr>
+              <a:t> (some).offset(20)</a:t>
+            </a:r>
+            <a:endParaRPr lang="ru-RU" dirty="0">
+              <a:solidFill>
+                <a:srgbClr val="FFFF00"/>
+              </a:solidFill>
+            </a:endParaRPr>
+          </a:p>
+        </p:txBody>
+      </p:sp>
+    </p:spTree>
+    <p:extLst>
+      <p:ext uri="{BB962C8B-B14F-4D97-AF65-F5344CB8AC3E}">
+        <p14:creationId xmlns:p14="http://schemas.microsoft.com/office/powerpoint/2010/main" val="3678333215"/>
+      </p:ext>
+    </p:extLst>
+  </p:cSld>
+  <p:clrMapOvr>
+    <a:masterClrMapping/>
+  </p:clrMapOvr>
+</p:sld>
+</file>
+
+<file path=ppt/slides/slide11.xml><?xml version="1.0" encoding="utf-8"?>
+<p:sld xmlns:a="http://schemas.openxmlformats.org/drawingml/2006/main" xmlns:r="http://schemas.openxmlformats.org/officeDocument/2006/relationships" xmlns:p="http://schemas.openxmlformats.org/presentationml/2006/main">
+  <p:cSld>
+    <p:spTree>
+      <p:nvGrpSpPr>
+        <p:cNvPr id="1" name=""/>
+        <p:cNvGrpSpPr/>
+        <p:nvPr/>
+      </p:nvGrpSpPr>
+      <p:grpSpPr>
+        <a:xfrm>
+          <a:off x="0" y="0"/>
+          <a:ext cx="0" cy="0"/>
+          <a:chOff x="0" y="0"/>
+          <a:chExt cx="0" cy="0"/>
+        </a:xfrm>
+      </p:grpSpPr>
+      <p:sp>
+        <p:nvSpPr>
+          <p:cNvPr id="2" name="Заголовок 1">
+            <a:extLst>
+              <a:ext uri="{FF2B5EF4-FFF2-40B4-BE49-F238E27FC236}">
+                <a16:creationId xmlns:a16="http://schemas.microsoft.com/office/drawing/2014/main" id="{2A86018A-3DDC-7F47-95A4-C98240167CF6}"/>
+              </a:ext>
+            </a:extLst>
+          </p:cNvPr>
+          <p:cNvSpPr>
+            <a:spLocks noGrp="1"/>
+          </p:cNvSpPr>
+          <p:nvPr>
+            <p:ph type="title"/>
+          </p:nvPr>
+        </p:nvSpPr>
+        <p:spPr/>
+        <p:txBody>
+          <a:bodyPr/>
+          <a:lstStyle/>
+          <a:p>
+            <a:r>
+              <a:rPr lang="ru-RU" dirty="0">
+                <a:solidFill>
+                  <a:srgbClr val="7030A0"/>
+                </a:solidFill>
+              </a:rPr>
+              <a:t>Ссылки</a:t>
+            </a:r>
+          </a:p>
+        </p:txBody>
+      </p:sp>
+      <p:sp>
+        <p:nvSpPr>
+          <p:cNvPr id="3" name="Объект 2">
+            <a:extLst>
+              <a:ext uri="{FF2B5EF4-FFF2-40B4-BE49-F238E27FC236}">
+                <a16:creationId xmlns:a16="http://schemas.microsoft.com/office/drawing/2014/main" id="{E77815A6-FEDC-834D-B9AC-A24998715AD3}"/>
+              </a:ext>
+            </a:extLst>
+          </p:cNvPr>
+          <p:cNvSpPr>
+            <a:spLocks noGrp="1"/>
+          </p:cNvSpPr>
+          <p:nvPr>
+            <p:ph idx="1"/>
+          </p:nvPr>
+        </p:nvSpPr>
+        <p:spPr/>
+        <p:txBody>
+          <a:bodyPr/>
+          <a:lstStyle/>
+          <a:p>
+            <a:r>
+              <a:rPr lang="ru-RU" dirty="0"/>
+              <a:t>Полезная статья о менеджерах зависимостей</a:t>
+            </a:r>
+            <a:r>
+              <a:rPr lang="en-US" dirty="0"/>
+              <a:t>:</a:t>
+            </a:r>
+          </a:p>
+          <a:p>
+            <a:pPr lvl="1"/>
+            <a:r>
+              <a:rPr lang="en-US" sz="2000" dirty="0">
+                <a:solidFill>
+                  <a:srgbClr val="00B0F0"/>
+                </a:solidFill>
+              </a:rPr>
+              <a:t>https://</a:t>
+            </a:r>
+            <a:r>
+              <a:rPr lang="en-US" sz="2000" dirty="0" err="1">
+                <a:solidFill>
+                  <a:srgbClr val="00B0F0"/>
+                </a:solidFill>
+              </a:rPr>
+              <a:t>habr.com</a:t>
+            </a:r>
+            <a:r>
+              <a:rPr lang="en-US" sz="2000" dirty="0">
+                <a:solidFill>
+                  <a:srgbClr val="00B0F0"/>
+                </a:solidFill>
+              </a:rPr>
+              <a:t>/</a:t>
+            </a:r>
+            <a:r>
+              <a:rPr lang="en-US" sz="2000" dirty="0" err="1">
+                <a:solidFill>
+                  <a:srgbClr val="00B0F0"/>
+                </a:solidFill>
+              </a:rPr>
+              <a:t>ru</a:t>
+            </a:r>
+            <a:r>
+              <a:rPr lang="en-US" sz="2000" dirty="0">
+                <a:solidFill>
+                  <a:srgbClr val="00B0F0"/>
+                </a:solidFill>
+              </a:rPr>
+              <a:t>/company/</a:t>
+            </a:r>
+            <a:r>
+              <a:rPr lang="en-US" sz="2000" dirty="0" err="1">
+                <a:solidFill>
+                  <a:srgbClr val="00B0F0"/>
+                </a:solidFill>
+              </a:rPr>
+              <a:t>redmadrobot</a:t>
+            </a:r>
+            <a:r>
+              <a:rPr lang="en-US" sz="2000" dirty="0">
+                <a:solidFill>
+                  <a:srgbClr val="00B0F0"/>
+                </a:solidFill>
+              </a:rPr>
+              <a:t>/blog/412945/?</a:t>
+            </a:r>
+            <a:r>
+              <a:rPr lang="en-US" sz="2000" dirty="0" err="1">
+                <a:solidFill>
+                  <a:srgbClr val="00B0F0"/>
+                </a:solidFill>
+              </a:rPr>
+              <a:t>ysclid</a:t>
+            </a:r>
+            <a:r>
+              <a:rPr lang="en-US" sz="2000" dirty="0">
+                <a:solidFill>
+                  <a:srgbClr val="00B0F0"/>
+                </a:solidFill>
+              </a:rPr>
+              <a:t>=l88vxrddgb490199373</a:t>
+            </a:r>
+          </a:p>
+          <a:p>
+            <a:pPr marL="457200" lvl="1" indent="0">
+              <a:buNone/>
+            </a:pPr>
+            <a:endParaRPr lang="en-US" sz="2000" dirty="0">
+              <a:solidFill>
+                <a:srgbClr val="00B0F0"/>
+              </a:solidFill>
+            </a:endParaRPr>
+          </a:p>
+          <a:p>
+            <a:r>
+              <a:rPr lang="ru-RU" dirty="0"/>
+              <a:t>Основной функционал + пара ссылок с сайта</a:t>
+            </a:r>
+            <a:r>
+              <a:rPr lang="en-US" dirty="0"/>
+              <a:t>:</a:t>
+            </a:r>
+          </a:p>
+          <a:p>
+            <a:pPr lvl="1"/>
+            <a:r>
+              <a:rPr lang="en-US" sz="2000" dirty="0">
+                <a:solidFill>
+                  <a:srgbClr val="00B0F0"/>
+                </a:solidFill>
+              </a:rPr>
+              <a:t>https://</a:t>
+            </a:r>
+            <a:r>
+              <a:rPr lang="en-US" sz="2000" dirty="0" err="1">
+                <a:solidFill>
+                  <a:srgbClr val="00B0F0"/>
+                </a:solidFill>
+              </a:rPr>
+              <a:t>russianblogs.com</a:t>
+            </a:r>
+            <a:r>
+              <a:rPr lang="en-US" sz="2000" dirty="0">
+                <a:solidFill>
+                  <a:srgbClr val="00B0F0"/>
+                </a:solidFill>
+              </a:rPr>
+              <a:t>/article/98251213396/</a:t>
+            </a:r>
+          </a:p>
+          <a:p>
+            <a:pPr lvl="1"/>
+            <a:endParaRPr lang="en-US" sz="2000" dirty="0">
+              <a:solidFill>
+                <a:srgbClr val="00B0F0"/>
+              </a:solidFill>
+            </a:endParaRPr>
+          </a:p>
+          <a:p>
+            <a:endParaRPr lang="ru-RU" dirty="0"/>
+          </a:p>
+        </p:txBody>
+      </p:sp>
+    </p:spTree>
+    <p:extLst>
+      <p:ext uri="{BB962C8B-B14F-4D97-AF65-F5344CB8AC3E}">
+        <p14:creationId xmlns:p14="http://schemas.microsoft.com/office/powerpoint/2010/main" val="2235601987"/>
+      </p:ext>
+    </p:extLst>
+  </p:cSld>
+  <p:clrMapOvr>
+    <a:masterClrMapping/>
+  </p:clrMapOvr>
+</p:sld>
+</file>
+
+<file path=ppt/slides/slide12.xml><?xml version="1.0" encoding="utf-8"?>
+<p:sld xmlns:a="http://schemas.openxmlformats.org/drawingml/2006/main" xmlns:r="http://schemas.openxmlformats.org/officeDocument/2006/relationships" xmlns:p="http://schemas.openxmlformats.org/presentationml/2006/main">
+  <p:cSld>
+    <p:spTree>
+      <p:nvGrpSpPr>
+        <p:cNvPr id="1" name=""/>
+        <p:cNvGrpSpPr/>
+        <p:nvPr/>
+      </p:nvGrpSpPr>
+      <p:grpSpPr>
+        <a:xfrm>
+          <a:off x="0" y="0"/>
+          <a:ext cx="0" cy="0"/>
+          <a:chOff x="0" y="0"/>
+          <a:chExt cx="0" cy="0"/>
+        </a:xfrm>
+      </p:grpSpPr>
+      <p:sp>
+        <p:nvSpPr>
+          <p:cNvPr id="2" name="Заголовок 1">
+            <a:extLst>
+              <a:ext uri="{FF2B5EF4-FFF2-40B4-BE49-F238E27FC236}">
+                <a16:creationId xmlns:a16="http://schemas.microsoft.com/office/drawing/2014/main" id="{50D46732-100B-054B-AA64-AC284177ABC2}"/>
+              </a:ext>
+            </a:extLst>
+          </p:cNvPr>
+          <p:cNvSpPr>
+            <a:spLocks noGrp="1"/>
+          </p:cNvSpPr>
+          <p:nvPr>
+            <p:ph type="ctrTitle"/>
+          </p:nvPr>
+        </p:nvSpPr>
+        <p:spPr/>
+        <p:txBody>
+          <a:bodyPr/>
+          <a:lstStyle/>
+          <a:p>
+            <a:r>
+              <a:rPr lang="ru-RU" dirty="0">
+                <a:solidFill>
+                  <a:srgbClr val="7030A0"/>
+                </a:solidFill>
+              </a:rPr>
+              <a:t>Спасибо за внимание</a:t>
+            </a:r>
+          </a:p>
+        </p:txBody>
+      </p:sp>
+      <p:sp>
+        <p:nvSpPr>
+          <p:cNvPr id="3" name="Подзаголовок 2">
+            <a:extLst>
+              <a:ext uri="{FF2B5EF4-FFF2-40B4-BE49-F238E27FC236}">
+                <a16:creationId xmlns:a16="http://schemas.microsoft.com/office/drawing/2014/main" id="{44C99405-C9C5-B140-A36B-B3EBB49D8403}"/>
+              </a:ext>
+            </a:extLst>
+          </p:cNvPr>
+          <p:cNvSpPr>
+            <a:spLocks noGrp="1"/>
+          </p:cNvSpPr>
+          <p:nvPr>
+            <p:ph type="subTitle" idx="1"/>
+          </p:nvPr>
+        </p:nvSpPr>
+        <p:spPr/>
+        <p:txBody>
+          <a:bodyPr/>
+          <a:lstStyle/>
+          <a:p>
+            <a:endParaRPr lang="ru-RU"/>
+          </a:p>
+        </p:txBody>
+      </p:sp>
+    </p:spTree>
+    <p:extLst>
+      <p:ext uri="{BB962C8B-B14F-4D97-AF65-F5344CB8AC3E}">
+        <p14:creationId xmlns:p14="http://schemas.microsoft.com/office/powerpoint/2010/main" val="203696986"/>
+      </p:ext>
+    </p:extLst>
+  </p:cSld>
+  <p:clrMapOvr>
+    <a:masterClrMapping/>
+  </p:clrMapOvr>
+</p:sld>
+</file>
+
 <file path=ppt/slides/slide2.xml><?xml version="1.0" encoding="utf-8"?>
 <p:sld xmlns:a="http://schemas.openxmlformats.org/drawingml/2006/main" xmlns:r="http://schemas.openxmlformats.org/officeDocument/2006/relationships" xmlns:p="http://schemas.openxmlformats.org/presentationml/2006/main">
   <p:cSld>
@@ -4265,7 +4956,61 @@
           <a:bodyPr/>
           <a:lstStyle/>
           <a:p>
-            <a:endParaRPr lang="ru-RU"/>
+            <a:r>
+              <a:rPr lang="ru-RU" dirty="0">
+                <a:solidFill>
+                  <a:srgbClr val="7030A0"/>
+                </a:solidFill>
+              </a:rPr>
+              <a:t>Основы работы</a:t>
+            </a:r>
+            <a:r>
+              <a:rPr lang="en-US" dirty="0">
+                <a:solidFill>
+                  <a:srgbClr val="7030A0"/>
+                </a:solidFill>
+              </a:rPr>
+              <a:t>: </a:t>
+            </a:r>
+            <a:r>
+              <a:rPr lang="ru-RU" dirty="0">
+                <a:solidFill>
+                  <a:srgbClr val="7030A0"/>
+                </a:solidFill>
+              </a:rPr>
+              <a:t>д</a:t>
+            </a:r>
+            <a:r>
+              <a:rPr lang="ru-RU" sz="4400" dirty="0">
+                <a:solidFill>
+                  <a:srgbClr val="7030A0"/>
+                </a:solidFill>
+              </a:rPr>
+              <a:t>обавляем</a:t>
+            </a:r>
+            <a:r>
+              <a:rPr lang="ru-RU" sz="4400" dirty="0">
+                <a:solidFill>
+                  <a:srgbClr val="7030A0"/>
+                </a:solidFill>
+                <a:effectLst/>
+              </a:rPr>
+              <a:t> </a:t>
+            </a:r>
+            <a:r>
+              <a:rPr lang="ru-RU" sz="4400" dirty="0" err="1">
+                <a:solidFill>
+                  <a:srgbClr val="7030A0"/>
+                </a:solidFill>
+                <a:effectLst/>
+              </a:rPr>
+              <a:t>констрейнты</a:t>
+            </a:r>
+            <a:endParaRPr lang="ru-RU" dirty="0">
+              <a:solidFill>
+                <a:srgbClr val="7030A0"/>
+              </a:solidFill>
+            </a:endParaRPr>
           </a:p>
         </p:txBody>
       </p:sp>
@@ -4285,12 +5030,796 @@
             <p:ph idx="1"/>
           </p:nvPr>
         </p:nvSpPr>
-        <p:spPr/>
-        <p:txBody>
-          <a:bodyPr/>
-          <a:lstStyle/>
-          <a:p>
-            <a:endParaRPr lang="ru-RU"/>
+        <p:spPr>
+          <a:xfrm>
+            <a:off x="838200" y="1825625"/>
+            <a:ext cx="10515600" cy="4900996"/>
+          </a:xfrm>
+        </p:spPr>
+        <p:txBody>
+          <a:bodyPr>
+            <a:normAutofit fontScale="92500" lnSpcReduction="20000"/>
+          </a:bodyPr>
+          <a:lstStyle/>
+          <a:p>
+            <a:pPr marL="457200" lvl="1" indent="0">
+              <a:buNone/>
+            </a:pPr>
+            <a:r>
+              <a:rPr lang="en" sz="1900" dirty="0" err="1">
+                <a:solidFill>
+                  <a:srgbClr val="00B0F0"/>
+                </a:solidFill>
+                <a:effectLst/>
+              </a:rPr>
+              <a:t>someElement.snp.makeConstraints</a:t>
+            </a:r>
+            <a:r>
+              <a:rPr lang="en" sz="1900" dirty="0">
+                <a:solidFill>
+                  <a:srgbClr val="00B0F0"/>
+                </a:solidFill>
+                <a:effectLst/>
+              </a:rPr>
+              <a:t> { (make) in</a:t>
+            </a:r>
+            <a:endParaRPr lang="ru-RU" sz="1900" dirty="0">
+              <a:solidFill>
+                <a:srgbClr val="00B0F0"/>
+              </a:solidFill>
+              <a:effectLst/>
+            </a:endParaRPr>
+          </a:p>
+          <a:p>
+            <a:pPr marL="457200" lvl="1" indent="0">
+              <a:buNone/>
+            </a:pPr>
+            <a:r>
+              <a:rPr lang="ru-RU" sz="1900" dirty="0">
+                <a:solidFill>
+                  <a:srgbClr val="00B0F0"/>
+                </a:solidFill>
+                <a:effectLst/>
+              </a:rPr>
+              <a:t>	// 0</a:t>
+            </a:r>
+          </a:p>
+          <a:p>
+            <a:pPr marL="457200" lvl="1" indent="0">
+              <a:buNone/>
+            </a:pPr>
+            <a:r>
+              <a:rPr lang="ru-RU" sz="1900" dirty="0">
+                <a:solidFill>
+                  <a:srgbClr val="00B0F0"/>
+                </a:solidFill>
+              </a:rPr>
+              <a:t>	// </a:t>
+            </a:r>
+            <a:r>
+              <a:rPr lang="ru-RU" sz="1900" dirty="0" err="1">
+                <a:solidFill>
+                  <a:srgbClr val="00B0F0"/>
+                </a:solidFill>
+              </a:rPr>
+              <a:t>m</a:t>
+            </a:r>
+            <a:r>
+              <a:rPr lang="en-US" sz="1900" dirty="0" err="1">
+                <a:solidFill>
+                  <a:srgbClr val="00B0F0"/>
+                </a:solidFill>
+              </a:rPr>
+              <a:t>ake.size.equalTo</a:t>
+            </a:r>
+            <a:r>
+              <a:rPr lang="en-US" sz="1900" dirty="0">
+                <a:solidFill>
+                  <a:srgbClr val="00B0F0"/>
+                </a:solidFill>
+              </a:rPr>
+              <a:t>(</a:t>
+            </a:r>
+            <a:r>
+              <a:rPr lang="en-US" sz="1900" dirty="0" err="1">
+                <a:solidFill>
+                  <a:srgbClr val="00B0F0"/>
+                </a:solidFill>
+              </a:rPr>
+              <a:t>CGSize</a:t>
+            </a:r>
+            <a:r>
+              <a:rPr lang="en-US" sz="1900" dirty="0">
+                <a:solidFill>
+                  <a:srgbClr val="00B0F0"/>
+                </a:solidFill>
+              </a:rPr>
+              <a:t>(width: 70, height: 55))s</a:t>
+            </a:r>
+            <a:endParaRPr lang="en" sz="1900" dirty="0">
+              <a:solidFill>
+                <a:srgbClr val="00B0F0"/>
+              </a:solidFill>
+              <a:effectLst/>
+            </a:endParaRPr>
+          </a:p>
+          <a:p>
+            <a:pPr marL="457200" lvl="1" indent="0">
+              <a:buNone/>
+            </a:pPr>
+            <a:r>
+              <a:rPr lang="en" sz="1900" dirty="0">
+                <a:solidFill>
+                  <a:srgbClr val="00B0F0"/>
+                </a:solidFill>
+              </a:rPr>
+              <a:t>	// 1</a:t>
+            </a:r>
+            <a:endParaRPr lang="en" sz="1900" dirty="0">
+              <a:solidFill>
+                <a:srgbClr val="00B0F0"/>
+              </a:solidFill>
+              <a:effectLst/>
+            </a:endParaRPr>
+          </a:p>
+          <a:p>
+            <a:pPr marL="457200" lvl="1" indent="0">
+              <a:buNone/>
+            </a:pPr>
+            <a:r>
+              <a:rPr lang="en" sz="1900" dirty="0">
+                <a:solidFill>
+                  <a:srgbClr val="00B0F0"/>
+                </a:solidFill>
+                <a:effectLst/>
+              </a:rPr>
+              <a:t>	//</a:t>
+            </a:r>
+            <a:r>
+              <a:rPr lang="en" sz="1900" dirty="0" err="1">
+                <a:solidFill>
+                  <a:srgbClr val="00B0F0"/>
+                </a:solidFill>
+                <a:effectLst/>
+              </a:rPr>
+              <a:t>make.</a:t>
+            </a:r>
+            <a:r>
+              <a:rPr lang="en" sz="1900" dirty="0" err="1">
+                <a:solidFill>
+                  <a:srgbClr val="00B0F0"/>
+                </a:solidFill>
+              </a:rPr>
+              <a:t>height.width</a:t>
+            </a:r>
+            <a:r>
+              <a:rPr lang="en" sz="1900" dirty="0" err="1">
+                <a:solidFill>
+                  <a:srgbClr val="00B0F0"/>
+                </a:solidFill>
+                <a:effectLst/>
+              </a:rPr>
+              <a:t>.equalTo</a:t>
+            </a:r>
+            <a:r>
+              <a:rPr lang="en" sz="1900" dirty="0">
+                <a:solidFill>
+                  <a:srgbClr val="00B0F0"/>
+                </a:solidFill>
+                <a:effectLst/>
+              </a:rPr>
+              <a:t>(100)</a:t>
+            </a:r>
+          </a:p>
+          <a:p>
+            <a:pPr marL="457200" lvl="1" indent="0">
+              <a:buNone/>
+            </a:pPr>
+            <a:r>
+              <a:rPr lang="en" sz="1900" dirty="0">
+                <a:solidFill>
+                  <a:srgbClr val="00B0F0"/>
+                </a:solidFill>
+              </a:rPr>
+              <a:t>	//</a:t>
+            </a:r>
+            <a:r>
+              <a:rPr lang="en" sz="1900" dirty="0" err="1">
+                <a:solidFill>
+                  <a:srgbClr val="00B0F0"/>
+                </a:solidFill>
+              </a:rPr>
+              <a:t>make.left.top.bottom.right.equalTo</a:t>
+            </a:r>
+            <a:r>
+              <a:rPr lang="en" sz="1900" dirty="0">
+                <a:solidFill>
+                  <a:srgbClr val="00B0F0"/>
+                </a:solidFill>
+              </a:rPr>
+              <a:t>(</a:t>
+            </a:r>
+            <a:r>
+              <a:rPr lang="en" sz="1900" dirty="0" err="1">
+                <a:solidFill>
+                  <a:srgbClr val="00B0F0"/>
+                </a:solidFill>
+              </a:rPr>
+              <a:t>someView</a:t>
+            </a:r>
+            <a:r>
+              <a:rPr lang="en" sz="1900" dirty="0">
+                <a:solidFill>
+                  <a:srgbClr val="00B0F0"/>
+                </a:solidFill>
+              </a:rPr>
+              <a:t>).inset(35)</a:t>
+            </a:r>
+          </a:p>
+          <a:p>
+            <a:pPr marL="457200" lvl="1" indent="0">
+              <a:buNone/>
+            </a:pPr>
+            <a:r>
+              <a:rPr lang="en" sz="1900" dirty="0">
+                <a:solidFill>
+                  <a:srgbClr val="00B0F0"/>
+                </a:solidFill>
+                <a:effectLst/>
+              </a:rPr>
+              <a:t>	//</a:t>
+            </a:r>
+            <a:r>
+              <a:rPr lang="en" sz="1900" dirty="0" err="1">
+                <a:solidFill>
+                  <a:srgbClr val="00B0F0"/>
+                </a:solidFill>
+                <a:effectLst/>
+              </a:rPr>
+              <a:t>make.center.equalTo</a:t>
+            </a:r>
+            <a:r>
+              <a:rPr lang="en" sz="1900" dirty="0">
+                <a:solidFill>
+                  <a:srgbClr val="00B0F0"/>
+                </a:solidFill>
+                <a:effectLst/>
+              </a:rPr>
+              <a:t>(</a:t>
+            </a:r>
+            <a:r>
+              <a:rPr lang="en" sz="1900" dirty="0" err="1">
+                <a:solidFill>
+                  <a:srgbClr val="00B0F0"/>
+                </a:solidFill>
+              </a:rPr>
+              <a:t>someView</a:t>
+            </a:r>
+            <a:r>
+              <a:rPr lang="en" sz="1900" dirty="0">
+                <a:solidFill>
+                  <a:srgbClr val="00B0F0"/>
+                </a:solidFill>
+                <a:effectLst/>
+              </a:rPr>
+              <a:t>)</a:t>
+            </a:r>
+          </a:p>
+          <a:p>
+            <a:pPr marL="457200" lvl="1" indent="0">
+              <a:buNone/>
+            </a:pPr>
+            <a:r>
+              <a:rPr lang="en" sz="1900" dirty="0">
+                <a:solidFill>
+                  <a:srgbClr val="00B0F0"/>
+                </a:solidFill>
+              </a:rPr>
+              <a:t>	// 2</a:t>
+            </a:r>
+            <a:endParaRPr lang="en" sz="1900" dirty="0">
+              <a:solidFill>
+                <a:srgbClr val="00B0F0"/>
+              </a:solidFill>
+              <a:effectLst/>
+            </a:endParaRPr>
+          </a:p>
+          <a:p>
+            <a:pPr marL="457200" lvl="1" indent="0">
+              <a:buNone/>
+            </a:pPr>
+            <a:r>
+              <a:rPr lang="en" sz="1900" i="0" u="none" strike="noStrike" dirty="0">
+                <a:solidFill>
+                  <a:srgbClr val="ABB2BF"/>
+                </a:solidFill>
+                <a:effectLst/>
+              </a:rPr>
+              <a:t>	</a:t>
+            </a:r>
+            <a:r>
+              <a:rPr lang="en" sz="1900" i="0" u="none" strike="noStrike" dirty="0">
+                <a:solidFill>
+                  <a:srgbClr val="00B0F0"/>
+                </a:solidFill>
+                <a:effectLst/>
+              </a:rPr>
+              <a:t>//</a:t>
+            </a:r>
+            <a:r>
+              <a:rPr lang="en" sz="1900" i="0" u="none" strike="noStrike" dirty="0" err="1">
+                <a:solidFill>
+                  <a:srgbClr val="00B0F0"/>
+                </a:solidFill>
+                <a:effectLst/>
+              </a:rPr>
+              <a:t>make.centerX.equalTo</a:t>
+            </a:r>
+            <a:r>
+              <a:rPr lang="en" sz="1900" i="0" u="none" strike="noStrike" dirty="0">
+                <a:solidFill>
+                  <a:srgbClr val="00B0F0"/>
+                </a:solidFill>
+                <a:effectLst/>
+              </a:rPr>
+              <a:t>(</a:t>
+            </a:r>
+            <a:r>
+              <a:rPr lang="en" sz="1900" dirty="0" err="1">
+                <a:solidFill>
+                  <a:srgbClr val="00B0F0"/>
+                </a:solidFill>
+              </a:rPr>
+              <a:t>someButton</a:t>
+            </a:r>
+            <a:r>
+              <a:rPr lang="en" sz="1900" i="0" u="none" strike="noStrike" dirty="0">
+                <a:solidFill>
+                  <a:srgbClr val="00B0F0"/>
+                </a:solidFill>
+                <a:effectLst/>
+              </a:rPr>
+              <a:t>)</a:t>
+            </a:r>
+          </a:p>
+          <a:p>
+            <a:pPr marL="457200" lvl="1" indent="0">
+              <a:buNone/>
+            </a:pPr>
+            <a:r>
+              <a:rPr lang="en" sz="1900" dirty="0">
+                <a:solidFill>
+                  <a:srgbClr val="00B0F0"/>
+                </a:solidFill>
+              </a:rPr>
+              <a:t>	//</a:t>
+            </a:r>
+            <a:r>
+              <a:rPr lang="en" sz="1900" dirty="0" err="1">
+                <a:solidFill>
+                  <a:srgbClr val="00B0F0"/>
+                </a:solidFill>
+              </a:rPr>
+              <a:t>make.centerY.equalToSuperview</a:t>
+            </a:r>
+            <a:r>
+              <a:rPr lang="en" sz="1900" dirty="0">
+                <a:solidFill>
+                  <a:srgbClr val="00B0F0"/>
+                </a:solidFill>
+              </a:rPr>
+              <a:t>()</a:t>
+            </a:r>
+          </a:p>
+          <a:p>
+            <a:pPr marL="457200" lvl="1" indent="0">
+              <a:buNone/>
+            </a:pPr>
+            <a:r>
+              <a:rPr lang="en" sz="1900" dirty="0">
+                <a:solidFill>
+                  <a:srgbClr val="00B0F0"/>
+                </a:solidFill>
+                <a:effectLst/>
+              </a:rPr>
+              <a:t>	// 3</a:t>
+            </a:r>
+            <a:br>
+              <a:rPr lang="en" sz="1900" dirty="0">
+                <a:solidFill>
+                  <a:srgbClr val="00B0F0"/>
+                </a:solidFill>
+                <a:effectLst/>
+              </a:rPr>
+            </a:br>
+            <a:r>
+              <a:rPr lang="en" sz="1900" dirty="0">
+                <a:solidFill>
+                  <a:srgbClr val="00B0F0"/>
+                </a:solidFill>
+                <a:effectLst/>
+              </a:rPr>
+              <a:t>	//</a:t>
+            </a:r>
+            <a:r>
+              <a:rPr lang="en" sz="1900" dirty="0" err="1">
+                <a:solidFill>
+                  <a:srgbClr val="00B0F0"/>
+                </a:solidFill>
+                <a:effectLst/>
+              </a:rPr>
+              <a:t>make.top.equal</a:t>
+            </a:r>
+            <a:r>
+              <a:rPr lang="en" sz="1900" dirty="0" err="1">
+                <a:solidFill>
+                  <a:srgbClr val="00B0F0"/>
+                </a:solidFill>
+              </a:rPr>
+              <a:t>To</a:t>
+            </a:r>
+            <a:r>
+              <a:rPr lang="en" sz="1900" dirty="0">
+                <a:solidFill>
+                  <a:srgbClr val="00B0F0"/>
+                </a:solidFill>
+              </a:rPr>
+              <a:t>(</a:t>
+            </a:r>
+            <a:r>
+              <a:rPr lang="en" sz="1900" dirty="0" err="1">
+                <a:solidFill>
+                  <a:srgbClr val="00B0F0"/>
+                </a:solidFill>
+              </a:rPr>
+              <a:t>someButton.snp.bottom</a:t>
+            </a:r>
+            <a:r>
+              <a:rPr lang="en" sz="1900" dirty="0">
+                <a:solidFill>
+                  <a:srgbClr val="00B0F0"/>
+                </a:solidFill>
+              </a:rPr>
+              <a:t>).inset(40)</a:t>
+            </a:r>
+          </a:p>
+          <a:p>
+            <a:pPr marL="457200" lvl="1" indent="0">
+              <a:buNone/>
+            </a:pPr>
+            <a:r>
+              <a:rPr lang="en" sz="1900" dirty="0">
+                <a:solidFill>
+                  <a:srgbClr val="00B0F0"/>
+                </a:solidFill>
+              </a:rPr>
+              <a:t>	//</a:t>
+            </a:r>
+            <a:r>
+              <a:rPr lang="en" sz="1900" dirty="0">
+                <a:solidFill>
+                  <a:srgbClr val="00B0F0"/>
+                </a:solidFill>
+                <a:effectLst/>
+              </a:rPr>
+              <a:t> </a:t>
+            </a:r>
+            <a:r>
+              <a:rPr lang="en" sz="1900" dirty="0" err="1">
+                <a:solidFill>
+                  <a:srgbClr val="00B0F0"/>
+                </a:solidFill>
+                <a:effectLst/>
+              </a:rPr>
+              <a:t>make.top.equal</a:t>
+            </a:r>
+            <a:r>
+              <a:rPr lang="en" sz="1900" dirty="0" err="1">
+                <a:solidFill>
+                  <a:srgbClr val="00B0F0"/>
+                </a:solidFill>
+              </a:rPr>
+              <a:t>To</a:t>
+            </a:r>
+            <a:r>
+              <a:rPr lang="en" sz="1900" dirty="0">
+                <a:solidFill>
+                  <a:srgbClr val="00B0F0"/>
+                </a:solidFill>
+              </a:rPr>
+              <a:t>(</a:t>
+            </a:r>
+            <a:r>
+              <a:rPr lang="en" sz="1900" dirty="0" err="1">
+                <a:solidFill>
+                  <a:srgbClr val="00B0F0"/>
+                </a:solidFill>
+              </a:rPr>
+              <a:t>someButton.snp.bottom</a:t>
+            </a:r>
+            <a:r>
+              <a:rPr lang="en" sz="1900" dirty="0">
+                <a:solidFill>
+                  <a:srgbClr val="00B0F0"/>
+                </a:solidFill>
+              </a:rPr>
+              <a:t>).offset(40)</a:t>
+            </a:r>
+          </a:p>
+          <a:p>
+            <a:pPr marL="457200" lvl="1" indent="0">
+              <a:buNone/>
+            </a:pPr>
+            <a:r>
+              <a:rPr lang="en" sz="1900" dirty="0">
+                <a:solidFill>
+                  <a:srgbClr val="00B0F0"/>
+                </a:solidFill>
+                <a:effectLst/>
+              </a:rPr>
+              <a:t>	// 4</a:t>
+            </a:r>
+          </a:p>
+          <a:p>
+            <a:pPr marL="457200" lvl="1" indent="0">
+              <a:buNone/>
+            </a:pPr>
+            <a:r>
+              <a:rPr lang="en" sz="1900" dirty="0">
+                <a:solidFill>
+                  <a:srgbClr val="00B0F0"/>
+                </a:solidFill>
+                <a:effectLst/>
+              </a:rPr>
+              <a:t>	// </a:t>
+            </a:r>
+            <a:r>
+              <a:rPr lang="en" sz="1900" dirty="0" err="1">
+                <a:solidFill>
+                  <a:srgbClr val="00B0F0"/>
+                </a:solidFill>
+                <a:effectLst/>
+              </a:rPr>
+              <a:t>make.</a:t>
+            </a:r>
+            <a:r>
+              <a:rPr lang="en" sz="1900" dirty="0" err="1">
+                <a:solidFill>
+                  <a:srgbClr val="00B0F0"/>
+                </a:solidFill>
+              </a:rPr>
+              <a:t>height.width</a:t>
+            </a:r>
+            <a:r>
+              <a:rPr lang="en" sz="1900" dirty="0" err="1">
+                <a:solidFill>
+                  <a:srgbClr val="00B0F0"/>
+                </a:solidFill>
+                <a:effectLst/>
+              </a:rPr>
+              <a:t>.equalTo</a:t>
+            </a:r>
+            <a:r>
+              <a:rPr lang="en" sz="1900" dirty="0">
+                <a:solidFill>
+                  <a:srgbClr val="00B0F0"/>
+                </a:solidFill>
+                <a:effectLst/>
+              </a:rPr>
+              <a:t>(</a:t>
+            </a:r>
+            <a:r>
+              <a:rPr lang="en" sz="1900" dirty="0" err="1">
+                <a:solidFill>
+                  <a:srgbClr val="00B0F0"/>
+                </a:solidFill>
+                <a:effectLst/>
+              </a:rPr>
+              <a:t>someSome</a:t>
+            </a:r>
+            <a:r>
+              <a:rPr lang="en" sz="1900" dirty="0">
+                <a:solidFill>
+                  <a:srgbClr val="00B0F0"/>
+                </a:solidFill>
+                <a:effectLst/>
+              </a:rPr>
+              <a:t>).</a:t>
+            </a:r>
+            <a:r>
+              <a:rPr lang="en" sz="1900" dirty="0" err="1">
+                <a:solidFill>
+                  <a:srgbClr val="00B0F0"/>
+                </a:solidFill>
+                <a:effectLst/>
+              </a:rPr>
+              <a:t>multipliedBy</a:t>
+            </a:r>
+            <a:r>
+              <a:rPr lang="en" sz="1900" dirty="0">
+                <a:solidFill>
+                  <a:srgbClr val="00B0F0"/>
+                </a:solidFill>
+                <a:effectLst/>
+              </a:rPr>
+              <a:t>(0.5)</a:t>
+            </a:r>
+            <a:endParaRPr lang="ru-RU" sz="1900" dirty="0">
+              <a:solidFill>
+                <a:srgbClr val="00B0F0"/>
+              </a:solidFill>
+              <a:effectLst/>
+            </a:endParaRPr>
+          </a:p>
+          <a:p>
+            <a:pPr marL="457200" lvl="1" indent="0">
+              <a:buNone/>
+            </a:pPr>
+            <a:r>
+              <a:rPr lang="ru-RU" sz="1900" dirty="0">
+                <a:solidFill>
+                  <a:srgbClr val="00B0F0"/>
+                </a:solidFill>
+                <a:effectLst/>
+              </a:rPr>
+              <a:t>	// 5</a:t>
+            </a:r>
+            <a:r>
+              <a:rPr lang="en-US" sz="1900" dirty="0">
+                <a:solidFill>
+                  <a:srgbClr val="00B0F0"/>
+                </a:solidFill>
+                <a:effectLst/>
+              </a:rPr>
+              <a:t> – </a:t>
+            </a:r>
+            <a:r>
+              <a:rPr lang="ru-RU" sz="1900" dirty="0">
+                <a:solidFill>
+                  <a:srgbClr val="00B0F0"/>
+                </a:solidFill>
+                <a:effectLst/>
+              </a:rPr>
+              <a:t>приоритеты </a:t>
+            </a:r>
+            <a:r>
+              <a:rPr lang="en" sz="1900" b="0" i="0" u="none" strike="noStrike" dirty="0">
+                <a:solidFill>
+                  <a:srgbClr val="00B0F0"/>
+                </a:solidFill>
+                <a:effectLst/>
+              </a:rPr>
+              <a:t>(.low, .medium, .high, .require)</a:t>
+            </a:r>
+            <a:endParaRPr lang="ru-RU" sz="1900" dirty="0">
+              <a:solidFill>
+                <a:srgbClr val="00B0F0"/>
+              </a:solidFill>
+              <a:effectLst/>
+            </a:endParaRPr>
+          </a:p>
+          <a:p>
+            <a:pPr marL="457200" lvl="1" indent="0">
+              <a:buNone/>
+            </a:pPr>
+            <a:r>
+              <a:rPr lang="ru-RU" sz="1900" dirty="0">
+                <a:solidFill>
+                  <a:srgbClr val="00B0F0"/>
+                </a:solidFill>
+                <a:effectLst/>
+              </a:rPr>
+              <a:t>	// </a:t>
+            </a:r>
+            <a:r>
+              <a:rPr lang="en" sz="1900" dirty="0" err="1">
+                <a:solidFill>
+                  <a:srgbClr val="00B0F0"/>
+                </a:solidFill>
+                <a:effectLst/>
+              </a:rPr>
+              <a:t>make.left.equalTo</a:t>
+            </a:r>
+            <a:r>
+              <a:rPr lang="en" sz="1900" dirty="0">
+                <a:solidFill>
+                  <a:srgbClr val="00B0F0"/>
+                </a:solidFill>
+                <a:effectLst/>
+              </a:rPr>
+              <a:t>(</a:t>
+            </a:r>
+            <a:r>
+              <a:rPr lang="en" sz="1900" dirty="0" err="1">
+                <a:solidFill>
+                  <a:srgbClr val="00B0F0"/>
+                </a:solidFill>
+                <a:effectLst/>
+              </a:rPr>
+              <a:t>label.snp.left</a:t>
+            </a:r>
+            <a:r>
+              <a:rPr lang="en" sz="1900" dirty="0">
+                <a:solidFill>
+                  <a:srgbClr val="00B0F0"/>
+                </a:solidFill>
+                <a:effectLst/>
+              </a:rPr>
+              <a:t>).priority(500)</a:t>
+            </a:r>
+          </a:p>
+          <a:p>
+            <a:pPr marL="457200" lvl="1" indent="0">
+              <a:buNone/>
+            </a:pPr>
+            <a:r>
+              <a:rPr lang="ru-RU" sz="1900" dirty="0">
+                <a:solidFill>
+                  <a:srgbClr val="00B0F0"/>
+                </a:solidFill>
+                <a:effectLst/>
+              </a:rPr>
+              <a:t>	// </a:t>
+            </a:r>
+            <a:r>
+              <a:rPr lang="en" sz="1900" dirty="0" err="1">
+                <a:solidFill>
+                  <a:srgbClr val="00B0F0"/>
+                </a:solidFill>
+                <a:effectLst/>
+              </a:rPr>
+              <a:t>make.left.equalTo</a:t>
+            </a:r>
+            <a:r>
+              <a:rPr lang="en" sz="1900" dirty="0">
+                <a:solidFill>
+                  <a:srgbClr val="00B0F0"/>
+                </a:solidFill>
+                <a:effectLst/>
+              </a:rPr>
+              <a:t>(</a:t>
+            </a:r>
+            <a:r>
+              <a:rPr lang="en" sz="1900" dirty="0" err="1">
+                <a:solidFill>
+                  <a:srgbClr val="00B0F0"/>
+                </a:solidFill>
+                <a:effectLst/>
+              </a:rPr>
+              <a:t>label.snp.left</a:t>
+            </a:r>
+            <a:r>
+              <a:rPr lang="en" sz="1900" dirty="0">
+                <a:solidFill>
+                  <a:srgbClr val="00B0F0"/>
+                </a:solidFill>
+                <a:effectLst/>
+              </a:rPr>
+              <a:t>).priority(.high)</a:t>
+            </a:r>
+          </a:p>
+          <a:p>
+            <a:pPr marL="457200" lvl="1" indent="0">
+              <a:buNone/>
+            </a:pPr>
+            <a:r>
+              <a:rPr lang="en" sz="1900" dirty="0">
+                <a:solidFill>
+                  <a:srgbClr val="00B0F0"/>
+                </a:solidFill>
+                <a:effectLst/>
+              </a:rPr>
+              <a:t>}</a:t>
+            </a:r>
+          </a:p>
+          <a:p>
+            <a:pPr marL="0" indent="0">
+              <a:buNone/>
+            </a:pPr>
+            <a:endParaRPr lang="ru-RU" dirty="0"/>
+          </a:p>
+          <a:p>
+            <a:endParaRPr lang="ru-RU" dirty="0"/>
           </a:p>
         </p:txBody>
       </p:sp>
@@ -4345,35 +5874,78 @@
           <a:bodyPr/>
           <a:lstStyle/>
           <a:p>
-            <a:endParaRPr lang="ru-RU"/>
-          </a:p>
-        </p:txBody>
-      </p:sp>
-      <p:sp>
-        <p:nvSpPr>
-          <p:cNvPr id="3" name="Объект 2">
+            <a:r>
+              <a:rPr lang="ru-RU" dirty="0">
+                <a:solidFill>
+                  <a:srgbClr val="7030A0"/>
+                </a:solidFill>
+              </a:rPr>
+              <a:t>Основы работы</a:t>
+            </a:r>
+            <a:r>
+              <a:rPr lang="en-US" dirty="0">
+                <a:solidFill>
+                  <a:srgbClr val="7030A0"/>
+                </a:solidFill>
+              </a:rPr>
+              <a:t>: </a:t>
+            </a:r>
+            <a:r>
+              <a:rPr lang="ru-RU" dirty="0">
+                <a:solidFill>
+                  <a:srgbClr val="7030A0"/>
+                </a:solidFill>
+              </a:rPr>
+              <a:t>добавляем </a:t>
+            </a:r>
+            <a:r>
+              <a:rPr lang="ru-RU" dirty="0" err="1">
+                <a:solidFill>
+                  <a:srgbClr val="7030A0"/>
+                </a:solidFill>
+              </a:rPr>
+              <a:t>констрейнты</a:t>
+            </a:r>
+            <a:endParaRPr lang="ru-RU" dirty="0">
+              <a:solidFill>
+                <a:srgbClr val="7030A0"/>
+              </a:solidFill>
+            </a:endParaRPr>
+          </a:p>
+        </p:txBody>
+      </p:sp>
+      <p:pic>
+        <p:nvPicPr>
+          <p:cNvPr id="4" name="Объект 3">
             <a:extLst>
               <a:ext uri="{FF2B5EF4-FFF2-40B4-BE49-F238E27FC236}">
-                <a16:creationId xmlns:a16="http://schemas.microsoft.com/office/drawing/2014/main" id="{001042F4-D2A0-804B-9E34-387E446FC020}"/>
+                <a16:creationId xmlns:a16="http://schemas.microsoft.com/office/drawing/2014/main" id="{74F2DABE-C3DE-A742-A70E-4493E260BBB5}"/>
               </a:ext>
             </a:extLst>
           </p:cNvPr>
-          <p:cNvSpPr>
-            <a:spLocks noGrp="1"/>
-          </p:cNvSpPr>
+          <p:cNvPicPr>
+            <a:picLocks noGrp="1" noChangeAspect="1"/>
+          </p:cNvPicPr>
           <p:nvPr>
             <p:ph idx="1"/>
           </p:nvPr>
-        </p:nvSpPr>
-        <p:spPr/>
-        <p:txBody>
-          <a:bodyPr/>
-          <a:lstStyle/>
-          <a:p>
-            <a:endParaRPr lang="ru-RU"/>
-          </a:p>
-        </p:txBody>
-      </p:sp>
+        </p:nvPicPr>
+        <p:blipFill>
+          <a:blip r:embed="rId2"/>
+          <a:stretch>
+            <a:fillRect/>
+          </a:stretch>
+        </p:blipFill>
+        <p:spPr>
+          <a:xfrm>
+            <a:off x="2387665" y="1690688"/>
+            <a:ext cx="7416670" cy="4587631"/>
+          </a:xfrm>
+          <a:prstGeom prst="rect">
+            <a:avLst/>
+          </a:prstGeom>
+        </p:spPr>
+      </p:pic>
     </p:spTree>
     <p:extLst>
       <p:ext uri="{BB962C8B-B14F-4D97-AF65-F5344CB8AC3E}">
@@ -4409,7 +5981,7 @@
           <p:cNvPr id="2" name="Заголовок 1">
             <a:extLst>
               <a:ext uri="{FF2B5EF4-FFF2-40B4-BE49-F238E27FC236}">
-                <a16:creationId xmlns:a16="http://schemas.microsoft.com/office/drawing/2014/main" id="{2A86018A-3DDC-7F47-95A4-C98240167CF6}"/>
+                <a16:creationId xmlns:a16="http://schemas.microsoft.com/office/drawing/2014/main" id="{935E38ED-178F-444C-B922-EC7D57F8F0D1}"/>
               </a:ext>
             </a:extLst>
           </p:cNvPr>
@@ -4431,8 +6003,37 @@
                   <a:srgbClr val="7030A0"/>
                 </a:solidFill>
               </a:rPr>
-              <a:t>Ссылки</a:t>
-            </a:r>
+              <a:t>Основы работы</a:t>
+            </a:r>
+            <a:r>
+              <a:rPr lang="en-US" dirty="0">
+                <a:solidFill>
+                  <a:srgbClr val="7030A0"/>
+                </a:solidFill>
+              </a:rPr>
+              <a:t>: </a:t>
+            </a:r>
+            <a:r>
+              <a:rPr lang="ru-RU" dirty="0">
+                <a:solidFill>
+                  <a:srgbClr val="7030A0"/>
+                </a:solidFill>
+              </a:rPr>
+              <a:t>удаляем </a:t>
+            </a:r>
+            <a:r>
+              <a:rPr lang="ru-RU" dirty="0" err="1">
+                <a:solidFill>
+                  <a:srgbClr val="7030A0"/>
+                </a:solidFill>
+              </a:rPr>
+              <a:t>констрейнты</a:t>
+            </a:r>
+            <a:endParaRPr lang="ru-RU" dirty="0">
+              <a:solidFill>
+                <a:srgbClr val="7030A0"/>
+              </a:solidFill>
+            </a:endParaRPr>
           </a:p>
         </p:txBody>
       </p:sp>
@@ -4441,7 +6042,7 @@
           <p:cNvPr id="3" name="Объект 2">
             <a:extLst>
               <a:ext uri="{FF2B5EF4-FFF2-40B4-BE49-F238E27FC236}">
-                <a16:creationId xmlns:a16="http://schemas.microsoft.com/office/drawing/2014/main" id="{E77815A6-FEDC-834D-B9AC-A24998715AD3}"/>
+                <a16:creationId xmlns:a16="http://schemas.microsoft.com/office/drawing/2014/main" id="{157FE00B-91E9-2044-BA3D-39C375651210}"/>
               </a:ext>
             </a:extLst>
           </p:cNvPr>
@@ -4457,14 +6058,51 @@
           <a:bodyPr/>
           <a:lstStyle/>
           <a:p>
-            <a:endParaRPr lang="ru-RU"/>
+            <a:r>
+              <a:rPr lang="en-US" dirty="0">
+                <a:solidFill>
+                  <a:srgbClr val="00B0F0"/>
+                </a:solidFill>
+              </a:rPr>
+              <a:t>some</a:t>
+            </a:r>
+            <a:r>
+              <a:rPr lang="en" dirty="0">
+                <a:solidFill>
+                  <a:srgbClr val="00B0F0"/>
+                </a:solidFill>
+                <a:effectLst/>
+              </a:rPr>
+              <a:t>.</a:t>
+            </a:r>
+            <a:r>
+              <a:rPr lang="en" dirty="0" err="1">
+                <a:solidFill>
+                  <a:srgbClr val="00B0F0"/>
+                </a:solidFill>
+                <a:effectLst/>
+              </a:rPr>
+              <a:t>snp.removeConstraints</a:t>
+            </a:r>
+            <a:r>
+              <a:rPr lang="en" dirty="0">
+                <a:solidFill>
+                  <a:srgbClr val="00B0F0"/>
+                </a:solidFill>
+                <a:effectLst/>
+              </a:rPr>
+              <a:t>()</a:t>
+            </a:r>
+          </a:p>
+          <a:p>
+            <a:endParaRPr lang="ru-RU" dirty="0"/>
           </a:p>
         </p:txBody>
       </p:sp>
     </p:spTree>
     <p:extLst>
       <p:ext uri="{BB962C8B-B14F-4D97-AF65-F5344CB8AC3E}">
-        <p14:creationId xmlns:p14="http://schemas.microsoft.com/office/powerpoint/2010/main" val="2235601987"/>
+        <p14:creationId xmlns:p14="http://schemas.microsoft.com/office/powerpoint/2010/main" val="895945967"/>
       </p:ext>
     </p:extLst>
   </p:cSld>
@@ -4496,7 +6134,7 @@
           <p:cNvPr id="2" name="Заголовок 1">
             <a:extLst>
               <a:ext uri="{FF2B5EF4-FFF2-40B4-BE49-F238E27FC236}">
-                <a16:creationId xmlns:a16="http://schemas.microsoft.com/office/drawing/2014/main" id="{50D46732-100B-054B-AA64-AC284177ABC2}"/>
+                <a16:creationId xmlns:a16="http://schemas.microsoft.com/office/drawing/2014/main" id="{B9AE4631-47E8-654B-A53D-B7815B213A8E}"/>
               </a:ext>
             </a:extLst>
           </p:cNvPr>
@@ -4504,7 +6142,7 @@
             <a:spLocks noGrp="1"/>
           </p:cNvSpPr>
           <p:nvPr>
-            <p:ph type="ctrTitle"/>
+            <p:ph type="title"/>
           </p:nvPr>
         </p:nvSpPr>
         <p:spPr/>
@@ -4518,17 +6156,42 @@
                   <a:srgbClr val="7030A0"/>
                 </a:solidFill>
               </a:rPr>
-              <a:t>Спасибо за внимание</a:t>
-            </a:r>
-          </a:p>
-        </p:txBody>
-      </p:sp>
-      <p:sp>
-        <p:nvSpPr>
-          <p:cNvPr id="3" name="Подзаголовок 2">
+              <a:t>Основы работы</a:t>
+            </a:r>
+            <a:r>
+              <a:rPr lang="en-US" dirty="0">
+                <a:solidFill>
+                  <a:srgbClr val="7030A0"/>
+                </a:solidFill>
+              </a:rPr>
+              <a:t>: </a:t>
+            </a:r>
+            <a:r>
+              <a:rPr lang="ru-RU" dirty="0">
+                <a:solidFill>
+                  <a:srgbClr val="7030A0"/>
+                </a:solidFill>
+              </a:rPr>
+              <a:t>изменяем </a:t>
+            </a:r>
+            <a:r>
+              <a:rPr lang="ru-RU" dirty="0" err="1">
+                <a:solidFill>
+                  <a:srgbClr val="7030A0"/>
+                </a:solidFill>
+              </a:rPr>
+              <a:t>констрейнты</a:t>
+            </a:r>
+            <a:endParaRPr lang="ru-RU" dirty="0"/>
+          </a:p>
+        </p:txBody>
+      </p:sp>
+      <p:sp>
+        <p:nvSpPr>
+          <p:cNvPr id="3" name="Объект 2">
             <a:extLst>
               <a:ext uri="{FF2B5EF4-FFF2-40B4-BE49-F238E27FC236}">
-                <a16:creationId xmlns:a16="http://schemas.microsoft.com/office/drawing/2014/main" id="{44C99405-C9C5-B140-A36B-B3EBB49D8403}"/>
+                <a16:creationId xmlns:a16="http://schemas.microsoft.com/office/drawing/2014/main" id="{ED229702-80FB-9646-A9F5-E5455E1F9AF6}"/>
               </a:ext>
             </a:extLst>
           </p:cNvPr>
@@ -4536,7 +6199,7 @@
             <a:spLocks noGrp="1"/>
           </p:cNvSpPr>
           <p:nvPr>
-            <p:ph type="subTitle" idx="1"/>
+            <p:ph idx="1"/>
           </p:nvPr>
         </p:nvSpPr>
         <p:spPr/>
@@ -4544,14 +6207,33 @@
           <a:bodyPr/>
           <a:lstStyle/>
           <a:p>
-            <a:endParaRPr lang="ru-RU"/>
+            <a:r>
+              <a:rPr lang="en" dirty="0">
+                <a:hlinkClick r:id="rId2"/>
+              </a:rPr>
+              <a:t>https://github.com/SnapKit/SnapKit/issues/488?ysclid=l898khtr3v795914594</a:t>
+            </a:r>
+            <a:endParaRPr lang="en" dirty="0"/>
+          </a:p>
+          <a:p>
+            <a:endParaRPr lang="en" dirty="0"/>
+          </a:p>
+          <a:p>
+            <a:pPr marL="457200" lvl="1" indent="0">
+              <a:buNone/>
+            </a:pPr>
+            <a:r>
+              <a:rPr lang="ru-RU" dirty="0"/>
+              <a:t>Или </a:t>
+            </a:r>
+            <a:endParaRPr lang="en" dirty="0"/>
           </a:p>
         </p:txBody>
       </p:sp>
     </p:spTree>
     <p:extLst>
       <p:ext uri="{BB962C8B-B14F-4D97-AF65-F5344CB8AC3E}">
-        <p14:creationId xmlns:p14="http://schemas.microsoft.com/office/powerpoint/2010/main" val="203696986"/>
+        <p14:creationId xmlns:p14="http://schemas.microsoft.com/office/powerpoint/2010/main" val="300238036"/>
       </p:ext>
     </p:extLst>
   </p:cSld>

</xml_diff>